<commit_message>
added Race Condition contents that Aravind didn't do
</commit_message>
<xml_diff>
--- a/Presentation.pptx
+++ b/Presentation.pptx
@@ -136,7 +136,7 @@
   </p:defaultTextStyle>
   <p:extLst>
     <p:ext uri="{EFAFB233-063F-42B5-8137-9DF3F51BA10A}">
-      <p15:sldGuideLst xmlns:p15="http://schemas.microsoft.com/office/powerpoint/2012/main">
+      <p15:sldGuideLst xmlns="" xmlns:p15="http://schemas.microsoft.com/office/powerpoint/2012/main">
         <p15:guide id="1" orient="horz" pos="2160">
           <p15:clr>
             <a:srgbClr val="A4A3A4"/>
@@ -1536,8 +1536,8 @@
     <dgm:cxn modelId="{3AFF1A20-EC62-455E-9434-58C014D162F6}" type="presOf" srcId="{051D639B-9540-49CA-B2FE-59596106A0A5}" destId="{239B7340-6B83-4B51-857E-8C0055E2A94D}" srcOrd="0" destOrd="0" presId="urn:microsoft.com/office/officeart/2005/8/layout/vProcess5"/>
     <dgm:cxn modelId="{A492AF6E-5055-444A-8D62-CF23DC7FA3BE}" type="presOf" srcId="{4AB9B9E1-0E17-4B9A-9E84-EBD70D080BD2}" destId="{0832F444-92D2-47E6-98A0-8BDAC29754BB}" srcOrd="0" destOrd="0" presId="urn:microsoft.com/office/officeart/2005/8/layout/vProcess5"/>
     <dgm:cxn modelId="{5080AE72-FF24-4A53-A1CB-8F4819B03096}" type="presOf" srcId="{3AA3768D-3D9A-436E-B602-C5A59FFBAFEC}" destId="{42984757-C35D-419F-951B-D474C0F6B932}" srcOrd="1" destOrd="0" presId="urn:microsoft.com/office/officeart/2005/8/layout/vProcess5"/>
+    <dgm:cxn modelId="{840EB287-26AB-4CFC-A22F-BB3562D63208}" type="presOf" srcId="{98BAC4C6-25D8-45DD-B216-10036A6EE41A}" destId="{62521164-133C-4FE3-8FE4-95C2B86AEB4C}" srcOrd="1" destOrd="0" presId="urn:microsoft.com/office/officeart/2005/8/layout/vProcess5"/>
     <dgm:cxn modelId="{8C643273-8354-43E6-9557-113B7F15E9AC}" type="presOf" srcId="{2BBBA67C-FB53-420E-A852-4FFB9F36C3D8}" destId="{1AF31F0F-1CE8-48B1-8271-6AF3337DF40D}" srcOrd="0" destOrd="0" presId="urn:microsoft.com/office/officeart/2005/8/layout/vProcess5"/>
-    <dgm:cxn modelId="{840EB287-26AB-4CFC-A22F-BB3562D63208}" type="presOf" srcId="{98BAC4C6-25D8-45DD-B216-10036A6EE41A}" destId="{62521164-133C-4FE3-8FE4-95C2B86AEB4C}" srcOrd="1" destOrd="0" presId="urn:microsoft.com/office/officeart/2005/8/layout/vProcess5"/>
     <dgm:cxn modelId="{5C3138CF-98D4-4C71-837F-BC2F6F3BCBCE}" srcId="{40D79F5D-9931-426A-B669-B5BEF7A8CB2A}" destId="{B65907B1-A1E2-4DB5-AD4F-8C30C2899521}" srcOrd="4" destOrd="0" parTransId="{39B4ECE5-5733-43A9-A214-4AACF91DAEC4}" sibTransId="{1D74D4DF-4B48-47D4-A252-AFD482730346}"/>
     <dgm:cxn modelId="{8971CA58-FFAB-40A4-8C5E-AEF0615AC565}" type="presOf" srcId="{3AA3768D-3D9A-436E-B602-C5A59FFBAFEC}" destId="{3993AE0D-00D5-4833-B7EE-98DC82C8871A}" srcOrd="0" destOrd="0" presId="urn:microsoft.com/office/officeart/2005/8/layout/vProcess5"/>
     <dgm:cxn modelId="{5FE218C1-7360-4304-ADEE-7BEE32136552}" type="presOf" srcId="{051D639B-9540-49CA-B2FE-59596106A0A5}" destId="{65946C7F-3C49-435A-83E1-7F03E6D9115B}" srcOrd="1" destOrd="0" presId="urn:microsoft.com/office/officeart/2005/8/layout/vProcess5"/>
@@ -1693,12 +1693,12 @@
         </a:fontRef>
       </dsp:style>
       <dsp:txBody>
-        <a:bodyPr spcFirstLastPara="0" vert="horz" wrap="square" lIns="72390" tIns="72390" rIns="72390" bIns="72390" numCol="1" spcCol="1270" anchor="ctr" anchorCtr="0">
+        <a:bodyPr spcFirstLastPara="0" vert="horz" wrap="square" lIns="68580" tIns="68580" rIns="68580" bIns="68580" numCol="1" spcCol="1270" anchor="ctr" anchorCtr="0">
           <a:noAutofit/>
         </a:bodyPr>
         <a:lstStyle/>
         <a:p>
-          <a:pPr lvl="0" algn="l" defTabSz="844550">
+          <a:pPr lvl="0" algn="l" defTabSz="800100">
             <a:lnSpc>
               <a:spcPct val="90000"/>
             </a:lnSpc>
@@ -1710,14 +1710,14 @@
             </a:spcAft>
           </a:pPr>
           <a:r>
-            <a:rPr lang="en-NZ" sz="1900" kern="1200" dirty="0" smtClean="0">
+            <a:rPr lang="en-NZ" sz="1800" kern="1200" dirty="0" smtClean="0">
               <a:solidFill>
                 <a:schemeClr val="bg1"/>
               </a:solidFill>
             </a:rPr>
             <a:t>Source Code</a:t>
           </a:r>
-          <a:endParaRPr lang="en-GB" sz="1900" kern="1200" dirty="0">
+          <a:endParaRPr lang="en-GB" sz="1800" kern="1200" dirty="0">
             <a:solidFill>
               <a:schemeClr val="bg1"/>
             </a:solidFill>
@@ -1846,12 +1846,12 @@
         </a:fontRef>
       </dsp:style>
       <dsp:txBody>
-        <a:bodyPr spcFirstLastPara="0" vert="horz" wrap="square" lIns="72390" tIns="72390" rIns="72390" bIns="72390" numCol="1" spcCol="1270" anchor="ctr" anchorCtr="0">
+        <a:bodyPr spcFirstLastPara="0" vert="horz" wrap="square" lIns="68580" tIns="68580" rIns="68580" bIns="68580" numCol="1" spcCol="1270" anchor="ctr" anchorCtr="0">
           <a:noAutofit/>
         </a:bodyPr>
         <a:lstStyle/>
         <a:p>
-          <a:pPr lvl="0" algn="l" defTabSz="844550">
+          <a:pPr lvl="0" algn="l" defTabSz="800100">
             <a:lnSpc>
               <a:spcPct val="90000"/>
             </a:lnSpc>
@@ -1863,10 +1863,10 @@
             </a:spcAft>
           </a:pPr>
           <a:r>
-            <a:rPr lang="en-NZ" sz="1900" kern="1200" dirty="0" smtClean="0"/>
+            <a:rPr lang="en-NZ" sz="1800" kern="1200" dirty="0" smtClean="0"/>
             <a:t>Compiler</a:t>
           </a:r>
-          <a:endParaRPr lang="en-GB" sz="1900" kern="1200" dirty="0"/>
+          <a:endParaRPr lang="en-GB" sz="1800" kern="1200" dirty="0"/>
         </a:p>
       </dsp:txBody>
       <dsp:txXfrm>
@@ -1991,12 +1991,12 @@
         </a:fontRef>
       </dsp:style>
       <dsp:txBody>
-        <a:bodyPr spcFirstLastPara="0" vert="horz" wrap="square" lIns="72390" tIns="72390" rIns="72390" bIns="72390" numCol="1" spcCol="1270" anchor="ctr" anchorCtr="0">
+        <a:bodyPr spcFirstLastPara="0" vert="horz" wrap="square" lIns="68580" tIns="68580" rIns="68580" bIns="68580" numCol="1" spcCol="1270" anchor="ctr" anchorCtr="0">
           <a:noAutofit/>
         </a:bodyPr>
         <a:lstStyle/>
         <a:p>
-          <a:pPr lvl="0" algn="l" defTabSz="844550">
+          <a:pPr lvl="0" algn="l" defTabSz="800100">
             <a:lnSpc>
               <a:spcPct val="90000"/>
             </a:lnSpc>
@@ -2008,10 +2008,10 @@
             </a:spcAft>
           </a:pPr>
           <a:r>
-            <a:rPr lang="en-NZ" sz="1900" kern="1200" dirty="0" smtClean="0"/>
+            <a:rPr lang="en-NZ" sz="1800" kern="1200" dirty="0" smtClean="0"/>
             <a:t>Processor</a:t>
           </a:r>
-          <a:endParaRPr lang="en-GB" sz="1900" kern="1200" dirty="0"/>
+          <a:endParaRPr lang="en-GB" sz="1800" kern="1200" dirty="0"/>
         </a:p>
       </dsp:txBody>
       <dsp:txXfrm>
@@ -2136,12 +2136,12 @@
         </a:fontRef>
       </dsp:style>
       <dsp:txBody>
-        <a:bodyPr spcFirstLastPara="0" vert="horz" wrap="square" lIns="72390" tIns="72390" rIns="72390" bIns="72390" numCol="1" spcCol="1270" anchor="ctr" anchorCtr="0">
+        <a:bodyPr spcFirstLastPara="0" vert="horz" wrap="square" lIns="68580" tIns="68580" rIns="68580" bIns="68580" numCol="1" spcCol="1270" anchor="ctr" anchorCtr="0">
           <a:noAutofit/>
         </a:bodyPr>
         <a:lstStyle/>
         <a:p>
-          <a:pPr lvl="0" algn="l" defTabSz="844550">
+          <a:pPr lvl="0" algn="l" defTabSz="800100">
             <a:lnSpc>
               <a:spcPct val="90000"/>
             </a:lnSpc>
@@ -2153,10 +2153,10 @@
             </a:spcAft>
           </a:pPr>
           <a:r>
-            <a:rPr lang="en-NZ" sz="1900" kern="1200" dirty="0" smtClean="0"/>
+            <a:rPr lang="en-NZ" sz="1800" kern="1200" dirty="0" smtClean="0"/>
             <a:t>Cache</a:t>
           </a:r>
-          <a:endParaRPr lang="en-GB" sz="1900" kern="1200" dirty="0"/>
+          <a:endParaRPr lang="en-GB" sz="1800" kern="1200" dirty="0"/>
         </a:p>
       </dsp:txBody>
       <dsp:txXfrm>
@@ -2281,12 +2281,12 @@
         </a:fontRef>
       </dsp:style>
       <dsp:txBody>
-        <a:bodyPr spcFirstLastPara="0" vert="horz" wrap="square" lIns="72390" tIns="72390" rIns="72390" bIns="72390" numCol="1" spcCol="1270" anchor="ctr" anchorCtr="0">
+        <a:bodyPr spcFirstLastPara="0" vert="horz" wrap="square" lIns="68580" tIns="68580" rIns="68580" bIns="68580" numCol="1" spcCol="1270" anchor="ctr" anchorCtr="0">
           <a:noAutofit/>
         </a:bodyPr>
         <a:lstStyle/>
         <a:p>
-          <a:pPr lvl="0" algn="l" defTabSz="844550">
+          <a:pPr lvl="0" algn="l" defTabSz="800100">
             <a:lnSpc>
               <a:spcPct val="90000"/>
             </a:lnSpc>
@@ -2298,14 +2298,14 @@
             </a:spcAft>
           </a:pPr>
           <a:r>
-            <a:rPr lang="en-NZ" sz="1900" kern="1200" dirty="0" smtClean="0">
+            <a:rPr lang="en-NZ" sz="1800" kern="1200" dirty="0" smtClean="0">
               <a:solidFill>
                 <a:schemeClr val="bg1"/>
               </a:solidFill>
             </a:rPr>
             <a:t>Actual Execution</a:t>
           </a:r>
-          <a:endParaRPr lang="en-GB" sz="1900" kern="1200" dirty="0">
+          <a:endParaRPr lang="en-GB" sz="1800" kern="1200" dirty="0">
             <a:solidFill>
               <a:schemeClr val="bg1"/>
             </a:solidFill>
@@ -2377,12 +2377,12 @@
         <a:fontRef idx="minor"/>
       </dsp:style>
       <dsp:txBody>
-        <a:bodyPr spcFirstLastPara="0" vert="horz" wrap="square" lIns="16510" tIns="16510" rIns="16510" bIns="16510" numCol="1" spcCol="1270" anchor="ctr" anchorCtr="0">
+        <a:bodyPr spcFirstLastPara="0" vert="horz" wrap="square" lIns="15240" tIns="15240" rIns="15240" bIns="15240" numCol="1" spcCol="1270" anchor="ctr" anchorCtr="0">
           <a:noAutofit/>
         </a:bodyPr>
         <a:lstStyle/>
         <a:p>
-          <a:pPr lvl="0" algn="ctr" defTabSz="577850">
+          <a:pPr lvl="0" algn="ctr" defTabSz="533400">
             <a:lnSpc>
               <a:spcPct val="90000"/>
             </a:lnSpc>
@@ -2393,7 +2393,7 @@
               <a:spcPct val="35000"/>
             </a:spcAft>
           </a:pPr>
-          <a:endParaRPr lang="en-GB" sz="1300" kern="1200"/>
+          <a:endParaRPr lang="en-GB" sz="1200" kern="1200"/>
         </a:p>
       </dsp:txBody>
       <dsp:txXfrm>
@@ -2461,12 +2461,12 @@
         <a:fontRef idx="minor"/>
       </dsp:style>
       <dsp:txBody>
-        <a:bodyPr spcFirstLastPara="0" vert="horz" wrap="square" lIns="16510" tIns="16510" rIns="16510" bIns="16510" numCol="1" spcCol="1270" anchor="ctr" anchorCtr="0">
+        <a:bodyPr spcFirstLastPara="0" vert="horz" wrap="square" lIns="15240" tIns="15240" rIns="15240" bIns="15240" numCol="1" spcCol="1270" anchor="ctr" anchorCtr="0">
           <a:noAutofit/>
         </a:bodyPr>
         <a:lstStyle/>
         <a:p>
-          <a:pPr lvl="0" algn="ctr" defTabSz="577850">
+          <a:pPr lvl="0" algn="ctr" defTabSz="533400">
             <a:lnSpc>
               <a:spcPct val="90000"/>
             </a:lnSpc>
@@ -2477,7 +2477,7 @@
               <a:spcPct val="35000"/>
             </a:spcAft>
           </a:pPr>
-          <a:endParaRPr lang="en-GB" sz="1300" kern="1200"/>
+          <a:endParaRPr lang="en-GB" sz="1200" kern="1200"/>
         </a:p>
       </dsp:txBody>
       <dsp:txXfrm>
@@ -2545,12 +2545,12 @@
         <a:fontRef idx="minor"/>
       </dsp:style>
       <dsp:txBody>
-        <a:bodyPr spcFirstLastPara="0" vert="horz" wrap="square" lIns="16510" tIns="16510" rIns="16510" bIns="16510" numCol="1" spcCol="1270" anchor="ctr" anchorCtr="0">
+        <a:bodyPr spcFirstLastPara="0" vert="horz" wrap="square" lIns="15240" tIns="15240" rIns="15240" bIns="15240" numCol="1" spcCol="1270" anchor="ctr" anchorCtr="0">
           <a:noAutofit/>
         </a:bodyPr>
         <a:lstStyle/>
         <a:p>
-          <a:pPr lvl="0" algn="ctr" defTabSz="577850">
+          <a:pPr lvl="0" algn="ctr" defTabSz="533400">
             <a:lnSpc>
               <a:spcPct val="90000"/>
             </a:lnSpc>
@@ -2561,7 +2561,7 @@
               <a:spcPct val="35000"/>
             </a:spcAft>
           </a:pPr>
-          <a:endParaRPr lang="en-GB" sz="1300" kern="1200"/>
+          <a:endParaRPr lang="en-GB" sz="1200" kern="1200"/>
         </a:p>
       </dsp:txBody>
       <dsp:txXfrm>
@@ -2629,12 +2629,12 @@
         <a:fontRef idx="minor"/>
       </dsp:style>
       <dsp:txBody>
-        <a:bodyPr spcFirstLastPara="0" vert="horz" wrap="square" lIns="16510" tIns="16510" rIns="16510" bIns="16510" numCol="1" spcCol="1270" anchor="ctr" anchorCtr="0">
+        <a:bodyPr spcFirstLastPara="0" vert="horz" wrap="square" lIns="15240" tIns="15240" rIns="15240" bIns="15240" numCol="1" spcCol="1270" anchor="ctr" anchorCtr="0">
           <a:noAutofit/>
         </a:bodyPr>
         <a:lstStyle/>
         <a:p>
-          <a:pPr lvl="0" algn="ctr" defTabSz="577850">
+          <a:pPr lvl="0" algn="ctr" defTabSz="533400">
             <a:lnSpc>
               <a:spcPct val="90000"/>
             </a:lnSpc>
@@ -2645,7 +2645,7 @@
               <a:spcPct val="35000"/>
             </a:spcAft>
           </a:pPr>
-          <a:endParaRPr lang="en-GB" sz="1300" kern="1200"/>
+          <a:endParaRPr lang="en-GB" sz="1200" kern="1200"/>
         </a:p>
       </dsp:txBody>
       <dsp:txXfrm>
@@ -4999,7 +4999,7 @@
           <a:p>
             <a:fld id="{E17A1F60-D46C-C04D-A60B-2230C10FC134}" type="datetimeFigureOut">
               <a:rPr lang="en-US" smtClean="0"/>
-              <a:t>5/19/2014</a:t>
+              <a:t>19/05/14</a:t>
             </a:fld>
             <a:endParaRPr lang="en-US"/>
           </a:p>
@@ -7319,7 +7319,7 @@
             <a:fld id="{AFDD7A28-FA93-4136-BDC1-BCCB2687E678}" type="datetimeFigureOut">
               <a:rPr lang="en-US" smtClean="0"/>
               <a:pPr/>
-              <a:t>5/19/2014</a:t>
+              <a:t>19/05/14</a:t>
             </a:fld>
             <a:endParaRPr lang="en-US"/>
           </a:p>
@@ -7567,7 +7567,7 @@
             <a:fld id="{AFDD7A28-FA93-4136-BDC1-BCCB2687E678}" type="datetimeFigureOut">
               <a:rPr lang="en-US" smtClean="0"/>
               <a:pPr/>
-              <a:t>5/19/2014</a:t>
+              <a:t>19/05/14</a:t>
             </a:fld>
             <a:endParaRPr lang="en-US" dirty="0"/>
           </a:p>
@@ -10371,7 +10371,7 @@
   <p:timing>
     <p:tnLst>
       <p:par>
-        <p:cTn id="1" dur="indefinite" restart="never" nodeType="tmRoot"/>
+        <p:cTn xmlns:p14="http://schemas.microsoft.com/office/powerpoint/2010/main" id="1" dur="indefinite" restart="never" nodeType="tmRoot"/>
       </p:par>
     </p:tnLst>
   </p:timing>
@@ -10539,18 +10539,18 @@
   <p:clrMapOvr>
     <a:masterClrMapping/>
   </p:clrMapOvr>
-  <mc:AlternateContent xmlns:mc="http://schemas.openxmlformats.org/markup-compatibility/2006">
-    <mc:Choice xmlns:p14="http://schemas.microsoft.com/office/powerpoint/2010/main" Requires="p14">
+  <mc:AlternateContent xmlns:mc="http://schemas.openxmlformats.org/markup-compatibility/2006" xmlns:p14="http://schemas.microsoft.com/office/powerpoint/2010/main">
+    <mc:Choice Requires="p14">
       <p:transition p14:dur="0"/>
     </mc:Choice>
-    <mc:Fallback>
+    <mc:Fallback xmlns="">
       <p:transition/>
     </mc:Fallback>
   </mc:AlternateContent>
   <p:timing>
     <p:tnLst>
       <p:par>
-        <p:cTn id="1" dur="indefinite" restart="never" nodeType="tmRoot"/>
+        <p:cTn xmlns:p14="http://schemas.microsoft.com/office/powerpoint/2010/main" id="1" dur="indefinite" restart="never" nodeType="tmRoot"/>
       </p:par>
     </p:tnLst>
   </p:timing>
@@ -10648,7 +10648,7 @@
   <p:timing>
     <p:tnLst>
       <p:par>
-        <p:cTn id="1" dur="indefinite" restart="never" nodeType="tmRoot"/>
+        <p:cTn xmlns:p14="http://schemas.microsoft.com/office/powerpoint/2010/main" id="1" dur="indefinite" restart="never" nodeType="tmRoot"/>
       </p:par>
     </p:tnLst>
   </p:timing>
@@ -10731,7 +10731,7 @@
   <p:timing>
     <p:tnLst>
       <p:par>
-        <p:cTn id="1" dur="indefinite" restart="never" nodeType="tmRoot"/>
+        <p:cTn xmlns:p14="http://schemas.microsoft.com/office/powerpoint/2010/main" id="1" dur="indefinite" restart="never" nodeType="tmRoot"/>
       </p:par>
     </p:tnLst>
   </p:timing>
@@ -10825,7 +10825,7 @@
   <p:timing>
     <p:tnLst>
       <p:par>
-        <p:cTn id="1" dur="indefinite" restart="never" nodeType="tmRoot"/>
+        <p:cTn xmlns:p14="http://schemas.microsoft.com/office/powerpoint/2010/main" id="1" dur="indefinite" restart="never" nodeType="tmRoot"/>
       </p:par>
     </p:tnLst>
   </p:timing>
@@ -10872,21 +10872,21 @@
             </a:pPr>
             <a:r>
               <a:rPr lang="en-US" dirty="0" smtClean="0"/>
-              <a:t>Avoid simultaneously accessed to shared data</a:t>
-            </a:r>
-          </a:p>
-          <a:p>
-            <a:pPr marL="342900" indent="-342900">
-              <a:buFont typeface="Arial"/>
-              <a:buChar char="•"/>
-            </a:pPr>
-            <a:r>
-              <a:rPr lang="en-US" dirty="0"/>
-              <a:t>Is a </a:t>
-            </a:r>
-            <a:r>
-              <a:rPr lang="en-US" dirty="0" smtClean="0"/>
-              <a:t>way to solve </a:t>
+              <a:t>IBM researcher [6] explains that, Mutual Exclusion is:</a:t>
+            </a:r>
+          </a:p>
+          <a:p>
+            <a:pPr marL="628650" lvl="1" indent="-342900"/>
+            <a:r>
+              <a:rPr lang="en-US" dirty="0" smtClean="0"/>
+              <a:t>Used to avoid simultaneously accessed to shared data</a:t>
+            </a:r>
+          </a:p>
+          <a:p>
+            <a:pPr marL="628650" lvl="1" indent="-342900"/>
+            <a:r>
+              <a:rPr lang="en-US" dirty="0" smtClean="0"/>
+              <a:t>A way to solve </a:t>
             </a:r>
             <a:r>
               <a:rPr lang="en-US" dirty="0"/>
@@ -10898,10 +10898,7 @@
             </a:r>
           </a:p>
           <a:p>
-            <a:pPr marL="342900" indent="-342900">
-              <a:buFont typeface="Arial"/>
-              <a:buChar char="•"/>
-            </a:pPr>
+            <a:pPr marL="628650" lvl="1" indent="-342900"/>
             <a:r>
               <a:rPr lang="en-US" dirty="0" err="1" smtClean="0"/>
               <a:t>a.k.a</a:t>
@@ -11976,7 +11973,7 @@
   <p:timing>
     <p:tnLst>
       <p:par>
-        <p:cTn id="1" dur="indefinite" restart="never" nodeType="tmRoot"/>
+        <p:cTn xmlns:p14="http://schemas.microsoft.com/office/powerpoint/2010/main" id="1" dur="indefinite" restart="never" nodeType="tmRoot"/>
       </p:par>
     </p:tnLst>
   </p:timing>
@@ -12300,7 +12297,7 @@
   <p:timing>
     <p:tnLst>
       <p:par>
-        <p:cTn id="1" dur="indefinite" restart="never" nodeType="tmRoot"/>
+        <p:cTn xmlns:p14="http://schemas.microsoft.com/office/powerpoint/2010/main" id="1" dur="indefinite" restart="never" nodeType="tmRoot"/>
       </p:par>
     </p:tnLst>
   </p:timing>
@@ -12825,7 +12822,7 @@
   <p:timing>
     <p:tnLst>
       <p:par>
-        <p:cTn id="1" dur="indefinite" restart="never" nodeType="tmRoot"/>
+        <p:cTn xmlns:p14="http://schemas.microsoft.com/office/powerpoint/2010/main" id="1" dur="indefinite" restart="never" nodeType="tmRoot"/>
       </p:par>
     </p:tnLst>
   </p:timing>
@@ -13484,16 +13481,127 @@
             <p:ph sz="quarter" idx="13"/>
           </p:nvPr>
         </p:nvSpPr>
-        <p:spPr/>
+        <p:spPr>
+          <a:xfrm>
+            <a:off x="457200" y="1477207"/>
+            <a:ext cx="8229600" cy="5079890"/>
+          </a:xfrm>
+        </p:spPr>
         <p:txBody>
           <a:bodyPr>
-            <a:normAutofit/>
+            <a:normAutofit fontScale="85000" lnSpcReduction="10000"/>
           </a:bodyPr>
           <a:lstStyle/>
           <a:p>
             <a:r>
+              <a:rPr lang="en-US" sz="1600" dirty="0"/>
+              <a:t>[1] John W. McCormick. 2007. MA1: real-time and parallel processing in </a:t>
+            </a:r>
+            <a:r>
+              <a:rPr lang="en-US" sz="1600" dirty="0" err="1"/>
+              <a:t>ada</a:t>
+            </a:r>
+            <a:r>
+              <a:rPr lang="en-US" sz="1600" dirty="0"/>
+              <a:t>. </a:t>
+            </a:r>
+            <a:r>
+              <a:rPr lang="en-US" sz="1600" i="1" dirty="0"/>
+              <a:t>Ada </a:t>
+            </a:r>
+            <a:r>
+              <a:rPr lang="en-US" sz="1600" i="1" dirty="0" err="1"/>
+              <a:t>Lett</a:t>
+            </a:r>
+            <a:r>
+              <a:rPr lang="en-US" sz="1600" i="1" dirty="0"/>
+              <a:t>.</a:t>
+            </a:r>
+            <a:r>
+              <a:rPr lang="en-US" sz="1600" dirty="0"/>
+              <a:t> XXVII, 3 (November 2007), 7-7. DOI=10.1145/1315607.1315587 http://</a:t>
+            </a:r>
+            <a:r>
+              <a:rPr lang="en-US" sz="1600" dirty="0" err="1"/>
+              <a:t>doi.acm.org.ezproxy.auckland.ac.nz</a:t>
+            </a:r>
+            <a:r>
+              <a:rPr lang="en-US" sz="1600" dirty="0"/>
+              <a:t>/10.1145/1315607.1315587</a:t>
+            </a:r>
+          </a:p>
+          <a:p>
+            <a:r>
+              <a:rPr lang="en-US" sz="1600" dirty="0"/>
+              <a:t>[2] John W. McCormick. 2009. Ada for real-time and parallel processing. In </a:t>
+            </a:r>
+            <a:r>
+              <a:rPr lang="en-US" sz="1600" i="1" dirty="0"/>
+              <a:t>Proceedings of the ACM </a:t>
+            </a:r>
+            <a:r>
+              <a:rPr lang="en-US" sz="1600" i="1" dirty="0" err="1"/>
+              <a:t>SIGAda</a:t>
+            </a:r>
+            <a:r>
+              <a:rPr lang="en-US" sz="1600" i="1" dirty="0"/>
+              <a:t> annual international conference on Ada and related technologies</a:t>
+            </a:r>
+            <a:r>
+              <a:rPr lang="en-US" sz="1600" dirty="0"/>
+              <a:t> (</a:t>
+            </a:r>
+            <a:r>
+              <a:rPr lang="en-US" sz="1600" dirty="0" err="1"/>
+              <a:t>SIGAda</a:t>
+            </a:r>
+            <a:r>
+              <a:rPr lang="en-US" sz="1600" dirty="0"/>
+              <a:t> '09). ACM, New York, NY, USA, 13-14. DOI=10.1145/1647420.1647428 http://</a:t>
+            </a:r>
+            <a:r>
+              <a:rPr lang="en-US" sz="1600" dirty="0" err="1"/>
+              <a:t>doi.acm.org.ezproxy.auckland.ac.nz</a:t>
+            </a:r>
+            <a:r>
+              <a:rPr lang="en-US" sz="1600" dirty="0"/>
+              <a:t>/10.1145/1647420.1647428</a:t>
+            </a:r>
+          </a:p>
+          <a:p>
+            <a:r>
+              <a:rPr lang="en-US" sz="1600" dirty="0"/>
+              <a:t>[3] Dick Mays and Richard J. LeBlanc, Jr.. 2002. The </a:t>
+            </a:r>
+            <a:r>
+              <a:rPr lang="en-US" sz="1600" dirty="0" err="1"/>
+              <a:t>cyclefree</a:t>
+            </a:r>
+            <a:r>
+              <a:rPr lang="en-US" sz="1600" dirty="0"/>
+              <a:t> methodology: a simple approach to building reliable, robust, real-time systems. In </a:t>
+            </a:r>
+            <a:r>
+              <a:rPr lang="en-US" sz="1600" i="1" dirty="0"/>
+              <a:t>Proceedings of the 24th International Conference on Software Engineering</a:t>
+            </a:r>
+            <a:r>
+              <a:rPr lang="en-US" sz="1600" dirty="0"/>
+              <a:t> (ICSE '02). ACM, New York, NY, USA, 567-575. DOI=10.1145/581339.581411 http://</a:t>
+            </a:r>
+            <a:r>
+              <a:rPr lang="en-US" sz="1600" dirty="0" err="1"/>
+              <a:t>doi.acm.org.ezproxy.auckland.ac.nz</a:t>
+            </a:r>
+            <a:r>
+              <a:rPr lang="en-US" sz="1600" dirty="0"/>
+              <a:t>/10.1145/581339.581411</a:t>
+            </a:r>
+          </a:p>
+          <a:p>
+            <a:r>
               <a:rPr lang="en-US" sz="1500" dirty="0" smtClean="0"/>
-              <a:t>[1] </a:t>
+              <a:t>[4] </a:t>
             </a:r>
             <a:r>
               <a:rPr lang="en-US" sz="1500" dirty="0"/>
@@ -13520,7 +13628,7 @@
           <a:p>
             <a:r>
               <a:rPr lang="en-US" sz="1500" dirty="0" smtClean="0"/>
-              <a:t>[2] </a:t>
+              <a:t>[5] </a:t>
             </a:r>
             <a:r>
               <a:rPr lang="en-US" sz="1500" dirty="0" err="1"/>
@@ -13550,31 +13658,22 @@
           </a:p>
           <a:p>
             <a:r>
+              <a:rPr lang="en-US" sz="1500" dirty="0" smtClean="0"/>
+              <a:t>[6] </a:t>
+            </a:r>
+            <a:r>
               <a:rPr lang="en-US" sz="1500" dirty="0"/>
-              <a:t>[3] </a:t>
-            </a:r>
-            <a:r>
-              <a:rPr lang="en-US" sz="1500" dirty="0">
-                <a:hlinkClick r:id="rId3"/>
-              </a:rPr>
               <a:t>http://publib.boulder.ibm.com/infocenter/iseries/v5r3/index.jsp?topic=%2Frzahw%</a:t>
             </a:r>
             <a:r>
-              <a:rPr lang="en-US" sz="1500" dirty="0" smtClean="0">
-                <a:hlinkClick r:id="rId3"/>
-              </a:rPr>
+              <a:rPr lang="en-US" sz="1500" dirty="0" smtClean="0"/>
               <a:t>2Frzahwmutco.htm</a:t>
             </a:r>
-            <a:endParaRPr lang="en-US" sz="1500" dirty="0" smtClean="0"/>
           </a:p>
           <a:p>
             <a:r>
               <a:rPr lang="en-US" sz="1500" dirty="0" smtClean="0"/>
-              <a:t>[4</a:t>
-            </a:r>
-            <a:r>
-              <a:rPr lang="en-US" sz="1500" dirty="0"/>
-              <a:t>] </a:t>
+              <a:t>[7] </a:t>
             </a:r>
             <a:r>
               <a:rPr lang="en-US" sz="1500" dirty="0" err="1"/>
@@ -13600,7 +13699,7 @@
           <a:p>
             <a:r>
               <a:rPr lang="en-US" sz="1500" dirty="0" smtClean="0"/>
-              <a:t>[5] </a:t>
+              <a:t>[8] </a:t>
             </a:r>
             <a:r>
               <a:rPr lang="en-US" sz="1600" dirty="0"/>
@@ -13638,8 +13737,8 @@
           </a:p>
           <a:p>
             <a:r>
-              <a:rPr lang="en-US" sz="1600" dirty="0"/>
-              <a:t>[6] </a:t>
+              <a:rPr lang="en-US" sz="1600" dirty="0" smtClean="0"/>
+              <a:t>[9] </a:t>
             </a:r>
             <a:r>
               <a:rPr lang="en-US" sz="1600" dirty="0" err="1"/>
@@ -13663,8 +13762,14 @@
             </a:r>
             <a:r>
               <a:rPr lang="en-US" sz="1600" dirty="0"/>
-              <a:t>; David A. Padua &amp; Mary W. Hall, ed., 'PPOPP' , ACM, , pp. 269-280 .</a:t>
-            </a:r>
+              <a:t>; David A. Padua &amp; Mary W. Hall, ed., 'PPOPP' , ACM, , pp. 269-280 </a:t>
+            </a:r>
+            <a:r>
+              <a:rPr lang="en-US" sz="1600" dirty="0" smtClean="0"/>
+              <a:t>.</a:t>
+            </a:r>
+          </a:p>
+          <a:p>
             <a:endParaRPr lang="en-US" sz="1500" dirty="0" smtClean="0"/>
           </a:p>
           <a:p>
@@ -13932,7 +14037,7 @@
   <p:timing>
     <p:tnLst>
       <p:par>
-        <p:cTn id="1" dur="indefinite" restart="never" nodeType="tmRoot">
+        <p:cTn xmlns:p14="http://schemas.microsoft.com/office/powerpoint/2010/main" id="1" dur="indefinite" restart="never" nodeType="tmRoot">
           <p:childTnLst>
             <p:seq concurrent="1" nextAc="seek">
               <p:cTn id="2" dur="indefinite" nodeType="mainSeq">
@@ -14645,7 +14750,9 @@
         </p:nvSpPr>
         <p:spPr/>
         <p:txBody>
-          <a:bodyPr/>
+          <a:bodyPr>
+            <a:normAutofit lnSpcReduction="10000"/>
+          </a:bodyPr>
           <a:lstStyle/>
           <a:p>
             <a:r>
@@ -14660,7 +14767,7 @@
             </a:pPr>
             <a:r>
               <a:rPr lang="en-US" dirty="0" smtClean="0"/>
-              <a:t>[2][3][4] say race condition always occurred if there’s no any proper parallel code or thread safe</a:t>
+              <a:t>The authors of [1][2][3] has specifically mentioned in their papers that Race Condition is the main pitfalls that all programmers always facing.</a:t>
             </a:r>
           </a:p>
           <a:p>
@@ -14678,7 +14785,7 @@
             </a:r>
             <a:r>
               <a:rPr lang="en-US" dirty="0" smtClean="0"/>
-              <a:t> in [1], Ben-Ari and </a:t>
+              <a:t> in [4], Ben-Ari and </a:t>
             </a:r>
             <a:r>
               <a:rPr lang="en-US" dirty="0" err="1" smtClean="0"/>
@@ -14686,7 +14793,7 @@
             </a:r>
             <a:r>
               <a:rPr lang="en-US" dirty="0" smtClean="0"/>
-              <a:t> in [2] have included Mutual Exclusion into their lecturing materials</a:t>
+              <a:t> in [5] have included Mutual Exclusion into their lecturing materials</a:t>
             </a:r>
           </a:p>
           <a:p>
@@ -14704,7 +14811,7 @@
             </a:r>
             <a:r>
               <a:rPr lang="de-DE" dirty="0" smtClean="0"/>
-              <a:t>Zeng in [4], </a:t>
+              <a:t>Zeng in [7], </a:t>
             </a:r>
             <a:r>
               <a:rPr lang="en-US" dirty="0" smtClean="0"/>
@@ -14728,7 +14835,7 @@
             </a:r>
             <a:r>
               <a:rPr lang="en-US" dirty="0"/>
-              <a:t>5</a:t>
+              <a:t>8</a:t>
             </a:r>
             <a:r>
               <a:rPr lang="en-US" dirty="0" smtClean="0"/>
@@ -14754,7 +14861,7 @@
             </a:r>
             <a:r>
               <a:rPr lang="en-US" dirty="0" smtClean="0"/>
-              <a:t>.[6]</a:t>
+              <a:t>.[9]</a:t>
             </a:r>
           </a:p>
           <a:p>
@@ -15545,7 +15652,7 @@
   <p:timing>
     <p:tnLst>
       <p:par>
-        <p:cTn id="1" dur="indefinite" restart="never" nodeType="tmRoot"/>
+        <p:cTn xmlns:p14="http://schemas.microsoft.com/office/powerpoint/2010/main" id="1" dur="indefinite" restart="never" nodeType="tmRoot"/>
       </p:par>
     </p:tnLst>
   </p:timing>

</xml_diff>

<commit_message>
unify presentation slides format
</commit_message>
<xml_diff>
--- a/Presentation.pptx
+++ b/Presentation.pptx
@@ -5,7 +5,7 @@
     <p:sldMasterId id="2147484209" r:id="rId1"/>
   </p:sldMasterIdLst>
   <p:notesMasterIdLst>
-    <p:notesMasterId r:id="rId30"/>
+    <p:notesMasterId r:id="rId27"/>
   </p:notesMasterIdLst>
   <p:sldIdLst>
     <p:sldId id="266" r:id="rId2"/>
@@ -16,26 +16,23 @@
     <p:sldId id="272" r:id="rId7"/>
     <p:sldId id="269" r:id="rId8"/>
     <p:sldId id="273" r:id="rId9"/>
-    <p:sldId id="293" r:id="rId10"/>
-    <p:sldId id="294" r:id="rId11"/>
-    <p:sldId id="295" r:id="rId12"/>
-    <p:sldId id="296" r:id="rId13"/>
+    <p:sldId id="298" r:id="rId10"/>
+    <p:sldId id="296" r:id="rId11"/>
+    <p:sldId id="275" r:id="rId12"/>
+    <p:sldId id="285" r:id="rId13"/>
     <p:sldId id="297" r:id="rId14"/>
-    <p:sldId id="275" r:id="rId15"/>
-    <p:sldId id="285" r:id="rId16"/>
-    <p:sldId id="278" r:id="rId17"/>
-    <p:sldId id="286" r:id="rId18"/>
-    <p:sldId id="287" r:id="rId19"/>
-    <p:sldId id="289" r:id="rId20"/>
-    <p:sldId id="290" r:id="rId21"/>
-    <p:sldId id="292" r:id="rId22"/>
-    <p:sldId id="291" r:id="rId23"/>
-    <p:sldId id="279" r:id="rId24"/>
-    <p:sldId id="284" r:id="rId25"/>
-    <p:sldId id="280" r:id="rId26"/>
-    <p:sldId id="283" r:id="rId27"/>
-    <p:sldId id="264" r:id="rId28"/>
-    <p:sldId id="263" r:id="rId29"/>
+    <p:sldId id="286" r:id="rId15"/>
+    <p:sldId id="287" r:id="rId16"/>
+    <p:sldId id="289" r:id="rId17"/>
+    <p:sldId id="290" r:id="rId18"/>
+    <p:sldId id="292" r:id="rId19"/>
+    <p:sldId id="291" r:id="rId20"/>
+    <p:sldId id="279" r:id="rId21"/>
+    <p:sldId id="284" r:id="rId22"/>
+    <p:sldId id="280" r:id="rId23"/>
+    <p:sldId id="283" r:id="rId24"/>
+    <p:sldId id="264" r:id="rId25"/>
+    <p:sldId id="263" r:id="rId26"/>
   </p:sldIdLst>
   <p:sldSz cx="9144000" cy="6858000" type="screen4x3"/>
   <p:notesSz cx="6858000" cy="9144000"/>
@@ -136,7 +133,7 @@
   </p:defaultTextStyle>
   <p:extLst>
     <p:ext uri="{EFAFB233-063F-42B5-8137-9DF3F51BA10A}">
-      <p15:sldGuideLst xmlns="" xmlns:p15="http://schemas.microsoft.com/office/powerpoint/2012/main">
+      <p15:sldGuideLst xmlns:p15="http://schemas.microsoft.com/office/powerpoint/2012/main" xmlns="">
         <p15:guide id="1" orient="horz" pos="2160">
           <p15:clr>
             <a:srgbClr val="A4A3A4"/>
@@ -1522,47 +1519,47 @@
     </dgm:pt>
   </dgm:ptLst>
   <dgm:cxnLst>
-    <dgm:cxn modelId="{F76766DE-F94C-4AEC-A538-F7E3765C2B89}" type="presOf" srcId="{19F66229-03FD-4C0D-813E-0BBEDEFFF908}" destId="{7E8CF6F3-7A8C-4EF9-8E2A-D144EF88CEE6}" srcOrd="1" destOrd="0" presId="urn:microsoft.com/office/officeart/2005/8/layout/vProcess5"/>
     <dgm:cxn modelId="{403D09CB-3DEF-427C-84A3-2D15D76B7A53}" srcId="{40D79F5D-9931-426A-B669-B5BEF7A8CB2A}" destId="{3AA3768D-3D9A-436E-B602-C5A59FFBAFEC}" srcOrd="2" destOrd="0" parTransId="{69D1AD42-D6FA-4265-A5B6-21AE5DE52F49}" sibTransId="{2BBBA67C-FB53-420E-A852-4FFB9F36C3D8}"/>
-    <dgm:cxn modelId="{E394F0CD-2A66-4E75-8E3A-4A8F40C3E150}" type="presOf" srcId="{14C59C04-0774-49DC-92F8-8CCD4F26B60A}" destId="{7FFB4B13-9E00-456A-AB61-E8FBB5B48DF0}" srcOrd="0" destOrd="0" presId="urn:microsoft.com/office/officeart/2005/8/layout/vProcess5"/>
-    <dgm:cxn modelId="{E31ADC38-835F-4CE9-9393-638CDF5E6DA0}" type="presOf" srcId="{98BAC4C6-25D8-45DD-B216-10036A6EE41A}" destId="{1B72FD27-49CA-4EA6-B9E7-8CFEE2146117}" srcOrd="0" destOrd="0" presId="urn:microsoft.com/office/officeart/2005/8/layout/vProcess5"/>
-    <dgm:cxn modelId="{D1785C8D-4BDB-4F79-A6E4-5997A51D16E7}" type="presOf" srcId="{4A4A86F0-2078-45AB-A42B-5F48DC625232}" destId="{74B6E5F5-23FD-4BCB-8A3C-F74042048EC7}" srcOrd="0" destOrd="0" presId="urn:microsoft.com/office/officeart/2005/8/layout/vProcess5"/>
-    <dgm:cxn modelId="{BDC51254-9728-4A18-9AFF-28F77D905DF6}" type="presOf" srcId="{B65907B1-A1E2-4DB5-AD4F-8C30C2899521}" destId="{1A38F754-A13E-4CE4-9DB0-0E6A06416449}" srcOrd="1" destOrd="0" presId="urn:microsoft.com/office/officeart/2005/8/layout/vProcess5"/>
+    <dgm:cxn modelId="{D94C8215-C6ED-E94E-97C7-9EC189E60289}" type="presOf" srcId="{3AA3768D-3D9A-436E-B602-C5A59FFBAFEC}" destId="{3993AE0D-00D5-4833-B7EE-98DC82C8871A}" srcOrd="0" destOrd="0" presId="urn:microsoft.com/office/officeart/2005/8/layout/vProcess5"/>
+    <dgm:cxn modelId="{3C767E61-B610-1C42-B900-6FB3B87304BF}" type="presOf" srcId="{B65907B1-A1E2-4DB5-AD4F-8C30C2899521}" destId="{0B5C20D8-F3D2-4A91-9863-5048A6822435}" srcOrd="0" destOrd="0" presId="urn:microsoft.com/office/officeart/2005/8/layout/vProcess5"/>
+    <dgm:cxn modelId="{CEA9DEB2-927A-864D-BB3E-A70895BDBF39}" type="presOf" srcId="{4AB9B9E1-0E17-4B9A-9E84-EBD70D080BD2}" destId="{0832F444-92D2-47E6-98A0-8BDAC29754BB}" srcOrd="0" destOrd="0" presId="urn:microsoft.com/office/officeart/2005/8/layout/vProcess5"/>
+    <dgm:cxn modelId="{0D4DCFDE-4EFA-1243-AA2E-C41C28463EC9}" type="presOf" srcId="{3AA3768D-3D9A-436E-B602-C5A59FFBAFEC}" destId="{42984757-C35D-419F-951B-D474C0F6B932}" srcOrd="1" destOrd="0" presId="urn:microsoft.com/office/officeart/2005/8/layout/vProcess5"/>
     <dgm:cxn modelId="{473AA0C4-5308-499D-92F2-02581DCDFAA9}" srcId="{40D79F5D-9931-426A-B669-B5BEF7A8CB2A}" destId="{19F66229-03FD-4C0D-813E-0BBEDEFFF908}" srcOrd="3" destOrd="0" parTransId="{AB547BD5-E52F-4825-B13C-D43FC409A135}" sibTransId="{4A4A86F0-2078-45AB-A42B-5F48DC625232}"/>
-    <dgm:cxn modelId="{E5900D30-321B-437F-A014-E791C4E6CC9E}" type="presOf" srcId="{40D79F5D-9931-426A-B669-B5BEF7A8CB2A}" destId="{2E4E9672-C2E6-4EEF-8F64-5BFC044E5F77}" srcOrd="0" destOrd="0" presId="urn:microsoft.com/office/officeart/2005/8/layout/vProcess5"/>
     <dgm:cxn modelId="{0D9AF34A-188C-4EAD-B738-59B597E77A61}" srcId="{40D79F5D-9931-426A-B669-B5BEF7A8CB2A}" destId="{051D639B-9540-49CA-B2FE-59596106A0A5}" srcOrd="0" destOrd="0" parTransId="{F0039EB1-2518-4A9D-8C56-8BBD69D7639C}" sibTransId="{14C59C04-0774-49DC-92F8-8CCD4F26B60A}"/>
-    <dgm:cxn modelId="{BB01C68C-AB6C-4DBD-8B4B-F8C7724E9922}" type="presOf" srcId="{19F66229-03FD-4C0D-813E-0BBEDEFFF908}" destId="{AE34178A-4C11-4913-88C3-98CD679EBDA2}" srcOrd="0" destOrd="0" presId="urn:microsoft.com/office/officeart/2005/8/layout/vProcess5"/>
+    <dgm:cxn modelId="{152E41D8-AFF3-9B49-9F13-39DC9DC9551B}" type="presOf" srcId="{14C59C04-0774-49DC-92F8-8CCD4F26B60A}" destId="{7FFB4B13-9E00-456A-AB61-E8FBB5B48DF0}" srcOrd="0" destOrd="0" presId="urn:microsoft.com/office/officeart/2005/8/layout/vProcess5"/>
     <dgm:cxn modelId="{F58F18F9-E9FE-4B9B-BD77-400B4F780D73}" srcId="{40D79F5D-9931-426A-B669-B5BEF7A8CB2A}" destId="{98BAC4C6-25D8-45DD-B216-10036A6EE41A}" srcOrd="1" destOrd="0" parTransId="{24759866-9B0B-467A-A97F-F98A10176916}" sibTransId="{4AB9B9E1-0E17-4B9A-9E84-EBD70D080BD2}"/>
-    <dgm:cxn modelId="{3AFF1A20-EC62-455E-9434-58C014D162F6}" type="presOf" srcId="{051D639B-9540-49CA-B2FE-59596106A0A5}" destId="{239B7340-6B83-4B51-857E-8C0055E2A94D}" srcOrd="0" destOrd="0" presId="urn:microsoft.com/office/officeart/2005/8/layout/vProcess5"/>
-    <dgm:cxn modelId="{A492AF6E-5055-444A-8D62-CF23DC7FA3BE}" type="presOf" srcId="{4AB9B9E1-0E17-4B9A-9E84-EBD70D080BD2}" destId="{0832F444-92D2-47E6-98A0-8BDAC29754BB}" srcOrd="0" destOrd="0" presId="urn:microsoft.com/office/officeart/2005/8/layout/vProcess5"/>
-    <dgm:cxn modelId="{5080AE72-FF24-4A53-A1CB-8F4819B03096}" type="presOf" srcId="{3AA3768D-3D9A-436E-B602-C5A59FFBAFEC}" destId="{42984757-C35D-419F-951B-D474C0F6B932}" srcOrd="1" destOrd="0" presId="urn:microsoft.com/office/officeart/2005/8/layout/vProcess5"/>
-    <dgm:cxn modelId="{840EB287-26AB-4CFC-A22F-BB3562D63208}" type="presOf" srcId="{98BAC4C6-25D8-45DD-B216-10036A6EE41A}" destId="{62521164-133C-4FE3-8FE4-95C2B86AEB4C}" srcOrd="1" destOrd="0" presId="urn:microsoft.com/office/officeart/2005/8/layout/vProcess5"/>
-    <dgm:cxn modelId="{8C643273-8354-43E6-9557-113B7F15E9AC}" type="presOf" srcId="{2BBBA67C-FB53-420E-A852-4FFB9F36C3D8}" destId="{1AF31F0F-1CE8-48B1-8271-6AF3337DF40D}" srcOrd="0" destOrd="0" presId="urn:microsoft.com/office/officeart/2005/8/layout/vProcess5"/>
+    <dgm:cxn modelId="{8A96F974-D67F-9542-A5E0-D44346BAB564}" type="presOf" srcId="{B65907B1-A1E2-4DB5-AD4F-8C30C2899521}" destId="{1A38F754-A13E-4CE4-9DB0-0E6A06416449}" srcOrd="1" destOrd="0" presId="urn:microsoft.com/office/officeart/2005/8/layout/vProcess5"/>
+    <dgm:cxn modelId="{8CC23907-41D8-B541-8329-5B7F611DE963}" type="presOf" srcId="{98BAC4C6-25D8-45DD-B216-10036A6EE41A}" destId="{1B72FD27-49CA-4EA6-B9E7-8CFEE2146117}" srcOrd="0" destOrd="0" presId="urn:microsoft.com/office/officeart/2005/8/layout/vProcess5"/>
+    <dgm:cxn modelId="{930B0CC0-F6BE-0D45-B87A-63F267E290AB}" type="presOf" srcId="{4A4A86F0-2078-45AB-A42B-5F48DC625232}" destId="{74B6E5F5-23FD-4BCB-8A3C-F74042048EC7}" srcOrd="0" destOrd="0" presId="urn:microsoft.com/office/officeart/2005/8/layout/vProcess5"/>
+    <dgm:cxn modelId="{61025FFD-3628-2447-8F1E-12383D4608EE}" type="presOf" srcId="{98BAC4C6-25D8-45DD-B216-10036A6EE41A}" destId="{62521164-133C-4FE3-8FE4-95C2B86AEB4C}" srcOrd="1" destOrd="0" presId="urn:microsoft.com/office/officeart/2005/8/layout/vProcess5"/>
     <dgm:cxn modelId="{5C3138CF-98D4-4C71-837F-BC2F6F3BCBCE}" srcId="{40D79F5D-9931-426A-B669-B5BEF7A8CB2A}" destId="{B65907B1-A1E2-4DB5-AD4F-8C30C2899521}" srcOrd="4" destOrd="0" parTransId="{39B4ECE5-5733-43A9-A214-4AACF91DAEC4}" sibTransId="{1D74D4DF-4B48-47D4-A252-AFD482730346}"/>
-    <dgm:cxn modelId="{8971CA58-FFAB-40A4-8C5E-AEF0615AC565}" type="presOf" srcId="{3AA3768D-3D9A-436E-B602-C5A59FFBAFEC}" destId="{3993AE0D-00D5-4833-B7EE-98DC82C8871A}" srcOrd="0" destOrd="0" presId="urn:microsoft.com/office/officeart/2005/8/layout/vProcess5"/>
-    <dgm:cxn modelId="{5FE218C1-7360-4304-ADEE-7BEE32136552}" type="presOf" srcId="{051D639B-9540-49CA-B2FE-59596106A0A5}" destId="{65946C7F-3C49-435A-83E1-7F03E6D9115B}" srcOrd="1" destOrd="0" presId="urn:microsoft.com/office/officeart/2005/8/layout/vProcess5"/>
-    <dgm:cxn modelId="{60F661B8-0A11-41F8-A142-7828A295DC59}" type="presOf" srcId="{B65907B1-A1E2-4DB5-AD4F-8C30C2899521}" destId="{0B5C20D8-F3D2-4A91-9863-5048A6822435}" srcOrd="0" destOrd="0" presId="urn:microsoft.com/office/officeart/2005/8/layout/vProcess5"/>
-    <dgm:cxn modelId="{38BA7122-BBB5-400B-8823-73BB503CEF52}" type="presParOf" srcId="{2E4E9672-C2E6-4EEF-8F64-5BFC044E5F77}" destId="{18324587-9774-4EEB-9558-078246AAD598}" srcOrd="0" destOrd="0" presId="urn:microsoft.com/office/officeart/2005/8/layout/vProcess5"/>
-    <dgm:cxn modelId="{C3767A76-80D2-4076-9B71-1966E5364DC4}" type="presParOf" srcId="{2E4E9672-C2E6-4EEF-8F64-5BFC044E5F77}" destId="{239B7340-6B83-4B51-857E-8C0055E2A94D}" srcOrd="1" destOrd="0" presId="urn:microsoft.com/office/officeart/2005/8/layout/vProcess5"/>
-    <dgm:cxn modelId="{5157D10F-D9E2-4F5C-862C-11FE968D59B0}" type="presParOf" srcId="{2E4E9672-C2E6-4EEF-8F64-5BFC044E5F77}" destId="{1B72FD27-49CA-4EA6-B9E7-8CFEE2146117}" srcOrd="2" destOrd="0" presId="urn:microsoft.com/office/officeart/2005/8/layout/vProcess5"/>
-    <dgm:cxn modelId="{86E3F7C7-A124-4EE7-B23B-4B4790511478}" type="presParOf" srcId="{2E4E9672-C2E6-4EEF-8F64-5BFC044E5F77}" destId="{3993AE0D-00D5-4833-B7EE-98DC82C8871A}" srcOrd="3" destOrd="0" presId="urn:microsoft.com/office/officeart/2005/8/layout/vProcess5"/>
-    <dgm:cxn modelId="{64F34117-111F-40C7-B530-4CE82F20834F}" type="presParOf" srcId="{2E4E9672-C2E6-4EEF-8F64-5BFC044E5F77}" destId="{AE34178A-4C11-4913-88C3-98CD679EBDA2}" srcOrd="4" destOrd="0" presId="urn:microsoft.com/office/officeart/2005/8/layout/vProcess5"/>
-    <dgm:cxn modelId="{975F701B-B2A9-44B3-A6DC-F24BB4C4BE0D}" type="presParOf" srcId="{2E4E9672-C2E6-4EEF-8F64-5BFC044E5F77}" destId="{0B5C20D8-F3D2-4A91-9863-5048A6822435}" srcOrd="5" destOrd="0" presId="urn:microsoft.com/office/officeart/2005/8/layout/vProcess5"/>
-    <dgm:cxn modelId="{D8AC3364-3A30-4810-ADF6-05F132E7F281}" type="presParOf" srcId="{2E4E9672-C2E6-4EEF-8F64-5BFC044E5F77}" destId="{7FFB4B13-9E00-456A-AB61-E8FBB5B48DF0}" srcOrd="6" destOrd="0" presId="urn:microsoft.com/office/officeart/2005/8/layout/vProcess5"/>
-    <dgm:cxn modelId="{B27DBD36-4ABB-4017-86F5-74C793BF0A21}" type="presParOf" srcId="{2E4E9672-C2E6-4EEF-8F64-5BFC044E5F77}" destId="{0832F444-92D2-47E6-98A0-8BDAC29754BB}" srcOrd="7" destOrd="0" presId="urn:microsoft.com/office/officeart/2005/8/layout/vProcess5"/>
-    <dgm:cxn modelId="{5716ADC2-C1DC-484A-9CBD-ADA758135F7F}" type="presParOf" srcId="{2E4E9672-C2E6-4EEF-8F64-5BFC044E5F77}" destId="{1AF31F0F-1CE8-48B1-8271-6AF3337DF40D}" srcOrd="8" destOrd="0" presId="urn:microsoft.com/office/officeart/2005/8/layout/vProcess5"/>
-    <dgm:cxn modelId="{44326516-D598-49F5-A7C4-0C4D8D0D65CE}" type="presParOf" srcId="{2E4E9672-C2E6-4EEF-8F64-5BFC044E5F77}" destId="{74B6E5F5-23FD-4BCB-8A3C-F74042048EC7}" srcOrd="9" destOrd="0" presId="urn:microsoft.com/office/officeart/2005/8/layout/vProcess5"/>
-    <dgm:cxn modelId="{C75E1E87-EF44-4651-955D-23BCBBD2D2AF}" type="presParOf" srcId="{2E4E9672-C2E6-4EEF-8F64-5BFC044E5F77}" destId="{65946C7F-3C49-435A-83E1-7F03E6D9115B}" srcOrd="10" destOrd="0" presId="urn:microsoft.com/office/officeart/2005/8/layout/vProcess5"/>
-    <dgm:cxn modelId="{FFA14E5A-7E06-47B9-8978-3830BC9D3705}" type="presParOf" srcId="{2E4E9672-C2E6-4EEF-8F64-5BFC044E5F77}" destId="{62521164-133C-4FE3-8FE4-95C2B86AEB4C}" srcOrd="11" destOrd="0" presId="urn:microsoft.com/office/officeart/2005/8/layout/vProcess5"/>
-    <dgm:cxn modelId="{0DEBFE21-85A2-42DE-AD92-196F4455E21C}" type="presParOf" srcId="{2E4E9672-C2E6-4EEF-8F64-5BFC044E5F77}" destId="{42984757-C35D-419F-951B-D474C0F6B932}" srcOrd="12" destOrd="0" presId="urn:microsoft.com/office/officeart/2005/8/layout/vProcess5"/>
-    <dgm:cxn modelId="{CFF47C3A-D62B-4B19-A86B-D662D279EE35}" type="presParOf" srcId="{2E4E9672-C2E6-4EEF-8F64-5BFC044E5F77}" destId="{7E8CF6F3-7A8C-4EF9-8E2A-D144EF88CEE6}" srcOrd="13" destOrd="0" presId="urn:microsoft.com/office/officeart/2005/8/layout/vProcess5"/>
-    <dgm:cxn modelId="{B47F9388-BB34-4069-B090-2435784B8780}" type="presParOf" srcId="{2E4E9672-C2E6-4EEF-8F64-5BFC044E5F77}" destId="{1A38F754-A13E-4CE4-9DB0-0E6A06416449}" srcOrd="14" destOrd="0" presId="urn:microsoft.com/office/officeart/2005/8/layout/vProcess5"/>
+    <dgm:cxn modelId="{0F9BDCE4-8BB3-AB42-BFF8-4F8B9CCACA5A}" type="presOf" srcId="{19F66229-03FD-4C0D-813E-0BBEDEFFF908}" destId="{7E8CF6F3-7A8C-4EF9-8E2A-D144EF88CEE6}" srcOrd="1" destOrd="0" presId="urn:microsoft.com/office/officeart/2005/8/layout/vProcess5"/>
+    <dgm:cxn modelId="{3A9EFFC9-1492-6D44-A260-265BBE21C150}" type="presOf" srcId="{40D79F5D-9931-426A-B669-B5BEF7A8CB2A}" destId="{2E4E9672-C2E6-4EEF-8F64-5BFC044E5F77}" srcOrd="0" destOrd="0" presId="urn:microsoft.com/office/officeart/2005/8/layout/vProcess5"/>
+    <dgm:cxn modelId="{A254F4E9-2E1D-7646-8253-70F19F3EF2B2}" type="presOf" srcId="{19F66229-03FD-4C0D-813E-0BBEDEFFF908}" destId="{AE34178A-4C11-4913-88C3-98CD679EBDA2}" srcOrd="0" destOrd="0" presId="urn:microsoft.com/office/officeart/2005/8/layout/vProcess5"/>
+    <dgm:cxn modelId="{17FFC33B-8297-D34D-A9D7-6C10439CD0B1}" type="presOf" srcId="{051D639B-9540-49CA-B2FE-59596106A0A5}" destId="{65946C7F-3C49-435A-83E1-7F03E6D9115B}" srcOrd="1" destOrd="0" presId="urn:microsoft.com/office/officeart/2005/8/layout/vProcess5"/>
+    <dgm:cxn modelId="{AF537D14-1330-814F-954E-BF4F3AE00D9A}" type="presOf" srcId="{2BBBA67C-FB53-420E-A852-4FFB9F36C3D8}" destId="{1AF31F0F-1CE8-48B1-8271-6AF3337DF40D}" srcOrd="0" destOrd="0" presId="urn:microsoft.com/office/officeart/2005/8/layout/vProcess5"/>
+    <dgm:cxn modelId="{2A7F98D3-93FC-E349-8E75-401DF60028D9}" type="presOf" srcId="{051D639B-9540-49CA-B2FE-59596106A0A5}" destId="{239B7340-6B83-4B51-857E-8C0055E2A94D}" srcOrd="0" destOrd="0" presId="urn:microsoft.com/office/officeart/2005/8/layout/vProcess5"/>
+    <dgm:cxn modelId="{1B81EBE8-E2D1-C541-9997-3031CC93CAFB}" type="presParOf" srcId="{2E4E9672-C2E6-4EEF-8F64-5BFC044E5F77}" destId="{18324587-9774-4EEB-9558-078246AAD598}" srcOrd="0" destOrd="0" presId="urn:microsoft.com/office/officeart/2005/8/layout/vProcess5"/>
+    <dgm:cxn modelId="{307F365D-4E2E-E241-ABF1-6BE37D7AC165}" type="presParOf" srcId="{2E4E9672-C2E6-4EEF-8F64-5BFC044E5F77}" destId="{239B7340-6B83-4B51-857E-8C0055E2A94D}" srcOrd="1" destOrd="0" presId="urn:microsoft.com/office/officeart/2005/8/layout/vProcess5"/>
+    <dgm:cxn modelId="{A40287FC-123D-454A-A3AD-995560AB097D}" type="presParOf" srcId="{2E4E9672-C2E6-4EEF-8F64-5BFC044E5F77}" destId="{1B72FD27-49CA-4EA6-B9E7-8CFEE2146117}" srcOrd="2" destOrd="0" presId="urn:microsoft.com/office/officeart/2005/8/layout/vProcess5"/>
+    <dgm:cxn modelId="{3E39A72E-4329-7A42-B0FA-A3DC6A147F80}" type="presParOf" srcId="{2E4E9672-C2E6-4EEF-8F64-5BFC044E5F77}" destId="{3993AE0D-00D5-4833-B7EE-98DC82C8871A}" srcOrd="3" destOrd="0" presId="urn:microsoft.com/office/officeart/2005/8/layout/vProcess5"/>
+    <dgm:cxn modelId="{9D11ED12-BA49-884A-9202-78A77BEA73C3}" type="presParOf" srcId="{2E4E9672-C2E6-4EEF-8F64-5BFC044E5F77}" destId="{AE34178A-4C11-4913-88C3-98CD679EBDA2}" srcOrd="4" destOrd="0" presId="urn:microsoft.com/office/officeart/2005/8/layout/vProcess5"/>
+    <dgm:cxn modelId="{DCE4164E-7421-484E-96D5-EFD3F4B728D8}" type="presParOf" srcId="{2E4E9672-C2E6-4EEF-8F64-5BFC044E5F77}" destId="{0B5C20D8-F3D2-4A91-9863-5048A6822435}" srcOrd="5" destOrd="0" presId="urn:microsoft.com/office/officeart/2005/8/layout/vProcess5"/>
+    <dgm:cxn modelId="{1C9A8E58-AA0F-5E44-AD3D-FDD8DA158BD5}" type="presParOf" srcId="{2E4E9672-C2E6-4EEF-8F64-5BFC044E5F77}" destId="{7FFB4B13-9E00-456A-AB61-E8FBB5B48DF0}" srcOrd="6" destOrd="0" presId="urn:microsoft.com/office/officeart/2005/8/layout/vProcess5"/>
+    <dgm:cxn modelId="{F1B58D0E-4C25-8641-A305-A57079B47D40}" type="presParOf" srcId="{2E4E9672-C2E6-4EEF-8F64-5BFC044E5F77}" destId="{0832F444-92D2-47E6-98A0-8BDAC29754BB}" srcOrd="7" destOrd="0" presId="urn:microsoft.com/office/officeart/2005/8/layout/vProcess5"/>
+    <dgm:cxn modelId="{018C9E32-A43E-6F46-B359-7ACF57859000}" type="presParOf" srcId="{2E4E9672-C2E6-4EEF-8F64-5BFC044E5F77}" destId="{1AF31F0F-1CE8-48B1-8271-6AF3337DF40D}" srcOrd="8" destOrd="0" presId="urn:microsoft.com/office/officeart/2005/8/layout/vProcess5"/>
+    <dgm:cxn modelId="{308E6E77-D20F-D942-9AAA-CD91F4A030D4}" type="presParOf" srcId="{2E4E9672-C2E6-4EEF-8F64-5BFC044E5F77}" destId="{74B6E5F5-23FD-4BCB-8A3C-F74042048EC7}" srcOrd="9" destOrd="0" presId="urn:microsoft.com/office/officeart/2005/8/layout/vProcess5"/>
+    <dgm:cxn modelId="{655FEC1F-4160-2E4A-BA81-A187910B0B7B}" type="presParOf" srcId="{2E4E9672-C2E6-4EEF-8F64-5BFC044E5F77}" destId="{65946C7F-3C49-435A-83E1-7F03E6D9115B}" srcOrd="10" destOrd="0" presId="urn:microsoft.com/office/officeart/2005/8/layout/vProcess5"/>
+    <dgm:cxn modelId="{99CCC04A-22A0-2042-AD05-282F112F2E1F}" type="presParOf" srcId="{2E4E9672-C2E6-4EEF-8F64-5BFC044E5F77}" destId="{62521164-133C-4FE3-8FE4-95C2B86AEB4C}" srcOrd="11" destOrd="0" presId="urn:microsoft.com/office/officeart/2005/8/layout/vProcess5"/>
+    <dgm:cxn modelId="{003A756B-18B7-8B40-9F89-52EE31ED42D1}" type="presParOf" srcId="{2E4E9672-C2E6-4EEF-8F64-5BFC044E5F77}" destId="{42984757-C35D-419F-951B-D474C0F6B932}" srcOrd="12" destOrd="0" presId="urn:microsoft.com/office/officeart/2005/8/layout/vProcess5"/>
+    <dgm:cxn modelId="{82ED99C0-8F03-E940-8E36-4F45BD9274AE}" type="presParOf" srcId="{2E4E9672-C2E6-4EEF-8F64-5BFC044E5F77}" destId="{7E8CF6F3-7A8C-4EF9-8E2A-D144EF88CEE6}" srcOrd="13" destOrd="0" presId="urn:microsoft.com/office/officeart/2005/8/layout/vProcess5"/>
+    <dgm:cxn modelId="{411A8300-9041-3B44-9D2D-F4656AEC1DEA}" type="presParOf" srcId="{2E4E9672-C2E6-4EEF-8F64-5BFC044E5F77}" destId="{1A38F754-A13E-4CE4-9DB0-0E6A06416449}" srcOrd="14" destOrd="0" presId="urn:microsoft.com/office/officeart/2005/8/layout/vProcess5"/>
   </dgm:cxnLst>
   <dgm:bg/>
   <dgm:whole/>
   <dgm:extLst>
     <a:ext uri="http://schemas.microsoft.com/office/drawing/2008/diagram">
-      <dsp:dataModelExt xmlns:dsp="http://schemas.microsoft.com/office/drawing/2008/diagram" relId="rId7" minVer="http://schemas.openxmlformats.org/drawingml/2006/diagram"/>
+      <dsp:dataModelExt xmlns:dsp="http://schemas.microsoft.com/office/drawing/2008/diagram" relId="rId6" minVer="http://schemas.openxmlformats.org/drawingml/2006/diagram"/>
     </a:ext>
   </dgm:extLst>
 </dgm:dataModel>
@@ -5459,34 +5456,6 @@
           <a:bodyPr/>
           <a:lstStyle/>
           <a:p>
-            <a:r>
-              <a:rPr lang="en-US" dirty="0" smtClean="0"/>
-              <a:t>if threads try to acquire a lock faster than the rate at which a thread can execute the corresponding critical section, then program performance will suffer as threads will form a "convoy" waiting to acquire the lock.</a:t>
-            </a:r>
-          </a:p>
-          <a:p>
-            <a:r>
-              <a:rPr lang="en-US" dirty="0" smtClean="0"/>
-              <a:t>Threads that all use the same lock become queued to use the lock and end up serializing the processing. A 'convoy' is created.</a:t>
-            </a:r>
-          </a:p>
-          <a:p>
-            <a:r>
-              <a:rPr lang="en-US" dirty="0" smtClean="0"/>
-              <a:t>When a high-priority thread needs to acquire a lock held by a low-priority thread, the scheduler bumps up the priority of the blocking thread until the lock is released.</a:t>
-            </a:r>
-          </a:p>
-          <a:p>
-            <a:r>
-              <a:rPr lang="en-US" dirty="0" smtClean="0"/>
-              <a:t>That is certainly the method of choice to eliminate lock contention if it is workable. For example, consider contention for a counter of events. If each thread can have its own private counter, then no lock is necessary. If the total count is required, the counts can be summed after all threads are done counting.</a:t>
-            </a:r>
-          </a:p>
-          <a:p>
-            <a:r>
-              <a:rPr lang="en-US" dirty="0" smtClean="0"/>
-              <a:t>If the lock on a resource cannot be eliminated, consider partitioning the resource and using a separate lock to protect each partition. The partitioning can spread out contention among the locks.</a:t>
-            </a:r>
             <a:endParaRPr lang="en-US" dirty="0"/>
           </a:p>
         </p:txBody>
@@ -5508,7 +5477,7 @@
           <a:p>
             <a:fld id="{4B5DE452-D96A-B043-A19B-3F6D5B1BBA3B}" type="slidenum">
               <a:rPr lang="en-US" smtClean="0"/>
-              <a:t>22</a:t>
+              <a:t>23</a:t>
             </a:fld>
             <a:endParaRPr lang="en-US"/>
           </a:p>
@@ -5517,7 +5486,7 @@
     </p:spTree>
     <p:extLst>
       <p:ext uri="{BB962C8B-B14F-4D97-AF65-F5344CB8AC3E}">
-        <p14:creationId xmlns:p14="http://schemas.microsoft.com/office/powerpoint/2010/main" val="2738522525"/>
+        <p14:creationId xmlns:p14="http://schemas.microsoft.com/office/powerpoint/2010/main" val="2122580804"/>
       </p:ext>
     </p:extLst>
   </p:cSld>
@@ -5573,11 +5542,26 @@
           <a:p>
             <a:r>
               <a:rPr lang="en-US" dirty="0" smtClean="0"/>
-              <a:t>90% is</a:t>
-            </a:r>
-            <a:r>
-              <a:rPr lang="en-US" baseline="0" dirty="0" smtClean="0"/>
-              <a:t> a dummy value</a:t>
+              <a:t>Starvation</a:t>
+            </a:r>
+          </a:p>
+          <a:p>
+            <a:r>
+              <a:rPr lang="en-US" dirty="0" smtClean="0"/>
+              <a:t>For example, suppose an object provides a synchronized method that often takes a long time to return. If one thread invokes this method frequently, other threads that also need frequent synchronized access to the same object will often be blocked.</a:t>
+            </a:r>
+          </a:p>
+          <a:p>
+            <a:r>
+              <a:rPr lang="en-US" dirty="0" err="1" smtClean="0"/>
+              <a:t>Livelock</a:t>
+            </a:r>
+            <a:endParaRPr lang="en-US" dirty="0" smtClean="0"/>
+          </a:p>
+          <a:p>
+            <a:r>
+              <a:rPr lang="en-US" dirty="0" smtClean="0"/>
+              <a:t>This is comparable to two people attempting to pass each other in a corridor: Bob moves to his left to let Emma pass, while Emma moves to his right to let Bob pass. Seeing that they are still blocking each other, Bob moves to his right, while Emma moves to his left. They're still blocking each other, so...</a:t>
             </a:r>
             <a:endParaRPr lang="en-US" dirty="0"/>
           </a:p>
@@ -5598,200 +5582,9 @@
           <a:bodyPr/>
           <a:lstStyle/>
           <a:p>
-            <a:fld id="{4B5DE452-D96A-B043-A19B-3F6D5B1BBA3B}" type="slidenum">
-              <a:rPr lang="en-US" smtClean="0"/>
-              <a:t>24</a:t>
-            </a:fld>
-            <a:endParaRPr lang="en-US"/>
-          </a:p>
-        </p:txBody>
-      </p:sp>
-    </p:spTree>
-    <p:extLst>
-      <p:ext uri="{BB962C8B-B14F-4D97-AF65-F5344CB8AC3E}">
-        <p14:creationId xmlns:p14="http://schemas.microsoft.com/office/powerpoint/2010/main" val="807505352"/>
-      </p:ext>
-    </p:extLst>
-  </p:cSld>
-  <p:clrMapOvr>
-    <a:masterClrMapping/>
-  </p:clrMapOvr>
-</p:notes>
-</file>
-
-<file path=ppt/notesSlides/notesSlide12.xml><?xml version="1.0" encoding="utf-8"?>
-<p:notes xmlns:a="http://schemas.openxmlformats.org/drawingml/2006/main" xmlns:r="http://schemas.openxmlformats.org/officeDocument/2006/relationships" xmlns:p="http://schemas.openxmlformats.org/presentationml/2006/main">
-  <p:cSld>
-    <p:spTree>
-      <p:nvGrpSpPr>
-        <p:cNvPr id="1" name=""/>
-        <p:cNvGrpSpPr/>
-        <p:nvPr/>
-      </p:nvGrpSpPr>
-      <p:grpSpPr>
-        <a:xfrm>
-          <a:off x="0" y="0"/>
-          <a:ext cx="0" cy="0"/>
-          <a:chOff x="0" y="0"/>
-          <a:chExt cx="0" cy="0"/>
-        </a:xfrm>
-      </p:grpSpPr>
-      <p:sp>
-        <p:nvSpPr>
-          <p:cNvPr id="2" name="Slide Image Placeholder 1"/>
-          <p:cNvSpPr>
-            <a:spLocks noGrp="1" noRot="1" noChangeAspect="1"/>
-          </p:cNvSpPr>
-          <p:nvPr>
-            <p:ph type="sldImg"/>
-          </p:nvPr>
-        </p:nvSpPr>
-        <p:spPr/>
-      </p:sp>
-      <p:sp>
-        <p:nvSpPr>
-          <p:cNvPr id="3" name="Notes Placeholder 2"/>
-          <p:cNvSpPr>
-            <a:spLocks noGrp="1"/>
-          </p:cNvSpPr>
-          <p:nvPr>
-            <p:ph type="body" idx="1"/>
-          </p:nvPr>
-        </p:nvSpPr>
-        <p:spPr/>
-        <p:txBody>
-          <a:bodyPr/>
-          <a:lstStyle/>
-          <a:p>
-            <a:endParaRPr lang="en-US" dirty="0"/>
-          </a:p>
-        </p:txBody>
-      </p:sp>
-      <p:sp>
-        <p:nvSpPr>
-          <p:cNvPr id="4" name="Slide Number Placeholder 3"/>
-          <p:cNvSpPr>
-            <a:spLocks noGrp="1"/>
-          </p:cNvSpPr>
-          <p:nvPr>
-            <p:ph type="sldNum" sz="quarter" idx="10"/>
-          </p:nvPr>
-        </p:nvSpPr>
-        <p:spPr/>
-        <p:txBody>
-          <a:bodyPr/>
-          <a:lstStyle/>
-          <a:p>
-            <a:fld id="{4B5DE452-D96A-B043-A19B-3F6D5B1BBA3B}" type="slidenum">
-              <a:rPr lang="en-US" smtClean="0"/>
-              <a:t>26</a:t>
-            </a:fld>
-            <a:endParaRPr lang="en-US"/>
-          </a:p>
-        </p:txBody>
-      </p:sp>
-    </p:spTree>
-    <p:extLst>
-      <p:ext uri="{BB962C8B-B14F-4D97-AF65-F5344CB8AC3E}">
-        <p14:creationId xmlns:p14="http://schemas.microsoft.com/office/powerpoint/2010/main" val="2122580804"/>
-      </p:ext>
-    </p:extLst>
-  </p:cSld>
-  <p:clrMapOvr>
-    <a:masterClrMapping/>
-  </p:clrMapOvr>
-</p:notes>
-</file>
-
-<file path=ppt/notesSlides/notesSlide13.xml><?xml version="1.0" encoding="utf-8"?>
-<p:notes xmlns:a="http://schemas.openxmlformats.org/drawingml/2006/main" xmlns:r="http://schemas.openxmlformats.org/officeDocument/2006/relationships" xmlns:p="http://schemas.openxmlformats.org/presentationml/2006/main">
-  <p:cSld>
-    <p:spTree>
-      <p:nvGrpSpPr>
-        <p:cNvPr id="1" name=""/>
-        <p:cNvGrpSpPr/>
-        <p:nvPr/>
-      </p:nvGrpSpPr>
-      <p:grpSpPr>
-        <a:xfrm>
-          <a:off x="0" y="0"/>
-          <a:ext cx="0" cy="0"/>
-          <a:chOff x="0" y="0"/>
-          <a:chExt cx="0" cy="0"/>
-        </a:xfrm>
-      </p:grpSpPr>
-      <p:sp>
-        <p:nvSpPr>
-          <p:cNvPr id="2" name="Slide Image Placeholder 1"/>
-          <p:cNvSpPr>
-            <a:spLocks noGrp="1" noRot="1" noChangeAspect="1"/>
-          </p:cNvSpPr>
-          <p:nvPr>
-            <p:ph type="sldImg"/>
-          </p:nvPr>
-        </p:nvSpPr>
-        <p:spPr/>
-      </p:sp>
-      <p:sp>
-        <p:nvSpPr>
-          <p:cNvPr id="3" name="Notes Placeholder 2"/>
-          <p:cNvSpPr>
-            <a:spLocks noGrp="1"/>
-          </p:cNvSpPr>
-          <p:nvPr>
-            <p:ph type="body" idx="1"/>
-          </p:nvPr>
-        </p:nvSpPr>
-        <p:spPr/>
-        <p:txBody>
-          <a:bodyPr/>
-          <a:lstStyle/>
-          <a:p>
-            <a:r>
-              <a:rPr lang="en-US" dirty="0" smtClean="0"/>
-              <a:t>Starvation</a:t>
-            </a:r>
-          </a:p>
-          <a:p>
-            <a:r>
-              <a:rPr lang="en-US" dirty="0" smtClean="0"/>
-              <a:t>For example, suppose an object provides a synchronized method that often takes a long time to return. If one thread invokes this method frequently, other threads that also need frequent synchronized access to the same object will often be blocked.</a:t>
-            </a:r>
-          </a:p>
-          <a:p>
-            <a:r>
-              <a:rPr lang="en-US" dirty="0" err="1" smtClean="0"/>
-              <a:t>Livelock</a:t>
-            </a:r>
-            <a:endParaRPr lang="en-US" dirty="0" smtClean="0"/>
-          </a:p>
-          <a:p>
-            <a:r>
-              <a:rPr lang="en-US" dirty="0" smtClean="0"/>
-              <a:t>This is comparable to two people attempting to pass each other in a corridor: Bob moves to his left to let Emma pass, while Emma moves to his right to let Bob pass. Seeing that they are still blocking each other, Bob moves to his right, while Emma moves to his left. They're still blocking each other, so...</a:t>
-            </a:r>
-            <a:endParaRPr lang="en-US" dirty="0"/>
-          </a:p>
-        </p:txBody>
-      </p:sp>
-      <p:sp>
-        <p:nvSpPr>
-          <p:cNvPr id="4" name="Slide Number Placeholder 3"/>
-          <p:cNvSpPr>
-            <a:spLocks noGrp="1"/>
-          </p:cNvSpPr>
-          <p:nvPr>
-            <p:ph type="sldNum" sz="quarter" idx="10"/>
-          </p:nvPr>
-        </p:nvSpPr>
-        <p:spPr/>
-        <p:txBody>
-          <a:bodyPr/>
-          <a:lstStyle/>
-          <a:p>
             <a:fld id="{56BE3D67-E84A-6F4F-8E3B-3BC46E162796}" type="slidenum">
               <a:rPr lang="en-US" smtClean="0"/>
-              <a:t>28</a:t>
+              <a:t>25</a:t>
             </a:fld>
             <a:endParaRPr lang="en-US"/>
           </a:p>
@@ -6201,139 +5994,19 @@
           <a:lstStyle/>
           <a:p>
             <a:r>
-              <a:rPr lang="en-GB" sz="1200" b="0" i="0" kern="1200" dirty="0" smtClean="0">
-                <a:solidFill>
-                  <a:schemeClr val="tx1"/>
-                </a:solidFill>
-                <a:effectLst/>
-                <a:latin typeface="+mn-lt"/>
-                <a:ea typeface="+mn-ea"/>
-                <a:cs typeface="+mn-cs"/>
-              </a:rPr>
-              <a:t>In computer .science, a </a:t>
-            </a:r>
-            <a:r>
-              <a:rPr lang="en-GB" sz="1200" b="1" i="0" kern="1200" dirty="0" smtClean="0">
-                <a:solidFill>
-                  <a:schemeClr val="tx1"/>
-                </a:solidFill>
-                <a:effectLst/>
-                <a:latin typeface="+mn-lt"/>
-                <a:ea typeface="+mn-ea"/>
-                <a:cs typeface="+mn-cs"/>
-              </a:rPr>
-              <a:t>nondeterministic</a:t>
-            </a:r>
-            <a:r>
-              <a:rPr lang="en-GB" sz="1200" b="0" i="0" kern="1200" dirty="0" smtClean="0">
-                <a:solidFill>
-                  <a:schemeClr val="tx1"/>
-                </a:solidFill>
-                <a:effectLst/>
-                <a:latin typeface="+mn-lt"/>
-                <a:ea typeface="+mn-ea"/>
-                <a:cs typeface="+mn-cs"/>
-              </a:rPr>
-              <a:t> algorithm is an algorithm that can exhibit different behaviours on different runs</a:t>
-            </a:r>
-          </a:p>
-          <a:p>
-            <a:endParaRPr lang="en-NZ" sz="1200" b="0" i="0" kern="1200" dirty="0" smtClean="0">
-              <a:solidFill>
-                <a:schemeClr val="tx1"/>
-              </a:solidFill>
-              <a:effectLst/>
-              <a:latin typeface="+mn-lt"/>
-              <a:ea typeface="+mn-ea"/>
-              <a:cs typeface="+mn-cs"/>
-            </a:endParaRPr>
-          </a:p>
-          <a:p>
-            <a:r>
-              <a:rPr lang="en-NZ" sz="1200" b="0" i="0" kern="1200" dirty="0" smtClean="0">
-                <a:solidFill>
-                  <a:schemeClr val="tx1"/>
-                </a:solidFill>
-                <a:effectLst/>
-                <a:latin typeface="+mn-lt"/>
-                <a:ea typeface="+mn-ea"/>
-                <a:cs typeface="+mn-cs"/>
-              </a:rPr>
-              <a:t>The code is re-ordered at the various stages between for Source code to actual</a:t>
-            </a:r>
-            <a:r>
-              <a:rPr lang="en-NZ" sz="1200" b="0" i="0" kern="1200" baseline="0" dirty="0" smtClean="0">
-                <a:solidFill>
-                  <a:schemeClr val="tx1"/>
-                </a:solidFill>
-                <a:effectLst/>
-                <a:latin typeface="+mn-lt"/>
-                <a:ea typeface="+mn-ea"/>
-                <a:cs typeface="+mn-cs"/>
-              </a:rPr>
-              <a:t> execution, a user cannot predict the re-ordering but can prevent It but </a:t>
-            </a:r>
-            <a:r>
-              <a:rPr lang="en-NZ" sz="1200" b="0" i="0" kern="1200" baseline="0" dirty="0" err="1" smtClean="0">
-                <a:solidFill>
-                  <a:schemeClr val="tx1"/>
-                </a:solidFill>
-                <a:effectLst/>
-                <a:latin typeface="+mn-lt"/>
-                <a:ea typeface="+mn-ea"/>
-                <a:cs typeface="+mn-cs"/>
-              </a:rPr>
-              <a:t>explicity</a:t>
-            </a:r>
-            <a:r>
-              <a:rPr lang="en-NZ" sz="1200" b="0" i="0" kern="1200" baseline="0" dirty="0" smtClean="0">
-                <a:solidFill>
-                  <a:schemeClr val="tx1"/>
-                </a:solidFill>
-                <a:effectLst/>
-                <a:latin typeface="+mn-lt"/>
-                <a:ea typeface="+mn-ea"/>
-                <a:cs typeface="+mn-cs"/>
-              </a:rPr>
-              <a:t> providing the mutable locks.</a:t>
-            </a:r>
-            <a:endParaRPr lang="en-GB" sz="1200" b="0" i="0" kern="1200" dirty="0" smtClean="0">
-              <a:solidFill>
-                <a:schemeClr val="tx1"/>
-              </a:solidFill>
-              <a:effectLst/>
-              <a:latin typeface="+mn-lt"/>
-              <a:ea typeface="+mn-ea"/>
-              <a:cs typeface="+mn-cs"/>
-            </a:endParaRPr>
-          </a:p>
-          <a:p>
-            <a:endParaRPr lang="en-NZ" sz="1200" b="0" i="0" kern="1200" dirty="0" smtClean="0">
-              <a:solidFill>
-                <a:schemeClr val="tx1"/>
-              </a:solidFill>
-              <a:effectLst/>
-              <a:latin typeface="+mn-lt"/>
-              <a:ea typeface="+mn-ea"/>
-              <a:cs typeface="+mn-cs"/>
-            </a:endParaRPr>
-          </a:p>
-          <a:p>
-            <a:r>
-              <a:rPr lang="en-NZ" sz="1200" b="0" i="0" kern="1200" dirty="0" smtClean="0">
-                <a:solidFill>
-                  <a:schemeClr val="tx1"/>
-                </a:solidFill>
-                <a:effectLst/>
-                <a:latin typeface="+mn-lt"/>
-                <a:ea typeface="+mn-ea"/>
-                <a:cs typeface="+mn-cs"/>
-              </a:rPr>
-              <a:t>Reference : http://channel9.msdn.com/Shows/Going+Deep/Cpp-and-Beyond-2012-Herb-Sutter-atomic-Weapons-1-of-2.</a:t>
-            </a:r>
-          </a:p>
-          <a:p>
-            <a:endParaRPr lang="en-GB" dirty="0"/>
+              <a:rPr lang="en-US" dirty="0" smtClean="0"/>
+              <a:t>- If all processes always request resources in a fixed order, there can be no hold-and-wait cycle.</a:t>
+            </a:r>
+          </a:p>
+          <a:p>
+            <a:pPr marL="171450" indent="-171450">
+              <a:buFontTx/>
+              <a:buChar char="-"/>
+            </a:pPr>
+            <a:r>
+              <a:rPr lang="en-US" dirty="0" smtClean="0"/>
+              <a:t>This is usually not a burdensome restriction. It still allows us to have critical sections that involve more than one resource, and use simple lock and unlock operations on individual resources to implement them.</a:t>
+            </a:r>
           </a:p>
         </p:txBody>
       </p:sp>
@@ -6352,9 +6025,9 @@
           <a:bodyPr/>
           <a:lstStyle/>
           <a:p>
-            <a:fld id="{4B5DE452-D96A-B043-A19B-3F6D5B1BBA3B}" type="slidenum">
+            <a:fld id="{56BE3D67-E84A-6F4F-8E3B-3BC46E162796}" type="slidenum">
               <a:rPr lang="en-US" smtClean="0"/>
-              <a:t>10</a:t>
+              <a:t>15</a:t>
             </a:fld>
             <a:endParaRPr lang="en-US"/>
           </a:p>
@@ -6363,7 +6036,7 @@
     </p:spTree>
     <p:extLst>
       <p:ext uri="{BB962C8B-B14F-4D97-AF65-F5344CB8AC3E}">
-        <p14:creationId xmlns:p14="http://schemas.microsoft.com/office/powerpoint/2010/main" val="2945296580"/>
+        <p14:creationId xmlns:p14="http://schemas.microsoft.com/office/powerpoint/2010/main" val="3137412600"/>
       </p:ext>
     </p:extLst>
   </p:cSld>
@@ -6423,7 +6096,7 @@
             </a:pPr>
             <a:r>
               <a:rPr lang="en-US" dirty="0" smtClean="0"/>
-              <a:t>only one process may use a resource at a time.</a:t>
+              <a:t>If processes always request all resources they will need at once, there can be no hold-and-wait</a:t>
             </a:r>
           </a:p>
           <a:p>
@@ -6433,28 +6106,17 @@
             </a:pPr>
             <a:r>
               <a:rPr lang="en-US" dirty="0" smtClean="0"/>
-              <a:t>A process can continue to hold a resource while requesting another.</a:t>
-            </a:r>
-          </a:p>
-          <a:p>
-            <a:pPr marL="171450" indent="-171450">
-              <a:buFontTx/>
-              <a:buChar char="-"/>
-            </a:pPr>
-            <a:r>
-              <a:rPr lang="en-US" dirty="0" smtClean="0"/>
-              <a:t>A process cannot be forced to give up resources before it chooses to give them up.</a:t>
-            </a:r>
-          </a:p>
-          <a:p>
-            <a:pPr marL="171450" indent="-171450">
-              <a:buFontTx/>
-              <a:buChar char="-"/>
-            </a:pPr>
-            <a:r>
-              <a:rPr lang="en-US" dirty="0" smtClean="0"/>
-              <a:t>There is a cycle of hold-and-wait relationships.</a:t>
-            </a:r>
+              <a:t>This allows critical sections that involve more than one resource, but requires the operating system (or resource manager) to provide a way to atomically request several resources at once. Some batch and real-time operating systems support this, but it is not supported, for example, by the POSIX thread </a:t>
+            </a:r>
+            <a:r>
+              <a:rPr lang="en-US" dirty="0" err="1" smtClean="0"/>
+              <a:t>mutex</a:t>
+            </a:r>
+            <a:r>
+              <a:rPr lang="en-US" dirty="0" smtClean="0"/>
+              <a:t> API.</a:t>
+            </a:r>
+            <a:endParaRPr lang="en-US" dirty="0"/>
           </a:p>
         </p:txBody>
       </p:sp>
@@ -6473,7 +6135,7 @@
           <a:bodyPr/>
           <a:lstStyle/>
           <a:p>
-            <a:fld id="{4B5DE452-D96A-B043-A19B-3F6D5B1BBA3B}" type="slidenum">
+            <a:fld id="{56BE3D67-E84A-6F4F-8E3B-3BC46E162796}" type="slidenum">
               <a:rPr lang="en-US" smtClean="0"/>
               <a:t>16</a:t>
             </a:fld>
@@ -6484,7 +6146,7 @@
     </p:spTree>
     <p:extLst>
       <p:ext uri="{BB962C8B-B14F-4D97-AF65-F5344CB8AC3E}">
-        <p14:creationId xmlns:p14="http://schemas.microsoft.com/office/powerpoint/2010/main" val="438134601"/>
+        <p14:creationId xmlns:p14="http://schemas.microsoft.com/office/powerpoint/2010/main" val="603379510"/>
       </p:ext>
     </p:extLst>
   </p:cSld>
@@ -6538,20 +6200,25 @@
           <a:bodyPr/>
           <a:lstStyle/>
           <a:p>
-            <a:r>
-              <a:rPr lang="en-US" dirty="0" smtClean="0"/>
-              <a:t>- If all processes always request resources in a fixed order, there can be no hold-and-wait cycle.</a:t>
-            </a:r>
-          </a:p>
-          <a:p>
             <a:pPr marL="171450" indent="-171450">
               <a:buFontTx/>
               <a:buChar char="-"/>
             </a:pPr>
             <a:r>
               <a:rPr lang="en-US" dirty="0" smtClean="0"/>
-              <a:t>This is usually not a burdensome restriction. It still allows us to have critical sections that involve more than one resource, and use simple lock and unlock operations on individual resources to implement them.</a:t>
-            </a:r>
+              <a:t>If processes always release one resource before requesting another, there can be no hold-and-wait.</a:t>
+            </a:r>
+          </a:p>
+          <a:p>
+            <a:pPr marL="171450" indent="-171450">
+              <a:buFontTx/>
+              <a:buChar char="-"/>
+            </a:pPr>
+            <a:r>
+              <a:rPr lang="en-US" dirty="0" smtClean="0"/>
+              <a:t>This is a tougher restriction. It rules out critical sections that involve more than one resource.</a:t>
+            </a:r>
+            <a:endParaRPr lang="en-US" dirty="0"/>
           </a:p>
         </p:txBody>
       </p:sp>
@@ -6572,7 +6239,7 @@
           <a:p>
             <a:fld id="{56BE3D67-E84A-6F4F-8E3B-3BC46E162796}" type="slidenum">
               <a:rPr lang="en-US" smtClean="0"/>
-              <a:t>18</a:t>
+              <a:t>17</a:t>
             </a:fld>
             <a:endParaRPr lang="en-US"/>
           </a:p>
@@ -6581,7 +6248,7 @@
     </p:spTree>
     <p:extLst>
       <p:ext uri="{BB962C8B-B14F-4D97-AF65-F5344CB8AC3E}">
-        <p14:creationId xmlns:p14="http://schemas.microsoft.com/office/powerpoint/2010/main" val="3137412600"/>
+        <p14:creationId xmlns:p14="http://schemas.microsoft.com/office/powerpoint/2010/main" val="2688967800"/>
       </p:ext>
     </p:extLst>
   </p:cSld>
@@ -6635,31 +6302,33 @@
           <a:bodyPr/>
           <a:lstStyle/>
           <a:p>
-            <a:pPr marL="171450" indent="-171450">
-              <a:buFontTx/>
-              <a:buChar char="-"/>
-            </a:pPr>
-            <a:r>
-              <a:rPr lang="en-US" dirty="0" smtClean="0"/>
-              <a:t>If processes always request all resources they will need at once, there can be no hold-and-wait</a:t>
-            </a:r>
-          </a:p>
-          <a:p>
-            <a:pPr marL="171450" indent="-171450">
-              <a:buFontTx/>
-              <a:buChar char="-"/>
-            </a:pPr>
-            <a:r>
-              <a:rPr lang="en-US" dirty="0" smtClean="0"/>
-              <a:t>This allows critical sections that involve more than one resource, but requires the operating system (or resource manager) to provide a way to atomically request several resources at once. Some batch and real-time operating systems support this, but it is not supported, for example, by the POSIX thread </a:t>
-            </a:r>
-            <a:r>
-              <a:rPr lang="en-US" dirty="0" err="1" smtClean="0"/>
-              <a:t>mutex</a:t>
-            </a:r>
-            <a:r>
-              <a:rPr lang="en-US" dirty="0" smtClean="0"/>
-              <a:t> API.</a:t>
+            <a:r>
+              <a:rPr lang="en-US" dirty="0" smtClean="0"/>
+              <a:t>if threads try to acquire a lock faster than the rate at which a thread can execute the corresponding critical section, then program performance will suffer as threads will form a "convoy" waiting to acquire the lock.</a:t>
+            </a:r>
+          </a:p>
+          <a:p>
+            <a:r>
+              <a:rPr lang="en-US" dirty="0" smtClean="0"/>
+              <a:t>Threads that all use the same lock become queued to use the lock and end up serializing the processing. A 'convoy' is created.</a:t>
+            </a:r>
+          </a:p>
+          <a:p>
+            <a:r>
+              <a:rPr lang="en-US" dirty="0" smtClean="0"/>
+              <a:t>When a high-priority thread needs to acquire a lock held by a low-priority thread, the scheduler bumps up the priority of the blocking thread until the lock is released.</a:t>
+            </a:r>
+          </a:p>
+          <a:p>
+            <a:r>
+              <a:rPr lang="en-US" dirty="0" smtClean="0"/>
+              <a:t>That is certainly the method of choice to eliminate lock contention if it is workable. For example, consider contention for a counter of events. If each thread can have its own private counter, then no lock is necessary. If the total count is required, the counts can be summed after all threads are done counting.</a:t>
+            </a:r>
+          </a:p>
+          <a:p>
+            <a:r>
+              <a:rPr lang="en-US" dirty="0" smtClean="0"/>
+              <a:t>If the lock on a resource cannot be eliminated, consider partitioning the resource and using a separate lock to protect each partition. The partitioning can spread out contention among the locks.</a:t>
             </a:r>
             <a:endParaRPr lang="en-US" dirty="0"/>
           </a:p>
@@ -6680,7 +6349,7 @@
           <a:bodyPr/>
           <a:lstStyle/>
           <a:p>
-            <a:fld id="{56BE3D67-E84A-6F4F-8E3B-3BC46E162796}" type="slidenum">
+            <a:fld id="{4B5DE452-D96A-B043-A19B-3F6D5B1BBA3B}" type="slidenum">
               <a:rPr lang="en-US" smtClean="0"/>
               <a:t>19</a:t>
             </a:fld>
@@ -6691,7 +6360,7 @@
     </p:spTree>
     <p:extLst>
       <p:ext uri="{BB962C8B-B14F-4D97-AF65-F5344CB8AC3E}">
-        <p14:creationId xmlns:p14="http://schemas.microsoft.com/office/powerpoint/2010/main" val="603379510"/>
+        <p14:creationId xmlns:p14="http://schemas.microsoft.com/office/powerpoint/2010/main" val="2738522525"/>
       </p:ext>
     </p:extLst>
   </p:cSld>
@@ -6745,23 +6414,13 @@
           <a:bodyPr/>
           <a:lstStyle/>
           <a:p>
-            <a:pPr marL="171450" indent="-171450">
-              <a:buFontTx/>
-              <a:buChar char="-"/>
-            </a:pPr>
-            <a:r>
-              <a:rPr lang="en-US" dirty="0" smtClean="0"/>
-              <a:t>If processes always release one resource before requesting another, there can be no hold-and-wait.</a:t>
-            </a:r>
-          </a:p>
-          <a:p>
-            <a:pPr marL="171450" indent="-171450">
-              <a:buFontTx/>
-              <a:buChar char="-"/>
-            </a:pPr>
-            <a:r>
-              <a:rPr lang="en-US" dirty="0" smtClean="0"/>
-              <a:t>This is a tougher restriction. It rules out critical sections that involve more than one resource.</a:t>
+            <a:r>
+              <a:rPr lang="en-US" dirty="0" smtClean="0"/>
+              <a:t>90% is</a:t>
+            </a:r>
+            <a:r>
+              <a:rPr lang="en-US" baseline="0" dirty="0" smtClean="0"/>
+              <a:t> a dummy value</a:t>
             </a:r>
             <a:endParaRPr lang="en-US" dirty="0"/>
           </a:p>
@@ -6782,9 +6441,9 @@
           <a:bodyPr/>
           <a:lstStyle/>
           <a:p>
-            <a:fld id="{56BE3D67-E84A-6F4F-8E3B-3BC46E162796}" type="slidenum">
+            <a:fld id="{4B5DE452-D96A-B043-A19B-3F6D5B1BBA3B}" type="slidenum">
               <a:rPr lang="en-US" smtClean="0"/>
-              <a:t>20</a:t>
+              <a:t>21</a:t>
             </a:fld>
             <a:endParaRPr lang="en-US"/>
           </a:p>
@@ -6793,7 +6452,7 @@
     </p:spTree>
     <p:extLst>
       <p:ext uri="{BB962C8B-B14F-4D97-AF65-F5344CB8AC3E}">
-        <p14:creationId xmlns:p14="http://schemas.microsoft.com/office/powerpoint/2010/main" val="2688967800"/>
+        <p14:creationId xmlns:p14="http://schemas.microsoft.com/office/powerpoint/2010/main" val="807505352"/>
       </p:ext>
     </p:extLst>
   </p:cSld>
@@ -10354,6 +10013,14 @@
           <a:bodyPr/>
           <a:lstStyle/>
           <a:p>
+            <a:r>
+              <a:rPr lang="en-US" dirty="0" smtClean="0"/>
+              <a:t>Team: Victor, Nancy, </a:t>
+            </a:r>
+            <a:r>
+              <a:rPr lang="en-US" dirty="0" err="1" smtClean="0"/>
+              <a:t>Aravind</a:t>
+            </a:r>
             <a:endParaRPr lang="en-US" dirty="0"/>
           </a:p>
         </p:txBody>
@@ -10397,6 +10064,29 @@
       </p:grpSpPr>
       <p:sp>
         <p:nvSpPr>
+          <p:cNvPr id="2" name="Subtitle 1"/>
+          <p:cNvSpPr>
+            <a:spLocks noGrp="1"/>
+          </p:cNvSpPr>
+          <p:nvPr>
+            <p:ph type="subTitle" idx="1"/>
+          </p:nvPr>
+        </p:nvSpPr>
+        <p:spPr/>
+        <p:txBody>
+          <a:bodyPr/>
+          <a:lstStyle/>
+          <a:p>
+            <a:r>
+              <a:rPr lang="en-US" dirty="0" smtClean="0"/>
+              <a:t>DEMO</a:t>
+            </a:r>
+            <a:endParaRPr lang="en-US" dirty="0"/>
+          </a:p>
+        </p:txBody>
+      </p:sp>
+      <p:sp>
+        <p:nvSpPr>
           <p:cNvPr id="3" name="Title 2"/>
           <p:cNvSpPr>
             <a:spLocks noGrp="1"/>
@@ -10411,142 +10101,23 @@
           <a:lstStyle/>
           <a:p>
             <a:r>
-              <a:rPr lang="en-NZ" dirty="0" smtClean="0"/>
-              <a:t>Why is it a Pitfall?</a:t>
-            </a:r>
-            <a:endParaRPr lang="en-GB" dirty="0"/>
-          </a:p>
-        </p:txBody>
-      </p:sp>
-      <p:sp>
-        <p:nvSpPr>
-          <p:cNvPr id="5" name="TextBox 4"/>
-          <p:cNvSpPr txBox="1"/>
-          <p:nvPr/>
-        </p:nvSpPr>
-        <p:spPr>
-          <a:xfrm>
-            <a:off x="457200" y="1422286"/>
-            <a:ext cx="6826469" cy="923330"/>
-          </a:xfrm>
-          <a:prstGeom prst="rect">
-            <a:avLst/>
-          </a:prstGeom>
-          <a:noFill/>
-        </p:spPr>
-        <p:txBody>
-          <a:bodyPr wrap="square" rtlCol="0">
-            <a:spAutoFit/>
-          </a:bodyPr>
-          <a:lstStyle/>
-          <a:p>
-            <a:r>
-              <a:rPr lang="en-US" dirty="0" smtClean="0"/>
-              <a:t>It </a:t>
-            </a:r>
-            <a:r>
-              <a:rPr lang="en-US" dirty="0"/>
-              <a:t>is </a:t>
-            </a:r>
-            <a:r>
-              <a:rPr lang="en-US" dirty="0" smtClean="0"/>
-              <a:t>non deterministic : </a:t>
-            </a:r>
-            <a:r>
-              <a:rPr lang="en-GB" dirty="0"/>
-              <a:t>can exhibit different behaviours on different </a:t>
-            </a:r>
-            <a:r>
-              <a:rPr lang="en-GB" dirty="0" smtClean="0"/>
-              <a:t>runs</a:t>
-            </a:r>
-            <a:endParaRPr lang="en-US" dirty="0" smtClean="0"/>
-          </a:p>
-          <a:p>
+              <a:rPr lang="en-US" dirty="0" smtClean="0"/>
+              <a:t>Race condition</a:t>
+            </a:r>
             <a:endParaRPr lang="en-US" dirty="0"/>
-          </a:p>
-          <a:p>
-            <a:r>
-              <a:rPr lang="en-US" dirty="0" smtClean="0"/>
-              <a:t>Why is it </a:t>
-            </a:r>
-            <a:r>
-              <a:rPr lang="en-US" dirty="0"/>
-              <a:t>non deterministic</a:t>
-            </a:r>
-            <a:r>
-              <a:rPr lang="en-US" dirty="0" smtClean="0"/>
-              <a:t>??</a:t>
-            </a:r>
-            <a:endParaRPr lang="en-US" dirty="0"/>
-          </a:p>
-        </p:txBody>
-      </p:sp>
-      <p:graphicFrame>
-        <p:nvGraphicFramePr>
-          <p:cNvPr id="8" name="Diagram 7"/>
-          <p:cNvGraphicFramePr/>
-          <p:nvPr>
-            <p:extLst/>
-          </p:nvPr>
-        </p:nvGraphicFramePr>
-        <p:xfrm>
-          <a:off x="2364828" y="2646600"/>
-          <a:ext cx="3752192" cy="2380593"/>
-        </p:xfrm>
-        <a:graphic>
-          <a:graphicData uri="http://schemas.openxmlformats.org/drawingml/2006/diagram">
-            <dgm:relIds xmlns:dgm="http://schemas.openxmlformats.org/drawingml/2006/diagram" xmlns:r="http://schemas.openxmlformats.org/officeDocument/2006/relationships" r:dm="rId3" r:lo="rId4" r:qs="rId5" r:cs="rId6"/>
-          </a:graphicData>
-        </a:graphic>
-      </p:graphicFrame>
-      <p:sp>
-        <p:nvSpPr>
-          <p:cNvPr id="9" name="Rectangle 8"/>
-          <p:cNvSpPr/>
-          <p:nvPr/>
-        </p:nvSpPr>
-        <p:spPr>
-          <a:xfrm>
-            <a:off x="457200" y="5839995"/>
-            <a:ext cx="8355724" cy="230832"/>
-          </a:xfrm>
-          <a:prstGeom prst="rect">
-            <a:avLst/>
-          </a:prstGeom>
-        </p:spPr>
-        <p:txBody>
-          <a:bodyPr wrap="square">
-            <a:spAutoFit/>
-          </a:bodyPr>
-          <a:lstStyle/>
-          <a:p>
-            <a:r>
-              <a:rPr lang="en-NZ" sz="900" dirty="0"/>
-              <a:t>Reference : http://channel9.msdn.com/Shows/Going+Deep/Cpp-and-Beyond-2012-Herb-Sutter-atomic-Weapons-1-of-2</a:t>
-            </a:r>
-            <a:endParaRPr lang="en-GB" sz="900" dirty="0"/>
           </a:p>
         </p:txBody>
       </p:sp>
     </p:spTree>
     <p:extLst>
       <p:ext uri="{BB962C8B-B14F-4D97-AF65-F5344CB8AC3E}">
-        <p14:creationId xmlns:p14="http://schemas.microsoft.com/office/powerpoint/2010/main" val="4152145040"/>
+        <p14:creationId xmlns:p14="http://schemas.microsoft.com/office/powerpoint/2010/main" val="1867888117"/>
       </p:ext>
     </p:extLst>
   </p:cSld>
   <p:clrMapOvr>
     <a:masterClrMapping/>
   </p:clrMapOvr>
-  <mc:AlternateContent xmlns:mc="http://schemas.openxmlformats.org/markup-compatibility/2006" xmlns:p14="http://schemas.microsoft.com/office/powerpoint/2010/main">
-    <mc:Choice Requires="p14">
-      <p:transition p14:dur="0"/>
-    </mc:Choice>
-    <mc:Fallback xmlns="">
-      <p:transition/>
-    </mc:Fallback>
-  </mc:AlternateContent>
   <p:timing>
     <p:tnLst>
       <p:par>
@@ -10576,6 +10147,114 @@
       </p:grpSpPr>
       <p:sp>
         <p:nvSpPr>
+          <p:cNvPr id="2" name="Content Placeholder 1"/>
+          <p:cNvSpPr>
+            <a:spLocks noGrp="1"/>
+          </p:cNvSpPr>
+          <p:nvPr>
+            <p:ph sz="quarter" idx="13"/>
+          </p:nvPr>
+        </p:nvSpPr>
+        <p:spPr/>
+        <p:txBody>
+          <a:bodyPr>
+            <a:normAutofit/>
+          </a:bodyPr>
+          <a:lstStyle/>
+          <a:p>
+            <a:pPr marL="342900" indent="-342900" algn="l">
+              <a:buFont typeface="Arial"/>
+              <a:buChar char="•"/>
+            </a:pPr>
+            <a:r>
+              <a:rPr lang="en-US" dirty="0" smtClean="0"/>
+              <a:t>IBM researcher [6] explains that, Mutual Exclusion is:</a:t>
+            </a:r>
+          </a:p>
+          <a:p>
+            <a:pPr marL="628650" lvl="1" indent="-342900"/>
+            <a:r>
+              <a:rPr lang="en-US" dirty="0" smtClean="0"/>
+              <a:t>Used to avoid simultaneously accessed to shared data</a:t>
+            </a:r>
+          </a:p>
+          <a:p>
+            <a:pPr marL="628650" lvl="1" indent="-342900"/>
+            <a:r>
+              <a:rPr lang="en-US" dirty="0" smtClean="0"/>
+              <a:t>A way to solve </a:t>
+            </a:r>
+            <a:r>
+              <a:rPr lang="en-US" dirty="0"/>
+              <a:t>Race </a:t>
+            </a:r>
+            <a:r>
+              <a:rPr lang="en-US" dirty="0" smtClean="0"/>
+              <a:t>Condition</a:t>
+            </a:r>
+          </a:p>
+          <a:p>
+            <a:pPr marL="628650" lvl="1" indent="-342900"/>
+            <a:r>
+              <a:rPr lang="en-US" dirty="0" err="1" smtClean="0"/>
+              <a:t>a.k.a</a:t>
+            </a:r>
+            <a:r>
+              <a:rPr lang="en-US" dirty="0" smtClean="0"/>
+              <a:t> Critical Section, Monitor</a:t>
+            </a:r>
+          </a:p>
+          <a:p>
+            <a:pPr marL="342900" indent="-342900">
+              <a:buFont typeface="Arial"/>
+              <a:buChar char="•"/>
+            </a:pPr>
+            <a:endParaRPr lang="en-US" dirty="0" smtClean="0"/>
+          </a:p>
+          <a:p>
+            <a:pPr marL="342900" indent="-342900">
+              <a:buFont typeface="Arial"/>
+              <a:buChar char="•"/>
+            </a:pPr>
+            <a:r>
+              <a:rPr lang="en-US" dirty="0" smtClean="0"/>
+              <a:t>But, it can lead to other problems:</a:t>
+            </a:r>
+          </a:p>
+          <a:p>
+            <a:pPr marL="628650" lvl="1" indent="-342900"/>
+            <a:r>
+              <a:rPr lang="en-US" dirty="0" smtClean="0"/>
+              <a:t>Deadlock</a:t>
+            </a:r>
+          </a:p>
+          <a:p>
+            <a:pPr marL="628650" lvl="1" indent="-342900"/>
+            <a:r>
+              <a:rPr lang="en-US" dirty="0" smtClean="0"/>
+              <a:t>Starvation</a:t>
+            </a:r>
+          </a:p>
+          <a:p>
+            <a:pPr marL="628650" lvl="1" indent="-342900"/>
+            <a:r>
+              <a:rPr lang="en-US" dirty="0" smtClean="0"/>
+              <a:t>Lock </a:t>
+            </a:r>
+            <a:r>
+              <a:rPr lang="en-US" dirty="0" err="1" smtClean="0"/>
+              <a:t>contendency</a:t>
+            </a:r>
+            <a:endParaRPr lang="en-US" dirty="0" smtClean="0"/>
+          </a:p>
+          <a:p>
+            <a:pPr algn="l"/>
+            <a:endParaRPr lang="en-US" dirty="0"/>
+          </a:p>
+        </p:txBody>
+      </p:sp>
+      <p:sp>
+        <p:nvSpPr>
           <p:cNvPr id="3" name="Title 2"/>
           <p:cNvSpPr>
             <a:spLocks noGrp="1"/>
@@ -10590,68 +10269,23 @@
           <a:lstStyle/>
           <a:p>
             <a:r>
-              <a:rPr lang="en-NZ" dirty="0" smtClean="0"/>
-              <a:t>Examples </a:t>
-            </a:r>
-            <a:endParaRPr lang="en-GB" dirty="0"/>
-          </a:p>
-        </p:txBody>
-      </p:sp>
-      <p:sp>
-        <p:nvSpPr>
-          <p:cNvPr id="4" name="TextBox 3"/>
-          <p:cNvSpPr txBox="1"/>
-          <p:nvPr/>
-        </p:nvSpPr>
-        <p:spPr>
-          <a:xfrm>
-            <a:off x="2112579" y="1876097"/>
-            <a:ext cx="5108028" cy="369332"/>
-          </a:xfrm>
-          <a:prstGeom prst="rect">
-            <a:avLst/>
-          </a:prstGeom>
-          <a:noFill/>
-        </p:spPr>
-        <p:txBody>
-          <a:bodyPr wrap="square" rtlCol="0">
-            <a:spAutoFit/>
-          </a:bodyPr>
-          <a:lstStyle/>
-          <a:p>
-            <a:r>
-              <a:rPr lang="en-NZ" dirty="0" smtClean="0"/>
-              <a:t>To be </a:t>
-            </a:r>
-            <a:r>
-              <a:rPr lang="en-NZ" dirty="0" err="1" smtClean="0"/>
-              <a:t>updaded</a:t>
-            </a:r>
-            <a:r>
-              <a:rPr lang="en-NZ" dirty="0" smtClean="0"/>
-              <a:t> if necessary</a:t>
-            </a:r>
-            <a:endParaRPr lang="en-GB" dirty="0"/>
+              <a:rPr lang="en-US" dirty="0" smtClean="0"/>
+              <a:t>Mutual exclusion</a:t>
+            </a:r>
+            <a:endParaRPr lang="en-US" dirty="0"/>
           </a:p>
         </p:txBody>
       </p:sp>
     </p:spTree>
     <p:extLst>
       <p:ext uri="{BB962C8B-B14F-4D97-AF65-F5344CB8AC3E}">
-        <p14:creationId xmlns:p14="http://schemas.microsoft.com/office/powerpoint/2010/main" val="3318955375"/>
+        <p14:creationId xmlns:p14="http://schemas.microsoft.com/office/powerpoint/2010/main" val="3701139686"/>
       </p:ext>
     </p:extLst>
   </p:cSld>
   <p:clrMapOvr>
     <a:masterClrMapping/>
   </p:clrMapOvr>
-  <p:timing>
-    <p:tnLst>
-      <p:par>
-        <p:cTn xmlns:p14="http://schemas.microsoft.com/office/powerpoint/2010/main" id="1" dur="indefinite" restart="never" nodeType="tmRoot"/>
-      </p:par>
-    </p:tnLst>
-  </p:timing>
 </p:sld>
 </file>
 
@@ -10712,7 +10346,7 @@
           <a:p>
             <a:r>
               <a:rPr lang="en-US" dirty="0" smtClean="0"/>
-              <a:t>Race condition</a:t>
+              <a:t>MUTUAL EXCUSION</a:t>
             </a:r>
             <a:endParaRPr lang="en-US" dirty="0"/>
           </a:p>
@@ -10721,20 +10355,13 @@
     </p:spTree>
     <p:extLst>
       <p:ext uri="{BB962C8B-B14F-4D97-AF65-F5344CB8AC3E}">
-        <p14:creationId xmlns:p14="http://schemas.microsoft.com/office/powerpoint/2010/main" val="1867888117"/>
+        <p14:creationId xmlns:p14="http://schemas.microsoft.com/office/powerpoint/2010/main" val="81362325"/>
       </p:ext>
     </p:extLst>
   </p:cSld>
   <p:clrMapOvr>
     <a:masterClrMapping/>
   </p:clrMapOvr>
-  <p:timing>
-    <p:tnLst>
-      <p:par>
-        <p:cTn xmlns:p14="http://schemas.microsoft.com/office/powerpoint/2010/main" id="1" dur="indefinite" restart="never" nodeType="tmRoot"/>
-      </p:par>
-    </p:tnLst>
-  </p:timing>
 </p:sld>
 </file>
 
@@ -10757,6 +10384,116 @@
       </p:grpSpPr>
       <p:sp>
         <p:nvSpPr>
+          <p:cNvPr id="2" name="Content Placeholder 1"/>
+          <p:cNvSpPr>
+            <a:spLocks noGrp="1"/>
+          </p:cNvSpPr>
+          <p:nvPr>
+            <p:ph sz="quarter" idx="13"/>
+          </p:nvPr>
+        </p:nvSpPr>
+        <p:spPr/>
+        <p:txBody>
+          <a:bodyPr>
+            <a:normAutofit fontScale="92500"/>
+          </a:bodyPr>
+          <a:lstStyle/>
+          <a:p>
+            <a:pPr marL="342900" indent="-342900">
+              <a:buFont typeface="Arial"/>
+              <a:buChar char="•"/>
+            </a:pPr>
+            <a:r>
+              <a:rPr lang="en-US" dirty="0"/>
+              <a:t>Permanent blocking of set of processes that either compete for system resources or communicate with each other.</a:t>
+            </a:r>
+          </a:p>
+          <a:p>
+            <a:pPr marL="342900" indent="-342900">
+              <a:buFont typeface="Arial"/>
+              <a:buChar char="•"/>
+            </a:pPr>
+            <a:endParaRPr lang="en-US" dirty="0"/>
+          </a:p>
+          <a:p>
+            <a:pPr marL="342900" indent="-342900">
+              <a:buFont typeface="Arial"/>
+              <a:buChar char="•"/>
+            </a:pPr>
+            <a:r>
+              <a:rPr lang="en-US" dirty="0"/>
+              <a:t>The 4 Necessary Conditions for </a:t>
+            </a:r>
+            <a:r>
+              <a:rPr lang="en-US" dirty="0" smtClean="0"/>
+              <a:t>Deadlock</a:t>
+            </a:r>
+            <a:endParaRPr lang="en-US" dirty="0"/>
+          </a:p>
+          <a:p>
+            <a:pPr marL="628650" lvl="1" indent="-342900"/>
+            <a:r>
+              <a:rPr lang="en-US" dirty="0"/>
+              <a:t>Exclusive access (mutual exclusion</a:t>
+            </a:r>
+            <a:r>
+              <a:rPr lang="en-US" dirty="0" smtClean="0"/>
+              <a:t>)</a:t>
+            </a:r>
+            <a:endParaRPr lang="en-US" dirty="0"/>
+          </a:p>
+          <a:p>
+            <a:pPr marL="628650" lvl="1" indent="-342900"/>
+            <a:r>
+              <a:rPr lang="en-US" dirty="0"/>
+              <a:t>Wait while holding (hold-and-wait</a:t>
+            </a:r>
+            <a:r>
+              <a:rPr lang="en-US" dirty="0" smtClean="0"/>
+              <a:t>)</a:t>
+            </a:r>
+            <a:endParaRPr lang="en-US" dirty="0"/>
+          </a:p>
+          <a:p>
+            <a:pPr marL="628650" lvl="1" indent="-342900"/>
+            <a:r>
+              <a:rPr lang="en-US" dirty="0"/>
+              <a:t>No </a:t>
+            </a:r>
+            <a:r>
+              <a:rPr lang="en-US" dirty="0" smtClean="0"/>
+              <a:t>preemption</a:t>
+            </a:r>
+            <a:endParaRPr lang="en-US" dirty="0"/>
+          </a:p>
+          <a:p>
+            <a:pPr marL="628650" lvl="1" indent="-342900"/>
+            <a:r>
+              <a:rPr lang="en-US" dirty="0"/>
+              <a:t>Circular wait</a:t>
+            </a:r>
+          </a:p>
+          <a:p>
+            <a:pPr marL="342900" indent="-342900">
+              <a:buFont typeface="Arial"/>
+              <a:buChar char="•"/>
+            </a:pPr>
+            <a:endParaRPr lang="en-US" dirty="0"/>
+          </a:p>
+          <a:p>
+            <a:pPr marL="342900" indent="-342900">
+              <a:buFont typeface="Arial"/>
+              <a:buChar char="•"/>
+            </a:pPr>
+            <a:r>
+              <a:rPr lang="en-US" dirty="0"/>
+              <a:t>All of the four conditions are necessary for deadlock to occur. Hence, by preventing any one of them we prevent deadlock.</a:t>
+            </a:r>
+          </a:p>
+        </p:txBody>
+      </p:sp>
+      <p:sp>
+        <p:nvSpPr>
           <p:cNvPr id="3" name="Title 2"/>
           <p:cNvSpPr>
             <a:spLocks noGrp="1"/>
@@ -10771,64 +10508,23 @@
           <a:lstStyle/>
           <a:p>
             <a:r>
-              <a:rPr lang="en-NZ" dirty="0" smtClean="0"/>
-              <a:t>Solutions</a:t>
-            </a:r>
-            <a:endParaRPr lang="en-GB" dirty="0"/>
-          </a:p>
-        </p:txBody>
-      </p:sp>
-      <p:sp>
-        <p:nvSpPr>
-          <p:cNvPr id="5" name="Content Placeholder 4"/>
-          <p:cNvSpPr>
-            <a:spLocks noGrp="1"/>
-          </p:cNvSpPr>
-          <p:nvPr>
-            <p:ph sz="quarter" idx="13"/>
-          </p:nvPr>
-        </p:nvSpPr>
-        <p:spPr/>
-        <p:txBody>
-          <a:bodyPr/>
-          <a:lstStyle/>
-          <a:p>
-            <a:r>
-              <a:rPr lang="en-NZ" dirty="0" smtClean="0"/>
-              <a:t>To be added on later if necessary!!!</a:t>
-            </a:r>
-          </a:p>
-          <a:p>
-            <a:endParaRPr lang="en-NZ" dirty="0"/>
-          </a:p>
-          <a:p>
-            <a:r>
-              <a:rPr lang="en-NZ" dirty="0" smtClean="0"/>
-              <a:t>Mutual Exclusion, Atomics : Anything that can tell the computer not to re-order the required part of the code</a:t>
-            </a:r>
-          </a:p>
-          <a:p>
-            <a:endParaRPr lang="en-GB" dirty="0"/>
+              <a:rPr lang="en-US" dirty="0" smtClean="0"/>
+              <a:t>deadlock</a:t>
+            </a:r>
+            <a:endParaRPr lang="en-US" dirty="0"/>
           </a:p>
         </p:txBody>
       </p:sp>
     </p:spTree>
     <p:extLst>
       <p:ext uri="{BB962C8B-B14F-4D97-AF65-F5344CB8AC3E}">
-        <p14:creationId xmlns:p14="http://schemas.microsoft.com/office/powerpoint/2010/main" val="3189280369"/>
+        <p14:creationId xmlns:p14="http://schemas.microsoft.com/office/powerpoint/2010/main" val="4224616402"/>
       </p:ext>
     </p:extLst>
   </p:cSld>
   <p:clrMapOvr>
     <a:masterClrMapping/>
   </p:clrMapOvr>
-  <p:timing>
-    <p:tnLst>
-      <p:par>
-        <p:cTn xmlns:p14="http://schemas.microsoft.com/office/powerpoint/2010/main" id="1" dur="indefinite" restart="never" nodeType="tmRoot"/>
-      </p:par>
-    </p:tnLst>
-  </p:timing>
 </p:sld>
 </file>
 
@@ -10851,455 +10547,6 @@
       </p:grpSpPr>
       <p:sp>
         <p:nvSpPr>
-          <p:cNvPr id="2" name="Content Placeholder 1"/>
-          <p:cNvSpPr>
-            <a:spLocks noGrp="1"/>
-          </p:cNvSpPr>
-          <p:nvPr>
-            <p:ph sz="quarter" idx="13"/>
-          </p:nvPr>
-        </p:nvSpPr>
-        <p:spPr/>
-        <p:txBody>
-          <a:bodyPr>
-            <a:normAutofit/>
-          </a:bodyPr>
-          <a:lstStyle/>
-          <a:p>
-            <a:pPr marL="342900" indent="-342900" algn="l">
-              <a:buFont typeface="Arial"/>
-              <a:buChar char="•"/>
-            </a:pPr>
-            <a:r>
-              <a:rPr lang="en-US" dirty="0" smtClean="0"/>
-              <a:t>IBM researcher [6] explains that, Mutual Exclusion is:</a:t>
-            </a:r>
-          </a:p>
-          <a:p>
-            <a:pPr marL="628650" lvl="1" indent="-342900"/>
-            <a:r>
-              <a:rPr lang="en-US" dirty="0" smtClean="0"/>
-              <a:t>Used to avoid simultaneously accessed to shared data</a:t>
-            </a:r>
-          </a:p>
-          <a:p>
-            <a:pPr marL="628650" lvl="1" indent="-342900"/>
-            <a:r>
-              <a:rPr lang="en-US" dirty="0" smtClean="0"/>
-              <a:t>A way to solve </a:t>
-            </a:r>
-            <a:r>
-              <a:rPr lang="en-US" dirty="0"/>
-              <a:t>Race </a:t>
-            </a:r>
-            <a:r>
-              <a:rPr lang="en-US" dirty="0" smtClean="0"/>
-              <a:t>Condition</a:t>
-            </a:r>
-          </a:p>
-          <a:p>
-            <a:pPr marL="628650" lvl="1" indent="-342900"/>
-            <a:r>
-              <a:rPr lang="en-US" dirty="0" err="1" smtClean="0"/>
-              <a:t>a.k.a</a:t>
-            </a:r>
-            <a:r>
-              <a:rPr lang="en-US" dirty="0" smtClean="0"/>
-              <a:t> Critical Section, Monitor</a:t>
-            </a:r>
-          </a:p>
-          <a:p>
-            <a:pPr marL="342900" indent="-342900">
-              <a:buFont typeface="Arial"/>
-              <a:buChar char="•"/>
-            </a:pPr>
-            <a:endParaRPr lang="en-US" dirty="0" smtClean="0"/>
-          </a:p>
-          <a:p>
-            <a:pPr marL="342900" indent="-342900">
-              <a:buFont typeface="Arial"/>
-              <a:buChar char="•"/>
-            </a:pPr>
-            <a:r>
-              <a:rPr lang="en-US" dirty="0" smtClean="0"/>
-              <a:t>But, it can lead to other problems:</a:t>
-            </a:r>
-          </a:p>
-          <a:p>
-            <a:pPr marL="628650" lvl="1" indent="-342900"/>
-            <a:r>
-              <a:rPr lang="en-US" dirty="0" smtClean="0"/>
-              <a:t>Deadlock</a:t>
-            </a:r>
-          </a:p>
-          <a:p>
-            <a:pPr marL="628650" lvl="1" indent="-342900"/>
-            <a:r>
-              <a:rPr lang="en-US" dirty="0" smtClean="0"/>
-              <a:t>Starvation</a:t>
-            </a:r>
-          </a:p>
-          <a:p>
-            <a:pPr marL="628650" lvl="1" indent="-342900"/>
-            <a:r>
-              <a:rPr lang="en-US" dirty="0" smtClean="0"/>
-              <a:t>Lock </a:t>
-            </a:r>
-            <a:r>
-              <a:rPr lang="en-US" dirty="0" err="1" smtClean="0"/>
-              <a:t>contendency</a:t>
-            </a:r>
-            <a:endParaRPr lang="en-US" dirty="0" smtClean="0"/>
-          </a:p>
-          <a:p>
-            <a:pPr algn="l"/>
-            <a:endParaRPr lang="en-US" dirty="0"/>
-          </a:p>
-        </p:txBody>
-      </p:sp>
-      <p:sp>
-        <p:nvSpPr>
-          <p:cNvPr id="3" name="Title 2"/>
-          <p:cNvSpPr>
-            <a:spLocks noGrp="1"/>
-          </p:cNvSpPr>
-          <p:nvPr>
-            <p:ph type="title"/>
-          </p:nvPr>
-        </p:nvSpPr>
-        <p:spPr/>
-        <p:txBody>
-          <a:bodyPr/>
-          <a:lstStyle/>
-          <a:p>
-            <a:r>
-              <a:rPr lang="en-US" dirty="0" smtClean="0"/>
-              <a:t>Mutual exclusion</a:t>
-            </a:r>
-            <a:endParaRPr lang="en-US" dirty="0"/>
-          </a:p>
-        </p:txBody>
-      </p:sp>
-    </p:spTree>
-    <p:extLst>
-      <p:ext uri="{BB962C8B-B14F-4D97-AF65-F5344CB8AC3E}">
-        <p14:creationId xmlns:p14="http://schemas.microsoft.com/office/powerpoint/2010/main" val="3701139686"/>
-      </p:ext>
-    </p:extLst>
-  </p:cSld>
-  <p:clrMapOvr>
-    <a:masterClrMapping/>
-  </p:clrMapOvr>
-</p:sld>
-</file>
-
-<file path=ppt/slides/slide15.xml><?xml version="1.0" encoding="utf-8"?>
-<p:sld xmlns:a="http://schemas.openxmlformats.org/drawingml/2006/main" xmlns:r="http://schemas.openxmlformats.org/officeDocument/2006/relationships" xmlns:p="http://schemas.openxmlformats.org/presentationml/2006/main">
-  <p:cSld>
-    <p:spTree>
-      <p:nvGrpSpPr>
-        <p:cNvPr id="1" name=""/>
-        <p:cNvGrpSpPr/>
-        <p:nvPr/>
-      </p:nvGrpSpPr>
-      <p:grpSpPr>
-        <a:xfrm>
-          <a:off x="0" y="0"/>
-          <a:ext cx="0" cy="0"/>
-          <a:chOff x="0" y="0"/>
-          <a:chExt cx="0" cy="0"/>
-        </a:xfrm>
-      </p:grpSpPr>
-      <p:sp>
-        <p:nvSpPr>
-          <p:cNvPr id="2" name="Subtitle 1"/>
-          <p:cNvSpPr>
-            <a:spLocks noGrp="1"/>
-          </p:cNvSpPr>
-          <p:nvPr>
-            <p:ph type="subTitle" idx="1"/>
-          </p:nvPr>
-        </p:nvSpPr>
-        <p:spPr/>
-        <p:txBody>
-          <a:bodyPr/>
-          <a:lstStyle/>
-          <a:p>
-            <a:r>
-              <a:rPr lang="en-US" dirty="0" smtClean="0"/>
-              <a:t>DEMO</a:t>
-            </a:r>
-            <a:endParaRPr lang="en-US" dirty="0"/>
-          </a:p>
-        </p:txBody>
-      </p:sp>
-      <p:sp>
-        <p:nvSpPr>
-          <p:cNvPr id="3" name="Title 2"/>
-          <p:cNvSpPr>
-            <a:spLocks noGrp="1"/>
-          </p:cNvSpPr>
-          <p:nvPr>
-            <p:ph type="title"/>
-          </p:nvPr>
-        </p:nvSpPr>
-        <p:spPr/>
-        <p:txBody>
-          <a:bodyPr/>
-          <a:lstStyle/>
-          <a:p>
-            <a:r>
-              <a:rPr lang="en-US" dirty="0" smtClean="0"/>
-              <a:t>MUTUAL EXCUSION</a:t>
-            </a:r>
-            <a:endParaRPr lang="en-US" dirty="0"/>
-          </a:p>
-        </p:txBody>
-      </p:sp>
-    </p:spTree>
-    <p:extLst>
-      <p:ext uri="{BB962C8B-B14F-4D97-AF65-F5344CB8AC3E}">
-        <p14:creationId xmlns:p14="http://schemas.microsoft.com/office/powerpoint/2010/main" val="81362325"/>
-      </p:ext>
-    </p:extLst>
-  </p:cSld>
-  <p:clrMapOvr>
-    <a:masterClrMapping/>
-  </p:clrMapOvr>
-</p:sld>
-</file>
-
-<file path=ppt/slides/slide16.xml><?xml version="1.0" encoding="utf-8"?>
-<p:sld xmlns:a="http://schemas.openxmlformats.org/drawingml/2006/main" xmlns:r="http://schemas.openxmlformats.org/officeDocument/2006/relationships" xmlns:p="http://schemas.openxmlformats.org/presentationml/2006/main">
-  <p:cSld>
-    <p:spTree>
-      <p:nvGrpSpPr>
-        <p:cNvPr id="1" name=""/>
-        <p:cNvGrpSpPr/>
-        <p:nvPr/>
-      </p:nvGrpSpPr>
-      <p:grpSpPr>
-        <a:xfrm>
-          <a:off x="0" y="0"/>
-          <a:ext cx="0" cy="0"/>
-          <a:chOff x="0" y="0"/>
-          <a:chExt cx="0" cy="0"/>
-        </a:xfrm>
-      </p:grpSpPr>
-      <p:sp>
-        <p:nvSpPr>
-          <p:cNvPr id="2" name="Content Placeholder 1"/>
-          <p:cNvSpPr>
-            <a:spLocks noGrp="1"/>
-          </p:cNvSpPr>
-          <p:nvPr>
-            <p:ph sz="quarter" idx="13"/>
-          </p:nvPr>
-        </p:nvSpPr>
-        <p:spPr/>
-        <p:txBody>
-          <a:bodyPr>
-            <a:normAutofit fontScale="77500" lnSpcReduction="20000"/>
-          </a:bodyPr>
-          <a:lstStyle/>
-          <a:p>
-            <a:r>
-              <a:rPr lang="en-US" dirty="0">
-                <a:latin typeface="Comic Sans MS"/>
-                <a:cs typeface="Comic Sans MS"/>
-              </a:rPr>
-              <a:t>Permanent blocking of set of processes that either compete for system resources or communicate with each other.</a:t>
-            </a:r>
-          </a:p>
-          <a:p>
-            <a:endParaRPr lang="en-US" dirty="0" smtClean="0">
-              <a:latin typeface="Comic Sans MS"/>
-              <a:cs typeface="Comic Sans MS"/>
-            </a:endParaRPr>
-          </a:p>
-          <a:p>
-            <a:r>
-              <a:rPr lang="en-US" dirty="0" smtClean="0">
-                <a:latin typeface="Comic Sans MS"/>
-                <a:cs typeface="Comic Sans MS"/>
-              </a:rPr>
-              <a:t>The </a:t>
-            </a:r>
-            <a:r>
-              <a:rPr lang="en-US" dirty="0">
-                <a:latin typeface="Comic Sans MS"/>
-                <a:cs typeface="Comic Sans MS"/>
-              </a:rPr>
-              <a:t>4 Necessary Conditions for Deadlock</a:t>
-            </a:r>
-          </a:p>
-          <a:p>
-            <a:endParaRPr lang="en-US" dirty="0">
-              <a:latin typeface="Comic Sans MS"/>
-              <a:cs typeface="Comic Sans MS"/>
-            </a:endParaRPr>
-          </a:p>
-          <a:p>
-            <a:pPr marL="342900" indent="-342900">
-              <a:buFont typeface="Arial"/>
-              <a:buChar char="•"/>
-            </a:pPr>
-            <a:r>
-              <a:rPr lang="en-US" dirty="0">
-                <a:latin typeface="Comic Sans MS"/>
-                <a:cs typeface="Comic Sans MS"/>
-              </a:rPr>
-              <a:t>Exclusive access (mutual exclusion)</a:t>
-            </a:r>
-          </a:p>
-          <a:p>
-            <a:r>
-              <a:rPr lang="en-US" dirty="0">
-                <a:latin typeface="Comic Sans MS"/>
-                <a:cs typeface="Comic Sans MS"/>
-              </a:rPr>
-              <a:t>	</a:t>
-            </a:r>
-          </a:p>
-          <a:p>
-            <a:pPr marL="342900" indent="-342900">
-              <a:buFont typeface="Arial"/>
-              <a:buChar char="•"/>
-            </a:pPr>
-            <a:r>
-              <a:rPr lang="en-US" dirty="0">
-                <a:latin typeface="Comic Sans MS"/>
-                <a:cs typeface="Comic Sans MS"/>
-              </a:rPr>
-              <a:t>Wait while holding (hold-and-wait)</a:t>
-            </a:r>
-          </a:p>
-          <a:p>
-            <a:r>
-              <a:rPr lang="en-US" dirty="0">
-                <a:latin typeface="Comic Sans MS"/>
-                <a:cs typeface="Comic Sans MS"/>
-              </a:rPr>
-              <a:t>	</a:t>
-            </a:r>
-          </a:p>
-          <a:p>
-            <a:pPr marL="342900" indent="-342900">
-              <a:buFont typeface="Arial"/>
-              <a:buChar char="•"/>
-            </a:pPr>
-            <a:r>
-              <a:rPr lang="en-US" dirty="0">
-                <a:latin typeface="Comic Sans MS"/>
-                <a:cs typeface="Comic Sans MS"/>
-              </a:rPr>
-              <a:t>No preemption</a:t>
-            </a:r>
-          </a:p>
-          <a:p>
-            <a:r>
-              <a:rPr lang="en-US" dirty="0">
-                <a:latin typeface="Comic Sans MS"/>
-                <a:cs typeface="Comic Sans MS"/>
-              </a:rPr>
-              <a:t>	</a:t>
-            </a:r>
-          </a:p>
-          <a:p>
-            <a:pPr marL="342900" indent="-342900">
-              <a:buFont typeface="Arial"/>
-              <a:buChar char="•"/>
-            </a:pPr>
-            <a:r>
-              <a:rPr lang="en-US" dirty="0">
-                <a:latin typeface="Comic Sans MS"/>
-                <a:cs typeface="Comic Sans MS"/>
-              </a:rPr>
-              <a:t>Circular </a:t>
-            </a:r>
-            <a:r>
-              <a:rPr lang="en-US" dirty="0" smtClean="0">
-                <a:latin typeface="Comic Sans MS"/>
-                <a:cs typeface="Comic Sans MS"/>
-              </a:rPr>
-              <a:t>wait</a:t>
-            </a:r>
-          </a:p>
-          <a:p>
-            <a:endParaRPr lang="en-US" dirty="0">
-              <a:latin typeface="Comic Sans MS"/>
-              <a:cs typeface="Comic Sans MS"/>
-            </a:endParaRPr>
-          </a:p>
-          <a:p>
-            <a:r>
-              <a:rPr lang="en-US" dirty="0"/>
-              <a:t>All of the four conditions are necessary for deadlock to occur. Hence, by preventing any one of them we prevent deadlock.</a:t>
-            </a:r>
-          </a:p>
-          <a:p>
-            <a:endParaRPr lang="en-US" dirty="0">
-              <a:latin typeface="Comic Sans MS"/>
-              <a:cs typeface="Comic Sans MS"/>
-            </a:endParaRPr>
-          </a:p>
-        </p:txBody>
-      </p:sp>
-      <p:sp>
-        <p:nvSpPr>
-          <p:cNvPr id="3" name="Title 2"/>
-          <p:cNvSpPr>
-            <a:spLocks noGrp="1"/>
-          </p:cNvSpPr>
-          <p:nvPr>
-            <p:ph type="title"/>
-          </p:nvPr>
-        </p:nvSpPr>
-        <p:spPr/>
-        <p:txBody>
-          <a:bodyPr/>
-          <a:lstStyle/>
-          <a:p>
-            <a:r>
-              <a:rPr lang="en-US" dirty="0" smtClean="0"/>
-              <a:t>Deadlock</a:t>
-            </a:r>
-            <a:endParaRPr lang="en-US" dirty="0"/>
-          </a:p>
-        </p:txBody>
-      </p:sp>
-    </p:spTree>
-    <p:extLst>
-      <p:ext uri="{BB962C8B-B14F-4D97-AF65-F5344CB8AC3E}">
-        <p14:creationId xmlns:p14="http://schemas.microsoft.com/office/powerpoint/2010/main" val="2573522007"/>
-      </p:ext>
-    </p:extLst>
-  </p:cSld>
-  <p:clrMapOvr>
-    <a:masterClrMapping/>
-  </p:clrMapOvr>
-</p:sld>
-</file>
-
-<file path=ppt/slides/slide17.xml><?xml version="1.0" encoding="utf-8"?>
-<p:sld xmlns:a="http://schemas.openxmlformats.org/drawingml/2006/main" xmlns:r="http://schemas.openxmlformats.org/officeDocument/2006/relationships" xmlns:p="http://schemas.openxmlformats.org/presentationml/2006/main">
-  <p:cSld>
-    <p:spTree>
-      <p:nvGrpSpPr>
-        <p:cNvPr id="1" name=""/>
-        <p:cNvGrpSpPr/>
-        <p:nvPr/>
-      </p:nvGrpSpPr>
-      <p:grpSpPr>
-        <a:xfrm>
-          <a:off x="0" y="0"/>
-          <a:ext cx="0" cy="0"/>
-          <a:chOff x="0" y="0"/>
-          <a:chExt cx="0" cy="0"/>
-        </a:xfrm>
-      </p:grpSpPr>
-      <p:sp>
-        <p:nvSpPr>
           <p:cNvPr id="2" name="Subtitle 1"/>
           <p:cNvSpPr>
             <a:spLocks noGrp="1"/>
@@ -11365,7 +10612,7 @@
 </p:sld>
 </file>
 
-<file path=ppt/slides/slide18.xml><?xml version="1.0" encoding="utf-8"?>
+<file path=ppt/slides/slide15.xml><?xml version="1.0" encoding="utf-8"?>
 <p:sld xmlns:a="http://schemas.openxmlformats.org/drawingml/2006/main" xmlns:r="http://schemas.openxmlformats.org/officeDocument/2006/relationships" xmlns:p="http://schemas.openxmlformats.org/presentationml/2006/main">
   <p:cSld>
     <p:spTree>
@@ -11980,7 +11227,7 @@
 </p:sld>
 </file>
 
-<file path=ppt/slides/slide19.xml><?xml version="1.0" encoding="utf-8"?>
+<file path=ppt/slides/slide16.xml><?xml version="1.0" encoding="utf-8"?>
 <p:sld xmlns:a="http://schemas.openxmlformats.org/drawingml/2006/main" xmlns:r="http://schemas.openxmlformats.org/officeDocument/2006/relationships" xmlns:p="http://schemas.openxmlformats.org/presentationml/2006/main">
   <p:cSld>
     <p:spTree>
@@ -12301,6 +11548,594 @@
       </p:par>
     </p:tnLst>
   </p:timing>
+</p:sld>
+</file>
+
+<file path=ppt/slides/slide17.xml><?xml version="1.0" encoding="utf-8"?>
+<p:sld xmlns:a="http://schemas.openxmlformats.org/drawingml/2006/main" xmlns:r="http://schemas.openxmlformats.org/officeDocument/2006/relationships" xmlns:p="http://schemas.openxmlformats.org/presentationml/2006/main">
+  <p:cSld>
+    <p:spTree>
+      <p:nvGrpSpPr>
+        <p:cNvPr id="1" name=""/>
+        <p:cNvGrpSpPr/>
+        <p:nvPr/>
+      </p:nvGrpSpPr>
+      <p:grpSpPr>
+        <a:xfrm>
+          <a:off x="0" y="0"/>
+          <a:ext cx="0" cy="0"/>
+          <a:chOff x="0" y="0"/>
+          <a:chExt cx="0" cy="0"/>
+        </a:xfrm>
+      </p:grpSpPr>
+      <p:sp>
+        <p:nvSpPr>
+          <p:cNvPr id="2" name="Content Placeholder 1"/>
+          <p:cNvSpPr>
+            <a:spLocks noGrp="1"/>
+          </p:cNvSpPr>
+          <p:nvPr>
+            <p:ph sz="quarter" idx="13"/>
+          </p:nvPr>
+        </p:nvSpPr>
+        <p:spPr/>
+        <p:txBody>
+          <a:bodyPr/>
+          <a:lstStyle/>
+          <a:p>
+            <a:pPr algn="l"/>
+            <a:r>
+              <a:rPr lang="en-US" dirty="0"/>
+              <a:t>Process P1:</a:t>
+            </a:r>
+          </a:p>
+          <a:p>
+            <a:pPr algn="l"/>
+            <a:r>
+              <a:rPr lang="en-US" dirty="0"/>
+              <a:t>request(R1)</a:t>
+            </a:r>
+            <a:r>
+              <a:rPr lang="en-US" dirty="0" smtClean="0"/>
+              <a:t>;…	release</a:t>
+            </a:r>
+            <a:r>
+              <a:rPr lang="en-US" dirty="0"/>
+              <a:t>(R1</a:t>
+            </a:r>
+            <a:r>
+              <a:rPr lang="en-US" dirty="0" smtClean="0"/>
+              <a:t>); request</a:t>
+            </a:r>
+            <a:r>
+              <a:rPr lang="en-US" dirty="0"/>
+              <a:t>(R2)</a:t>
+            </a:r>
+            <a:r>
+              <a:rPr lang="en-US" dirty="0" smtClean="0"/>
+              <a:t>;…	release</a:t>
+            </a:r>
+            <a:r>
+              <a:rPr lang="en-US" dirty="0"/>
+              <a:t>(R2</a:t>
+            </a:r>
+            <a:r>
+              <a:rPr lang="en-US" dirty="0" smtClean="0"/>
+              <a:t>);</a:t>
+            </a:r>
+            <a:endParaRPr lang="en-US" dirty="0"/>
+          </a:p>
+          <a:p>
+            <a:pPr algn="l"/>
+            <a:endParaRPr lang="en-US" dirty="0"/>
+          </a:p>
+          <a:p>
+            <a:pPr algn="l"/>
+            <a:endParaRPr lang="en-US" dirty="0"/>
+          </a:p>
+          <a:p>
+            <a:pPr algn="l"/>
+            <a:endParaRPr lang="en-US" dirty="0"/>
+          </a:p>
+          <a:p>
+            <a:pPr algn="l"/>
+            <a:r>
+              <a:rPr lang="en-US" dirty="0"/>
+              <a:t>Process P2:</a:t>
+            </a:r>
+          </a:p>
+          <a:p>
+            <a:pPr algn="l"/>
+            <a:r>
+              <a:rPr lang="en-US" dirty="0"/>
+              <a:t>request(</a:t>
+            </a:r>
+            <a:r>
+              <a:rPr lang="en-US" dirty="0" smtClean="0"/>
+              <a:t>R2)</a:t>
+            </a:r>
+            <a:r>
+              <a:rPr lang="en-US" dirty="0"/>
+              <a:t>;..</a:t>
+            </a:r>
+            <a:r>
+              <a:rPr lang="en-US" dirty="0" smtClean="0"/>
+              <a:t>.		</a:t>
+            </a:r>
+            <a:r>
+              <a:rPr lang="en-US" dirty="0"/>
+              <a:t>release(R2)</a:t>
+            </a:r>
+            <a:r>
+              <a:rPr lang="en-US" dirty="0" smtClean="0"/>
+              <a:t>; request</a:t>
+            </a:r>
+            <a:r>
+              <a:rPr lang="en-US" dirty="0"/>
+              <a:t>(</a:t>
+            </a:r>
+            <a:r>
+              <a:rPr lang="en-US" dirty="0" smtClean="0"/>
+              <a:t>R1);	release</a:t>
+            </a:r>
+            <a:r>
+              <a:rPr lang="en-US" dirty="0"/>
+              <a:t>(R1)</a:t>
+            </a:r>
+            <a:r>
+              <a:rPr lang="en-US" dirty="0" smtClean="0"/>
+              <a:t>;</a:t>
+            </a:r>
+            <a:endParaRPr lang="en-US" dirty="0"/>
+          </a:p>
+        </p:txBody>
+      </p:sp>
+      <p:sp>
+        <p:nvSpPr>
+          <p:cNvPr id="3" name="Title 2"/>
+          <p:cNvSpPr>
+            <a:spLocks noGrp="1"/>
+          </p:cNvSpPr>
+          <p:nvPr>
+            <p:ph type="title"/>
+          </p:nvPr>
+        </p:nvSpPr>
+        <p:spPr/>
+        <p:txBody>
+          <a:bodyPr/>
+          <a:lstStyle/>
+          <a:p>
+            <a:r>
+              <a:rPr lang="en-US" dirty="0"/>
+              <a:t>Release Before Request</a:t>
+            </a:r>
+          </a:p>
+        </p:txBody>
+      </p:sp>
+      <p:sp>
+        <p:nvSpPr>
+          <p:cNvPr id="4" name="Rectangle 3"/>
+          <p:cNvSpPr/>
+          <p:nvPr/>
+        </p:nvSpPr>
+        <p:spPr>
+          <a:xfrm>
+            <a:off x="1598825" y="2540307"/>
+            <a:ext cx="2144253" cy="329910"/>
+          </a:xfrm>
+          <a:prstGeom prst="rect">
+            <a:avLst/>
+          </a:prstGeom>
+          <a:solidFill>
+            <a:srgbClr val="FF0000"/>
+          </a:solidFill>
+        </p:spPr>
+        <p:style>
+          <a:lnRef idx="1">
+            <a:schemeClr val="accent1"/>
+          </a:lnRef>
+          <a:fillRef idx="3">
+            <a:schemeClr val="accent1"/>
+          </a:fillRef>
+          <a:effectRef idx="2">
+            <a:schemeClr val="accent1"/>
+          </a:effectRef>
+          <a:fontRef idx="minor">
+            <a:schemeClr val="lt1"/>
+          </a:fontRef>
+        </p:style>
+        <p:txBody>
+          <a:bodyPr rtlCol="0" anchor="ctr"/>
+          <a:lstStyle/>
+          <a:p>
+            <a:pPr algn="ctr"/>
+            <a:r>
+              <a:rPr lang="en-US" dirty="0" smtClean="0"/>
+              <a:t>R1 Critical Section</a:t>
+            </a:r>
+            <a:endParaRPr lang="en-US" dirty="0"/>
+          </a:p>
+        </p:txBody>
+      </p:sp>
+      <p:sp>
+        <p:nvSpPr>
+          <p:cNvPr id="5" name="Rectangle 4"/>
+          <p:cNvSpPr/>
+          <p:nvPr/>
+        </p:nvSpPr>
+        <p:spPr>
+          <a:xfrm>
+            <a:off x="5520505" y="2540307"/>
+            <a:ext cx="2144253" cy="329910"/>
+          </a:xfrm>
+          <a:prstGeom prst="rect">
+            <a:avLst/>
+          </a:prstGeom>
+        </p:spPr>
+        <p:style>
+          <a:lnRef idx="1">
+            <a:schemeClr val="accent1"/>
+          </a:lnRef>
+          <a:fillRef idx="3">
+            <a:schemeClr val="accent1"/>
+          </a:fillRef>
+          <a:effectRef idx="2">
+            <a:schemeClr val="accent1"/>
+          </a:effectRef>
+          <a:fontRef idx="minor">
+            <a:schemeClr val="lt1"/>
+          </a:fontRef>
+        </p:style>
+        <p:txBody>
+          <a:bodyPr rtlCol="0" anchor="ctr"/>
+          <a:lstStyle/>
+          <a:p>
+            <a:pPr algn="ctr"/>
+            <a:r>
+              <a:rPr lang="en-US" dirty="0" smtClean="0"/>
+              <a:t>R2 Critical Section</a:t>
+            </a:r>
+            <a:endParaRPr lang="en-US" dirty="0"/>
+          </a:p>
+        </p:txBody>
+      </p:sp>
+      <p:sp>
+        <p:nvSpPr>
+          <p:cNvPr id="6" name="Rectangle 5"/>
+          <p:cNvSpPr/>
+          <p:nvPr/>
+        </p:nvSpPr>
+        <p:spPr>
+          <a:xfrm>
+            <a:off x="1598825" y="5002075"/>
+            <a:ext cx="2144253" cy="329910"/>
+          </a:xfrm>
+          <a:prstGeom prst="rect">
+            <a:avLst/>
+          </a:prstGeom>
+        </p:spPr>
+        <p:style>
+          <a:lnRef idx="1">
+            <a:schemeClr val="accent1"/>
+          </a:lnRef>
+          <a:fillRef idx="3">
+            <a:schemeClr val="accent1"/>
+          </a:fillRef>
+          <a:effectRef idx="2">
+            <a:schemeClr val="accent1"/>
+          </a:effectRef>
+          <a:fontRef idx="minor">
+            <a:schemeClr val="lt1"/>
+          </a:fontRef>
+        </p:style>
+        <p:txBody>
+          <a:bodyPr rtlCol="0" anchor="ctr"/>
+          <a:lstStyle/>
+          <a:p>
+            <a:pPr algn="ctr"/>
+            <a:r>
+              <a:rPr lang="en-US" dirty="0" smtClean="0"/>
+              <a:t>R2 Critical Section</a:t>
+            </a:r>
+            <a:endParaRPr lang="en-US" dirty="0"/>
+          </a:p>
+        </p:txBody>
+      </p:sp>
+      <p:sp>
+        <p:nvSpPr>
+          <p:cNvPr id="7" name="Rectangle 6"/>
+          <p:cNvSpPr/>
+          <p:nvPr/>
+        </p:nvSpPr>
+        <p:spPr>
+          <a:xfrm>
+            <a:off x="5520505" y="5002075"/>
+            <a:ext cx="2144253" cy="329910"/>
+          </a:xfrm>
+          <a:prstGeom prst="rect">
+            <a:avLst/>
+          </a:prstGeom>
+          <a:solidFill>
+            <a:srgbClr val="FF0000"/>
+          </a:solidFill>
+        </p:spPr>
+        <p:style>
+          <a:lnRef idx="1">
+            <a:schemeClr val="accent1"/>
+          </a:lnRef>
+          <a:fillRef idx="3">
+            <a:schemeClr val="accent1"/>
+          </a:fillRef>
+          <a:effectRef idx="2">
+            <a:schemeClr val="accent1"/>
+          </a:effectRef>
+          <a:fontRef idx="minor">
+            <a:schemeClr val="lt1"/>
+          </a:fontRef>
+        </p:style>
+        <p:txBody>
+          <a:bodyPr rtlCol="0" anchor="ctr"/>
+          <a:lstStyle/>
+          <a:p>
+            <a:pPr algn="ctr"/>
+            <a:r>
+              <a:rPr lang="en-US" dirty="0" smtClean="0"/>
+              <a:t>R1 Critical Section</a:t>
+            </a:r>
+            <a:endParaRPr lang="en-US" dirty="0"/>
+          </a:p>
+        </p:txBody>
+      </p:sp>
+    </p:spTree>
+    <p:extLst>
+      <p:ext uri="{BB962C8B-B14F-4D97-AF65-F5344CB8AC3E}">
+        <p14:creationId xmlns:p14="http://schemas.microsoft.com/office/powerpoint/2010/main" val="1963981522"/>
+      </p:ext>
+    </p:extLst>
+  </p:cSld>
+  <p:clrMapOvr>
+    <a:masterClrMapping/>
+  </p:clrMapOvr>
+  <p:timing>
+    <p:tnLst>
+      <p:par>
+        <p:cTn xmlns:p14="http://schemas.microsoft.com/office/powerpoint/2010/main" id="1" dur="indefinite" restart="never" nodeType="tmRoot"/>
+      </p:par>
+    </p:tnLst>
+  </p:timing>
+</p:sld>
+</file>
+
+<file path=ppt/slides/slide18.xml><?xml version="1.0" encoding="utf-8"?>
+<p:sld xmlns:a="http://schemas.openxmlformats.org/drawingml/2006/main" xmlns:r="http://schemas.openxmlformats.org/officeDocument/2006/relationships" xmlns:p="http://schemas.openxmlformats.org/presentationml/2006/main">
+  <p:cSld>
+    <p:spTree>
+      <p:nvGrpSpPr>
+        <p:cNvPr id="1" name=""/>
+        <p:cNvGrpSpPr/>
+        <p:nvPr/>
+      </p:nvGrpSpPr>
+      <p:grpSpPr>
+        <a:xfrm>
+          <a:off x="0" y="0"/>
+          <a:ext cx="0" cy="0"/>
+          <a:chOff x="0" y="0"/>
+          <a:chExt cx="0" cy="0"/>
+        </a:xfrm>
+      </p:grpSpPr>
+      <p:sp>
+        <p:nvSpPr>
+          <p:cNvPr id="3" name="Subtitle 2"/>
+          <p:cNvSpPr>
+            <a:spLocks noGrp="1"/>
+          </p:cNvSpPr>
+          <p:nvPr>
+            <p:ph type="subTitle" idx="1"/>
+          </p:nvPr>
+        </p:nvSpPr>
+        <p:spPr/>
+        <p:txBody>
+          <a:bodyPr/>
+          <a:lstStyle/>
+          <a:p>
+            <a:r>
+              <a:rPr lang="en-US" dirty="0" smtClean="0"/>
+              <a:t>DEMO</a:t>
+            </a:r>
+            <a:endParaRPr lang="en-US" dirty="0"/>
+          </a:p>
+        </p:txBody>
+      </p:sp>
+      <p:sp>
+        <p:nvSpPr>
+          <p:cNvPr id="2" name="Title 1"/>
+          <p:cNvSpPr>
+            <a:spLocks noGrp="1"/>
+          </p:cNvSpPr>
+          <p:nvPr>
+            <p:ph type="title"/>
+          </p:nvPr>
+        </p:nvSpPr>
+        <p:spPr/>
+        <p:txBody>
+          <a:bodyPr>
+            <a:normAutofit fontScale="90000"/>
+          </a:bodyPr>
+          <a:lstStyle/>
+          <a:p>
+            <a:r>
+              <a:rPr lang="en-US" dirty="0"/>
+              <a:t>Heavily contended locks</a:t>
+            </a:r>
+          </a:p>
+        </p:txBody>
+      </p:sp>
+    </p:spTree>
+    <p:extLst>
+      <p:ext uri="{BB962C8B-B14F-4D97-AF65-F5344CB8AC3E}">
+        <p14:creationId xmlns:p14="http://schemas.microsoft.com/office/powerpoint/2010/main" val="2590666726"/>
+      </p:ext>
+    </p:extLst>
+  </p:cSld>
+  <p:clrMapOvr>
+    <a:masterClrMapping/>
+  </p:clrMapOvr>
+</p:sld>
+</file>
+
+<file path=ppt/slides/slide19.xml><?xml version="1.0" encoding="utf-8"?>
+<p:sld xmlns:a="http://schemas.openxmlformats.org/drawingml/2006/main" xmlns:r="http://schemas.openxmlformats.org/officeDocument/2006/relationships" xmlns:p="http://schemas.openxmlformats.org/presentationml/2006/main">
+  <p:cSld>
+    <p:spTree>
+      <p:nvGrpSpPr>
+        <p:cNvPr id="1" name=""/>
+        <p:cNvGrpSpPr/>
+        <p:nvPr/>
+      </p:nvGrpSpPr>
+      <p:grpSpPr>
+        <a:xfrm>
+          <a:off x="0" y="0"/>
+          <a:ext cx="0" cy="0"/>
+          <a:chOff x="0" y="0"/>
+          <a:chExt cx="0" cy="0"/>
+        </a:xfrm>
+      </p:grpSpPr>
+      <p:sp>
+        <p:nvSpPr>
+          <p:cNvPr id="2" name="Content Placeholder 1"/>
+          <p:cNvSpPr>
+            <a:spLocks noGrp="1"/>
+          </p:cNvSpPr>
+          <p:nvPr>
+            <p:ph sz="quarter" idx="13"/>
+          </p:nvPr>
+        </p:nvSpPr>
+        <p:spPr/>
+        <p:txBody>
+          <a:bodyPr/>
+          <a:lstStyle/>
+          <a:p>
+            <a:pPr marL="342900" indent="-342900">
+              <a:buFont typeface="Arial"/>
+              <a:buChar char="•"/>
+            </a:pPr>
+            <a:r>
+              <a:rPr lang="en-US" dirty="0" smtClean="0"/>
+              <a:t>Convoy is created.</a:t>
+            </a:r>
+          </a:p>
+          <a:p>
+            <a:pPr marL="342900" indent="-342900">
+              <a:buFont typeface="Arial"/>
+              <a:buChar char="•"/>
+            </a:pPr>
+            <a:r>
+              <a:rPr lang="en-US" dirty="0" smtClean="0"/>
+              <a:t>Serializes the processing.</a:t>
+            </a:r>
+          </a:p>
+          <a:p>
+            <a:pPr marL="342900" indent="-342900">
+              <a:buFont typeface="Arial"/>
+              <a:buChar char="•"/>
+            </a:pPr>
+            <a:r>
+              <a:rPr lang="en-US" dirty="0" smtClean="0"/>
+              <a:t>Slows down High priority threads.</a:t>
+            </a:r>
+          </a:p>
+          <a:p>
+            <a:pPr marL="342900" indent="-342900">
+              <a:buFont typeface="Arial"/>
+              <a:buChar char="•"/>
+            </a:pPr>
+            <a:endParaRPr lang="en-US" dirty="0"/>
+          </a:p>
+          <a:p>
+            <a:r>
+              <a:rPr lang="en-US" dirty="0" smtClean="0"/>
+              <a:t>Solution</a:t>
+            </a:r>
+          </a:p>
+          <a:p>
+            <a:pPr marL="342900" indent="-342900">
+              <a:buFont typeface="Arial"/>
+              <a:buChar char="•"/>
+            </a:pPr>
+            <a:r>
+              <a:rPr lang="en-US" dirty="0" smtClean="0"/>
+              <a:t>Priority Inversion</a:t>
+            </a:r>
+          </a:p>
+          <a:p>
+            <a:pPr marL="342900" indent="-342900">
+              <a:buFont typeface="Arial"/>
+              <a:buChar char="•"/>
+            </a:pPr>
+            <a:r>
+              <a:rPr lang="en-US" dirty="0" smtClean="0"/>
+              <a:t>Replicating the resource.</a:t>
+            </a:r>
+          </a:p>
+          <a:p>
+            <a:pPr marL="342900" indent="-342900">
+              <a:buFont typeface="Arial"/>
+              <a:buChar char="•"/>
+            </a:pPr>
+            <a:r>
+              <a:rPr lang="en-US" dirty="0" smtClean="0"/>
+              <a:t>Partitioning the resource</a:t>
+            </a:r>
+          </a:p>
+          <a:p>
+            <a:pPr marL="342900" indent="-342900">
+              <a:buFont typeface="Arial"/>
+              <a:buChar char="•"/>
+            </a:pPr>
+            <a:endParaRPr lang="en-US" dirty="0" smtClean="0"/>
+          </a:p>
+          <a:p>
+            <a:pPr marL="342900" indent="-342900">
+              <a:buFont typeface="Arial"/>
+              <a:buChar char="•"/>
+            </a:pPr>
+            <a:endParaRPr lang="en-US" dirty="0"/>
+          </a:p>
+        </p:txBody>
+      </p:sp>
+      <p:sp>
+        <p:nvSpPr>
+          <p:cNvPr id="3" name="Title 2"/>
+          <p:cNvSpPr>
+            <a:spLocks noGrp="1"/>
+          </p:cNvSpPr>
+          <p:nvPr>
+            <p:ph type="title"/>
+          </p:nvPr>
+        </p:nvSpPr>
+        <p:spPr/>
+        <p:txBody>
+          <a:bodyPr/>
+          <a:lstStyle/>
+          <a:p>
+            <a:r>
+              <a:rPr lang="en-US" dirty="0" smtClean="0"/>
+              <a:t>Heavily contended locks</a:t>
+            </a:r>
+            <a:endParaRPr lang="en-US" dirty="0"/>
+          </a:p>
+        </p:txBody>
+      </p:sp>
+    </p:spTree>
+    <p:extLst>
+      <p:ext uri="{BB962C8B-B14F-4D97-AF65-F5344CB8AC3E}">
+        <p14:creationId xmlns:p14="http://schemas.microsoft.com/office/powerpoint/2010/main" val="1462588398"/>
+      </p:ext>
+    </p:extLst>
+  </p:cSld>
+  <p:clrMapOvr>
+    <a:masterClrMapping/>
+  </p:clrMapOvr>
 </p:sld>
 </file>
 
@@ -12503,50 +12338,27 @@
         </p:nvSpPr>
         <p:spPr/>
         <p:txBody>
-          <a:bodyPr/>
+          <a:bodyPr>
+            <a:normAutofit/>
+          </a:bodyPr>
           <a:lstStyle/>
           <a:p>
-            <a:pPr algn="l"/>
-            <a:r>
-              <a:rPr lang="en-US" dirty="0"/>
-              <a:t>Process P1:</a:t>
-            </a:r>
-          </a:p>
-          <a:p>
-            <a:pPr algn="l"/>
-            <a:r>
-              <a:rPr lang="en-US" dirty="0"/>
-              <a:t>request(R1)</a:t>
-            </a:r>
-            <a:r>
-              <a:rPr lang="en-US" dirty="0" smtClean="0"/>
-              <a:t>;…	release</a:t>
-            </a:r>
-            <a:r>
-              <a:rPr lang="en-US" dirty="0"/>
-              <a:t>(R1</a:t>
-            </a:r>
-            <a:r>
-              <a:rPr lang="en-US" dirty="0" smtClean="0"/>
-              <a:t>); request</a:t>
-            </a:r>
-            <a:r>
-              <a:rPr lang="en-US" dirty="0"/>
-              <a:t>(R2)</a:t>
-            </a:r>
-            <a:r>
-              <a:rPr lang="en-US" dirty="0" smtClean="0"/>
-              <a:t>;…	release</a:t>
-            </a:r>
-            <a:r>
-              <a:rPr lang="en-US" dirty="0"/>
-              <a:t>(R2</a:t>
-            </a:r>
-            <a:r>
-              <a:rPr lang="en-US" dirty="0" smtClean="0"/>
-              <a:t>);</a:t>
-            </a:r>
-            <a:endParaRPr lang="en-US" dirty="0"/>
+            <a:r>
+              <a:rPr lang="en-US" dirty="0" smtClean="0"/>
+              <a:t>1). Students play with the app</a:t>
+            </a:r>
+          </a:p>
+          <a:p>
+            <a:r>
+              <a:rPr lang="en-US" dirty="0" smtClean="0"/>
+              <a:t>2). Quiz</a:t>
+            </a:r>
+          </a:p>
+          <a:p>
+            <a:r>
+              <a:rPr lang="en-US" dirty="0" smtClean="0"/>
+              <a:t>3). Survey to collect feedback</a:t>
+            </a:r>
           </a:p>
           <a:p>
             <a:pPr algn="l"/>
@@ -12554,62 +12366,36 @@
           </a:p>
           <a:p>
             <a:pPr algn="l"/>
-            <a:endParaRPr lang="en-US" dirty="0"/>
+            <a:r>
+              <a:rPr lang="en-US" dirty="0" smtClean="0"/>
+              <a:t>To determine:</a:t>
+            </a:r>
+            <a:r>
+              <a:rPr lang="en-US" dirty="0"/>
+              <a:t>	</a:t>
+            </a:r>
+            <a:endParaRPr lang="en-US" dirty="0" smtClean="0"/>
           </a:p>
           <a:p>
             <a:pPr algn="l"/>
-            <a:endParaRPr lang="en-US" dirty="0"/>
+            <a:r>
+              <a:rPr lang="en-US" sz="2000" dirty="0" smtClean="0"/>
+              <a:t>1). Usability.</a:t>
+            </a:r>
           </a:p>
           <a:p>
             <a:pPr algn="l"/>
             <a:r>
-              <a:rPr lang="en-US" dirty="0"/>
-              <a:t>Process P2:</a:t>
+              <a:rPr lang="en-US" sz="2000" dirty="0" smtClean="0"/>
+              <a:t>2). Interactivity.</a:t>
             </a:r>
           </a:p>
           <a:p>
             <a:pPr algn="l"/>
             <a:r>
-              <a:rPr lang="en-US" dirty="0"/>
-              <a:t>request(</a:t>
-            </a:r>
-            <a:r>
-              <a:rPr lang="en-US" dirty="0" smtClean="0"/>
-              <a:t>R2)</a:t>
-            </a:r>
-            <a:r>
-              <a:rPr lang="en-US" dirty="0"/>
-              <a:t>;..</a:t>
-            </a:r>
-            <a:r>
-              <a:rPr lang="en-US" dirty="0" smtClean="0"/>
-              <a:t>.		</a:t>
-            </a:r>
-            <a:r>
-              <a:rPr lang="en-US" dirty="0"/>
-              <a:t>release(R2)</a:t>
-            </a:r>
-            <a:r>
-              <a:rPr lang="en-US" dirty="0" smtClean="0"/>
-              <a:t>; request</a:t>
-            </a:r>
-            <a:r>
-              <a:rPr lang="en-US" dirty="0"/>
-              <a:t>(</a:t>
-            </a:r>
-            <a:r>
-              <a:rPr lang="en-US" dirty="0" smtClean="0"/>
-              <a:t>R1);	release</a:t>
-            </a:r>
-            <a:r>
-              <a:rPr lang="en-US" dirty="0"/>
-              <a:t>(R1)</a:t>
-            </a:r>
-            <a:r>
-              <a:rPr lang="en-US" dirty="0" smtClean="0"/>
-              <a:t>;</a:t>
-            </a:r>
-            <a:endParaRPr lang="en-US" dirty="0"/>
+              <a:rPr lang="en-US" sz="2000" dirty="0" smtClean="0"/>
+              <a:t>3). Students’ understanding in the 3 pitfalls</a:t>
+            </a:r>
           </a:p>
         </p:txBody>
       </p:sp>
@@ -12629,181 +12415,8 @@
           <a:lstStyle/>
           <a:p>
             <a:r>
-              <a:rPr lang="en-US" dirty="0"/>
-              <a:t>Release Before Request</a:t>
-            </a:r>
-          </a:p>
-        </p:txBody>
-      </p:sp>
-      <p:sp>
-        <p:nvSpPr>
-          <p:cNvPr id="4" name="Rectangle 3"/>
-          <p:cNvSpPr/>
-          <p:nvPr/>
-        </p:nvSpPr>
-        <p:spPr>
-          <a:xfrm>
-            <a:off x="1598825" y="2540307"/>
-            <a:ext cx="2144253" cy="329910"/>
-          </a:xfrm>
-          <a:prstGeom prst="rect">
-            <a:avLst/>
-          </a:prstGeom>
-          <a:solidFill>
-            <a:srgbClr val="FF0000"/>
-          </a:solidFill>
-        </p:spPr>
-        <p:style>
-          <a:lnRef idx="1">
-            <a:schemeClr val="accent1"/>
-          </a:lnRef>
-          <a:fillRef idx="3">
-            <a:schemeClr val="accent1"/>
-          </a:fillRef>
-          <a:effectRef idx="2">
-            <a:schemeClr val="accent1"/>
-          </a:effectRef>
-          <a:fontRef idx="minor">
-            <a:schemeClr val="lt1"/>
-          </a:fontRef>
-        </p:style>
-        <p:txBody>
-          <a:bodyPr rtlCol="0" anchor="ctr"/>
-          <a:lstStyle/>
-          <a:p>
-            <a:pPr algn="ctr"/>
-            <a:r>
-              <a:rPr lang="en-US" dirty="0" smtClean="0"/>
-              <a:t>R1 Critical Section</a:t>
-            </a:r>
-            <a:endParaRPr lang="en-US" dirty="0"/>
-          </a:p>
-        </p:txBody>
-      </p:sp>
-      <p:sp>
-        <p:nvSpPr>
-          <p:cNvPr id="5" name="Rectangle 4"/>
-          <p:cNvSpPr/>
-          <p:nvPr/>
-        </p:nvSpPr>
-        <p:spPr>
-          <a:xfrm>
-            <a:off x="5520505" y="2540307"/>
-            <a:ext cx="2144253" cy="329910"/>
-          </a:xfrm>
-          <a:prstGeom prst="rect">
-            <a:avLst/>
-          </a:prstGeom>
-        </p:spPr>
-        <p:style>
-          <a:lnRef idx="1">
-            <a:schemeClr val="accent1"/>
-          </a:lnRef>
-          <a:fillRef idx="3">
-            <a:schemeClr val="accent1"/>
-          </a:fillRef>
-          <a:effectRef idx="2">
-            <a:schemeClr val="accent1"/>
-          </a:effectRef>
-          <a:fontRef idx="minor">
-            <a:schemeClr val="lt1"/>
-          </a:fontRef>
-        </p:style>
-        <p:txBody>
-          <a:bodyPr rtlCol="0" anchor="ctr"/>
-          <a:lstStyle/>
-          <a:p>
-            <a:pPr algn="ctr"/>
-            <a:r>
-              <a:rPr lang="en-US" dirty="0" smtClean="0"/>
-              <a:t>R2 Critical Section</a:t>
-            </a:r>
-            <a:endParaRPr lang="en-US" dirty="0"/>
-          </a:p>
-        </p:txBody>
-      </p:sp>
-      <p:sp>
-        <p:nvSpPr>
-          <p:cNvPr id="6" name="Rectangle 5"/>
-          <p:cNvSpPr/>
-          <p:nvPr/>
-        </p:nvSpPr>
-        <p:spPr>
-          <a:xfrm>
-            <a:off x="1598825" y="5002075"/>
-            <a:ext cx="2144253" cy="329910"/>
-          </a:xfrm>
-          <a:prstGeom prst="rect">
-            <a:avLst/>
-          </a:prstGeom>
-        </p:spPr>
-        <p:style>
-          <a:lnRef idx="1">
-            <a:schemeClr val="accent1"/>
-          </a:lnRef>
-          <a:fillRef idx="3">
-            <a:schemeClr val="accent1"/>
-          </a:fillRef>
-          <a:effectRef idx="2">
-            <a:schemeClr val="accent1"/>
-          </a:effectRef>
-          <a:fontRef idx="minor">
-            <a:schemeClr val="lt1"/>
-          </a:fontRef>
-        </p:style>
-        <p:txBody>
-          <a:bodyPr rtlCol="0" anchor="ctr"/>
-          <a:lstStyle/>
-          <a:p>
-            <a:pPr algn="ctr"/>
-            <a:r>
-              <a:rPr lang="en-US" dirty="0" smtClean="0"/>
-              <a:t>R2 Critical Section</a:t>
-            </a:r>
-            <a:endParaRPr lang="en-US" dirty="0"/>
-          </a:p>
-        </p:txBody>
-      </p:sp>
-      <p:sp>
-        <p:nvSpPr>
-          <p:cNvPr id="7" name="Rectangle 6"/>
-          <p:cNvSpPr/>
-          <p:nvPr/>
-        </p:nvSpPr>
-        <p:spPr>
-          <a:xfrm>
-            <a:off x="5520505" y="5002075"/>
-            <a:ext cx="2144253" cy="329910"/>
-          </a:xfrm>
-          <a:prstGeom prst="rect">
-            <a:avLst/>
-          </a:prstGeom>
-          <a:solidFill>
-            <a:srgbClr val="FF0000"/>
-          </a:solidFill>
-        </p:spPr>
-        <p:style>
-          <a:lnRef idx="1">
-            <a:schemeClr val="accent1"/>
-          </a:lnRef>
-          <a:fillRef idx="3">
-            <a:schemeClr val="accent1"/>
-          </a:fillRef>
-          <a:effectRef idx="2">
-            <a:schemeClr val="accent1"/>
-          </a:effectRef>
-          <a:fontRef idx="minor">
-            <a:schemeClr val="lt1"/>
-          </a:fontRef>
-        </p:style>
-        <p:txBody>
-          <a:bodyPr rtlCol="0" anchor="ctr"/>
-          <a:lstStyle/>
-          <a:p>
-            <a:pPr algn="ctr"/>
-            <a:r>
-              <a:rPr lang="en-US" dirty="0" smtClean="0"/>
-              <a:t>R1 Critical Section</a:t>
+              <a:rPr lang="en-US" dirty="0" smtClean="0"/>
+              <a:t>evaluation</a:t>
             </a:r>
             <a:endParaRPr lang="en-US" dirty="0"/>
           </a:p>
@@ -12812,20 +12425,13 @@
     </p:spTree>
     <p:extLst>
       <p:ext uri="{BB962C8B-B14F-4D97-AF65-F5344CB8AC3E}">
-        <p14:creationId xmlns:p14="http://schemas.microsoft.com/office/powerpoint/2010/main" val="1963981522"/>
+        <p14:creationId xmlns:p14="http://schemas.microsoft.com/office/powerpoint/2010/main" val="1649624774"/>
       </p:ext>
     </p:extLst>
   </p:cSld>
   <p:clrMapOvr>
     <a:masterClrMapping/>
   </p:clrMapOvr>
-  <p:timing>
-    <p:tnLst>
-      <p:par>
-        <p:cTn xmlns:p14="http://schemas.microsoft.com/office/powerpoint/2010/main" id="1" dur="indefinite" restart="never" nodeType="tmRoot"/>
-      </p:par>
-    </p:tnLst>
-  </p:timing>
 </p:sld>
 </file>
 
@@ -12848,12 +12454,12 @@
       </p:grpSpPr>
       <p:sp>
         <p:nvSpPr>
-          <p:cNvPr id="3" name="Subtitle 2"/>
+          <p:cNvPr id="2" name="Content Placeholder 1"/>
           <p:cNvSpPr>
             <a:spLocks noGrp="1"/>
           </p:cNvSpPr>
           <p:nvPr>
-            <p:ph type="subTitle" idx="1"/>
+            <p:ph sz="quarter" idx="13"/>
           </p:nvPr>
         </p:nvSpPr>
         <p:spPr/>
@@ -12861,17 +12467,55 @@
           <a:bodyPr/>
           <a:lstStyle/>
           <a:p>
-            <a:r>
-              <a:rPr lang="en-US" dirty="0" smtClean="0"/>
-              <a:t>DEMO</a:t>
-            </a:r>
+            <a:pPr marL="342900" indent="-342900">
+              <a:buFont typeface="Arial"/>
+              <a:buChar char="•"/>
+            </a:pPr>
+            <a:r>
+              <a:rPr lang="en-US" dirty="0" smtClean="0"/>
+              <a:t>Usability:		90% rate as the easy to play</a:t>
+            </a:r>
+          </a:p>
+          <a:p>
+            <a:pPr marL="342900" indent="-342900">
+              <a:buFont typeface="Arial"/>
+              <a:buChar char="•"/>
+            </a:pPr>
+            <a:endParaRPr lang="en-US" dirty="0" smtClean="0"/>
+          </a:p>
+          <a:p>
+            <a:pPr marL="342900" indent="-342900">
+              <a:buFont typeface="Arial"/>
+              <a:buChar char="•"/>
+            </a:pPr>
+            <a:r>
+              <a:rPr lang="en-US" dirty="0" smtClean="0"/>
+              <a:t>Interactivity:	90% like the way they interact with the pitfalls</a:t>
+            </a:r>
+          </a:p>
+          <a:p>
+            <a:pPr marL="342900" indent="-342900">
+              <a:buFont typeface="Arial"/>
+              <a:buChar char="•"/>
+            </a:pPr>
             <a:endParaRPr lang="en-US" dirty="0"/>
           </a:p>
-        </p:txBody>
-      </p:sp>
-      <p:sp>
-        <p:nvSpPr>
-          <p:cNvPr id="2" name="Title 1"/>
+          <a:p>
+            <a:pPr marL="342900" indent="-342900">
+              <a:buFont typeface="Arial"/>
+              <a:buChar char="•"/>
+            </a:pPr>
+            <a:r>
+              <a:rPr lang="en-US" dirty="0" smtClean="0"/>
+              <a:t>Student understanding: 	9/10 questions were answered correctly by 90% of student</a:t>
+            </a:r>
+            <a:endParaRPr lang="en-US" dirty="0"/>
+          </a:p>
+        </p:txBody>
+      </p:sp>
+      <p:sp>
+        <p:nvSpPr>
+          <p:cNvPr id="3" name="Title 2"/>
           <p:cNvSpPr>
             <a:spLocks noGrp="1"/>
           </p:cNvSpPr>
@@ -12881,22 +12525,21 @@
         </p:nvSpPr>
         <p:spPr/>
         <p:txBody>
-          <a:bodyPr>
-            <a:normAutofit fontScale="90000"/>
-          </a:bodyPr>
+          <a:bodyPr/>
           <a:lstStyle/>
           <a:p>
             <a:r>
-              <a:rPr lang="en-US" dirty="0"/>
-              <a:t>Heavily contended locks</a:t>
-            </a:r>
+              <a:rPr lang="en-US" dirty="0" smtClean="0"/>
+              <a:t>Results</a:t>
+            </a:r>
+            <a:endParaRPr lang="en-US" dirty="0"/>
           </a:p>
         </p:txBody>
       </p:sp>
     </p:spTree>
     <p:extLst>
       <p:ext uri="{BB962C8B-B14F-4D97-AF65-F5344CB8AC3E}">
-        <p14:creationId xmlns:p14="http://schemas.microsoft.com/office/powerpoint/2010/main" val="2590666726"/>
+        <p14:creationId xmlns:p14="http://schemas.microsoft.com/office/powerpoint/2010/main" val="4085540163"/>
       </p:ext>
     </p:extLst>
   </p:cSld>
@@ -12935,94 +12578,101 @@
         </p:nvSpPr>
         <p:spPr/>
         <p:txBody>
-          <a:bodyPr/>
+          <a:bodyPr>
+            <a:normAutofit/>
+          </a:bodyPr>
           <a:lstStyle/>
           <a:p>
-            <a:pPr marL="342900" indent="-342900">
+            <a:pPr marL="342900" indent="-342900" algn="l">
               <a:buFont typeface="Arial"/>
               <a:buChar char="•"/>
             </a:pPr>
             <a:r>
               <a:rPr lang="en-US" dirty="0" smtClean="0"/>
-              <a:t>Convoy is created.</a:t>
-            </a:r>
-          </a:p>
-          <a:p>
-            <a:pPr marL="342900" indent="-342900">
+              <a:t>Support multiple browser</a:t>
+            </a:r>
+          </a:p>
+          <a:p>
+            <a:pPr algn="l"/>
+            <a:endParaRPr lang="en-US" dirty="0"/>
+          </a:p>
+          <a:p>
+            <a:pPr algn="l"/>
+            <a:r>
+              <a:rPr lang="en-US" dirty="0" smtClean="0"/>
+              <a:t>Next Few Weeks:</a:t>
+            </a:r>
+          </a:p>
+          <a:p>
+            <a:pPr marL="342900" indent="-342900" algn="l">
               <a:buFont typeface="Arial"/>
               <a:buChar char="•"/>
             </a:pPr>
             <a:r>
-              <a:rPr lang="en-US" dirty="0" smtClean="0"/>
-              <a:t>Serializes the processing.</a:t>
-            </a:r>
-          </a:p>
-          <a:p>
-            <a:pPr marL="342900" indent="-342900">
+              <a:rPr lang="en-US" dirty="0"/>
+              <a:t>S</a:t>
+            </a:r>
+            <a:r>
+              <a:rPr lang="en-US" dirty="0" smtClean="0"/>
+              <a:t>olve different browser compatibility</a:t>
+            </a:r>
+          </a:p>
+          <a:p>
+            <a:pPr marL="342900" indent="-342900" algn="l">
               <a:buFont typeface="Arial"/>
               <a:buChar char="•"/>
             </a:pPr>
             <a:r>
               <a:rPr lang="en-US" dirty="0" smtClean="0"/>
-              <a:t>Slows down High priority threads.</a:t>
-            </a:r>
-          </a:p>
-          <a:p>
-            <a:pPr marL="342900" indent="-342900">
+              <a:t>Do more survey and usability testing</a:t>
+            </a:r>
+          </a:p>
+          <a:p>
+            <a:pPr marL="342900" indent="-342900" algn="l">
               <a:buFont typeface="Arial"/>
               <a:buChar char="•"/>
             </a:pPr>
+            <a:r>
+              <a:rPr lang="en-US" dirty="0"/>
+              <a:t>W</a:t>
+            </a:r>
+            <a:r>
+              <a:rPr lang="en-US" dirty="0" smtClean="0"/>
+              <a:t>rite report</a:t>
+            </a:r>
+          </a:p>
+          <a:p>
+            <a:pPr algn="l"/>
             <a:endParaRPr lang="en-US" dirty="0"/>
           </a:p>
           <a:p>
-            <a:r>
-              <a:rPr lang="en-US" dirty="0" smtClean="0"/>
-              <a:t>Solution</a:t>
-            </a:r>
-          </a:p>
-          <a:p>
-            <a:pPr marL="342900" indent="-342900">
+            <a:pPr algn="l"/>
+            <a:r>
+              <a:rPr lang="en-US" dirty="0" smtClean="0"/>
+              <a:t>Extension:</a:t>
+            </a:r>
+          </a:p>
+          <a:p>
+            <a:pPr marL="342900" indent="-342900" algn="l">
               <a:buFont typeface="Arial"/>
               <a:buChar char="•"/>
             </a:pPr>
             <a:r>
               <a:rPr lang="en-US" dirty="0" smtClean="0"/>
-              <a:t>Priority Inversion</a:t>
-            </a:r>
-          </a:p>
-          <a:p>
-            <a:pPr marL="342900" indent="-342900">
+              <a:t>Incorporate solution to the pitfalls in our app </a:t>
+            </a:r>
+            <a:endParaRPr lang="en-US" dirty="0"/>
+          </a:p>
+          <a:p>
+            <a:pPr marL="342900" indent="-342900" algn="l">
               <a:buFont typeface="Arial"/>
               <a:buChar char="•"/>
             </a:pPr>
             <a:r>
               <a:rPr lang="en-US" dirty="0" smtClean="0"/>
-              <a:t>Replicating the resource.</a:t>
-            </a:r>
-          </a:p>
-          <a:p>
-            <a:pPr marL="342900" indent="-342900">
-              <a:buFont typeface="Arial"/>
-              <a:buChar char="•"/>
-            </a:pPr>
-            <a:r>
-              <a:rPr lang="en-US" dirty="0" smtClean="0"/>
-              <a:t>Partitioning the resource</a:t>
-            </a:r>
-          </a:p>
-          <a:p>
-            <a:pPr marL="342900" indent="-342900">
-              <a:buFont typeface="Arial"/>
-              <a:buChar char="•"/>
-            </a:pPr>
+              <a:t>Extend the app to cover other pitfalls</a:t>
+            </a:r>
             <a:endParaRPr lang="en-US" dirty="0" smtClean="0"/>
-          </a:p>
-          <a:p>
-            <a:pPr marL="342900" indent="-342900">
-              <a:buFont typeface="Arial"/>
-              <a:buChar char="•"/>
-            </a:pPr>
-            <a:endParaRPr lang="en-US" dirty="0"/>
           </a:p>
         </p:txBody>
       </p:sp>
@@ -13043,7 +12693,7 @@
           <a:p>
             <a:r>
               <a:rPr lang="en-US" dirty="0" smtClean="0"/>
-              <a:t>Heavily contended locks</a:t>
+              <a:t>Challenges and future works</a:t>
             </a:r>
             <a:endParaRPr lang="en-US" dirty="0"/>
           </a:p>
@@ -13052,7 +12702,7 @@
     </p:spTree>
     <p:extLst>
       <p:ext uri="{BB962C8B-B14F-4D97-AF65-F5344CB8AC3E}">
-        <p14:creationId xmlns:p14="http://schemas.microsoft.com/office/powerpoint/2010/main" val="1462588398"/>
+        <p14:creationId xmlns:p14="http://schemas.microsoft.com/office/powerpoint/2010/main" val="2276343006"/>
       </p:ext>
     </p:extLst>
   </p:cSld>
@@ -13089,66 +12739,319 @@
             <p:ph sz="quarter" idx="13"/>
           </p:nvPr>
         </p:nvSpPr>
-        <p:spPr/>
+        <p:spPr>
+          <a:xfrm>
+            <a:off x="457200" y="1477207"/>
+            <a:ext cx="8229600" cy="5198036"/>
+          </a:xfrm>
+        </p:spPr>
         <p:txBody>
           <a:bodyPr>
-            <a:normAutofit/>
+            <a:normAutofit fontScale="85000" lnSpcReduction="20000"/>
           </a:bodyPr>
           <a:lstStyle/>
           <a:p>
             <a:r>
-              <a:rPr lang="en-US" dirty="0" smtClean="0"/>
-              <a:t>1). Students play with the app</a:t>
-            </a:r>
-          </a:p>
-          <a:p>
-            <a:r>
-              <a:rPr lang="en-US" dirty="0" smtClean="0"/>
-              <a:t>2). Quiz</a:t>
-            </a:r>
-          </a:p>
-          <a:p>
-            <a:r>
-              <a:rPr lang="en-US" dirty="0" smtClean="0"/>
-              <a:t>3). Survey to collect feedback</a:t>
-            </a:r>
-          </a:p>
-          <a:p>
-            <a:pPr algn="l"/>
-            <a:endParaRPr lang="en-US" dirty="0"/>
-          </a:p>
-          <a:p>
-            <a:pPr algn="l"/>
-            <a:r>
-              <a:rPr lang="en-US" dirty="0" smtClean="0"/>
-              <a:t>To determine:</a:t>
-            </a:r>
-            <a:r>
-              <a:rPr lang="en-US" dirty="0"/>
-              <a:t>	</a:t>
-            </a:r>
-            <a:endParaRPr lang="en-US" dirty="0" smtClean="0"/>
-          </a:p>
-          <a:p>
-            <a:pPr algn="l"/>
-            <a:r>
-              <a:rPr lang="en-US" sz="2000" dirty="0" smtClean="0"/>
-              <a:t>1). Usability.</a:t>
-            </a:r>
-          </a:p>
-          <a:p>
-            <a:pPr algn="l"/>
-            <a:r>
-              <a:rPr lang="en-US" sz="2000" dirty="0" smtClean="0"/>
-              <a:t>2). Interactivity.</a:t>
-            </a:r>
-          </a:p>
-          <a:p>
-            <a:pPr algn="l"/>
-            <a:r>
-              <a:rPr lang="en-US" sz="2000" dirty="0" smtClean="0"/>
-              <a:t>3). Students’ understanding in the 3 pitfalls</a:t>
-            </a:r>
+              <a:rPr lang="en-US" sz="1600" dirty="0"/>
+              <a:t>[1] John W. McCormick. 2007. MA1: real-time and parallel processing in </a:t>
+            </a:r>
+            <a:r>
+              <a:rPr lang="en-US" sz="1600" dirty="0" err="1"/>
+              <a:t>ada</a:t>
+            </a:r>
+            <a:r>
+              <a:rPr lang="en-US" sz="1600" dirty="0"/>
+              <a:t>. </a:t>
+            </a:r>
+            <a:r>
+              <a:rPr lang="en-US" sz="1600" i="1" dirty="0"/>
+              <a:t>Ada </a:t>
+            </a:r>
+            <a:r>
+              <a:rPr lang="en-US" sz="1600" i="1" dirty="0" err="1"/>
+              <a:t>Lett</a:t>
+            </a:r>
+            <a:r>
+              <a:rPr lang="en-US" sz="1600" i="1" dirty="0"/>
+              <a:t>.</a:t>
+            </a:r>
+            <a:r>
+              <a:rPr lang="en-US" sz="1600" dirty="0"/>
+              <a:t> XXVII, 3 (November 2007), 7-7. DOI=10.1145/1315607.1315587 http://</a:t>
+            </a:r>
+            <a:r>
+              <a:rPr lang="en-US" sz="1600" dirty="0" err="1"/>
+              <a:t>doi.acm.org.ezproxy.auckland.ac.nz</a:t>
+            </a:r>
+            <a:r>
+              <a:rPr lang="en-US" sz="1600" dirty="0"/>
+              <a:t>/10.1145/1315607.1315587</a:t>
+            </a:r>
+          </a:p>
+          <a:p>
+            <a:r>
+              <a:rPr lang="en-US" sz="1600" dirty="0"/>
+              <a:t>[2] John W. McCormick. 2009. Ada for real-time and parallel processing. In </a:t>
+            </a:r>
+            <a:r>
+              <a:rPr lang="en-US" sz="1600" i="1" dirty="0"/>
+              <a:t>Proceedings of the ACM </a:t>
+            </a:r>
+            <a:r>
+              <a:rPr lang="en-US" sz="1600" i="1" dirty="0" err="1"/>
+              <a:t>SIGAda</a:t>
+            </a:r>
+            <a:r>
+              <a:rPr lang="en-US" sz="1600" i="1" dirty="0"/>
+              <a:t> annual international conference on Ada and related technologies</a:t>
+            </a:r>
+            <a:r>
+              <a:rPr lang="en-US" sz="1600" dirty="0"/>
+              <a:t> (</a:t>
+            </a:r>
+            <a:r>
+              <a:rPr lang="en-US" sz="1600" dirty="0" err="1"/>
+              <a:t>SIGAda</a:t>
+            </a:r>
+            <a:r>
+              <a:rPr lang="en-US" sz="1600" dirty="0"/>
+              <a:t> '09). ACM, New York, NY, USA, 13-14. DOI=10.1145/1647420.1647428 http://</a:t>
+            </a:r>
+            <a:r>
+              <a:rPr lang="en-US" sz="1600" dirty="0" err="1"/>
+              <a:t>doi.acm.org.ezproxy.auckland.ac.nz</a:t>
+            </a:r>
+            <a:r>
+              <a:rPr lang="en-US" sz="1600" dirty="0"/>
+              <a:t>/10.1145/1647420.1647428</a:t>
+            </a:r>
+          </a:p>
+          <a:p>
+            <a:r>
+              <a:rPr lang="en-US" sz="1600" dirty="0"/>
+              <a:t>[3] Dick Mays and Richard J. LeBlanc, Jr.. 2002. The </a:t>
+            </a:r>
+            <a:r>
+              <a:rPr lang="en-US" sz="1600" dirty="0" err="1"/>
+              <a:t>cyclefree</a:t>
+            </a:r>
+            <a:r>
+              <a:rPr lang="en-US" sz="1600" dirty="0"/>
+              <a:t> methodology: a simple approach to building reliable, robust, real-time systems. In </a:t>
+            </a:r>
+            <a:r>
+              <a:rPr lang="en-US" sz="1600" i="1" dirty="0"/>
+              <a:t>Proceedings of the 24th International Conference on Software Engineering</a:t>
+            </a:r>
+            <a:r>
+              <a:rPr lang="en-US" sz="1600" dirty="0"/>
+              <a:t> (ICSE '02). ACM, New York, NY, USA, 567-575. DOI=10.1145/581339.581411 http://</a:t>
+            </a:r>
+            <a:r>
+              <a:rPr lang="en-US" sz="1600" dirty="0" err="1"/>
+              <a:t>doi.acm.org.ezproxy.auckland.ac.nz</a:t>
+            </a:r>
+            <a:r>
+              <a:rPr lang="en-US" sz="1600" dirty="0"/>
+              <a:t>/10.1145/581339.581411</a:t>
+            </a:r>
+          </a:p>
+          <a:p>
+            <a:r>
+              <a:rPr lang="en-US" sz="1500" dirty="0" smtClean="0"/>
+              <a:t>[4] </a:t>
+            </a:r>
+            <a:r>
+              <a:rPr lang="en-US" sz="1500" dirty="0"/>
+              <a:t> N. </a:t>
+            </a:r>
+            <a:r>
+              <a:rPr lang="en-US" sz="1500" dirty="0" err="1"/>
+              <a:t>Giacaman</a:t>
+            </a:r>
+            <a:r>
+              <a:rPr lang="en-US" sz="1500" dirty="0"/>
+              <a:t>. Teaching by example: Using analogies and live coding demonstrations to teach parallel computing concepts to undergraduate </a:t>
+            </a:r>
+            <a:r>
+              <a:rPr lang="en-US" sz="1500" dirty="0" err="1"/>
+              <a:t>stu</a:t>
+            </a:r>
+            <a:r>
+              <a:rPr lang="en-US" sz="1500" dirty="0"/>
+              <a:t>- dents. In Parallel and Distributed Processing Symposium Workshops PhD Forum (IPDPSW), 2012 IEEE 26th International, pages 1295 –1298, may 2012. </a:t>
+            </a:r>
+            <a:endParaRPr lang="en-US" sz="1500" dirty="0" smtClean="0"/>
+          </a:p>
+          <a:p>
+            <a:r>
+              <a:rPr lang="en-US" sz="1500" dirty="0" smtClean="0"/>
+              <a:t>[5] </a:t>
+            </a:r>
+            <a:r>
+              <a:rPr lang="en-US" sz="1500" dirty="0" err="1"/>
+              <a:t>Mordechai</a:t>
+            </a:r>
+            <a:r>
+              <a:rPr lang="en-US" sz="1500" dirty="0"/>
+              <a:t> Ben-Ari and </a:t>
+            </a:r>
+            <a:r>
+              <a:rPr lang="en-US" sz="1500" dirty="0" err="1"/>
+              <a:t>Yifat</a:t>
+            </a:r>
+            <a:r>
+              <a:rPr lang="en-US" sz="1500" dirty="0"/>
+              <a:t> Ben-David </a:t>
+            </a:r>
+            <a:r>
+              <a:rPr lang="en-US" sz="1500" dirty="0" err="1"/>
+              <a:t>Kolikant</a:t>
+            </a:r>
+            <a:r>
+              <a:rPr lang="en-US" sz="1500" dirty="0"/>
+              <a:t>. Thinking parallel: the process of learning concurrency. SIGCSE Bull., 31(3):13–16, June 1999. </a:t>
+            </a:r>
+            <a:endParaRPr lang="en-US" sz="1500" dirty="0" smtClean="0"/>
+          </a:p>
+          <a:p>
+            <a:r>
+              <a:rPr lang="en-US" sz="1500" dirty="0" smtClean="0"/>
+              <a:t>[6] </a:t>
+            </a:r>
+            <a:r>
+              <a:rPr lang="en-US" sz="1500" dirty="0"/>
+              <a:t>http://publib.boulder.ibm.com/infocenter/iseries/v5r3/index.jsp?topic=%2Frzahw%</a:t>
+            </a:r>
+            <a:r>
+              <a:rPr lang="en-US" sz="1500" dirty="0" smtClean="0"/>
+              <a:t>2Frzahwmutco.htm</a:t>
+            </a:r>
+          </a:p>
+          <a:p>
+            <a:r>
+              <a:rPr lang="en-US" sz="1500" dirty="0" smtClean="0"/>
+              <a:t>[7] </a:t>
+            </a:r>
+            <a:r>
+              <a:rPr lang="en-US" sz="1500" dirty="0" err="1"/>
+              <a:t>Fancong</a:t>
+            </a:r>
+            <a:r>
+              <a:rPr lang="en-US" sz="1500" dirty="0"/>
+              <a:t> </a:t>
+            </a:r>
+            <a:r>
+              <a:rPr lang="en-US" sz="1500" dirty="0" err="1"/>
+              <a:t>Zeng</a:t>
+            </a:r>
+            <a:r>
+              <a:rPr lang="en-US" sz="1500" dirty="0"/>
+              <a:t>. "An Initial Study of Common Coding Pitfalls in Java Programs", in Proceedings of MASPLAS'03 Mid-Atlantic Student Workshop on Programming Languages and Systems, April, 2003</a:t>
+            </a:r>
+            <a:r>
+              <a:rPr lang="en-US" sz="1500" dirty="0" smtClean="0"/>
+              <a:t>.</a:t>
+            </a:r>
+          </a:p>
+          <a:p>
+            <a:r>
+              <a:rPr lang="en-US" sz="1500" dirty="0" smtClean="0"/>
+              <a:t>[8] </a:t>
+            </a:r>
+            <a:r>
+              <a:rPr lang="en-US" sz="1600" dirty="0"/>
+              <a:t>Sung-</a:t>
+            </a:r>
+            <a:r>
+              <a:rPr lang="en-US" sz="1600" dirty="0" err="1"/>
+              <a:t>Eun</a:t>
+            </a:r>
+            <a:r>
+              <a:rPr lang="en-US" sz="1600" dirty="0"/>
+              <a:t> Choi and E Christopher Lewis. A Study of </a:t>
+            </a:r>
+            <a:r>
+              <a:rPr lang="en-US" sz="1600" dirty="0" smtClean="0"/>
+              <a:t>Common </a:t>
+            </a:r>
+            <a:r>
+              <a:rPr lang="en-US" sz="1600" dirty="0"/>
+              <a:t>Pitfalls in Simple Multi-Threaded Programs. In </a:t>
+            </a:r>
+            <a:r>
+              <a:rPr lang="en-US" sz="1600" i="1" dirty="0" smtClean="0"/>
+              <a:t>Proceedings </a:t>
+            </a:r>
+            <a:r>
+              <a:rPr lang="en-US" sz="1600" i="1" dirty="0"/>
+              <a:t>of the Thirty-first ACM SIGCSE Technical Symposium on Computer Science Education, </a:t>
+            </a:r>
+            <a:r>
+              <a:rPr lang="en-US" sz="1600" dirty="0"/>
+              <a:t>March 2000. </a:t>
+            </a:r>
+            <a:endParaRPr lang="en-US" sz="1600" dirty="0" smtClean="0"/>
+          </a:p>
+          <a:p>
+            <a:r>
+              <a:rPr lang="en-US" sz="1600" dirty="0" smtClean="0"/>
+              <a:t>[9] </a:t>
+            </a:r>
+            <a:r>
+              <a:rPr lang="en-US" sz="1600" dirty="0" err="1"/>
+              <a:t>Tallent</a:t>
+            </a:r>
+            <a:r>
+              <a:rPr lang="en-US" sz="1600" dirty="0"/>
+              <a:t>, N. R.; Mellor-</a:t>
+            </a:r>
+            <a:r>
+              <a:rPr lang="en-US" sz="1600" dirty="0" err="1"/>
+              <a:t>Crummey</a:t>
+            </a:r>
+            <a:r>
+              <a:rPr lang="en-US" sz="1600" dirty="0"/>
+              <a:t>, J. M. &amp; Porterfield, A. (2010), Analyzing lock contention in multithreaded applications., in R. </a:t>
+            </a:r>
+            <a:r>
+              <a:rPr lang="en-US" sz="1600" dirty="0" err="1"/>
+              <a:t>Govindarajan</a:t>
+            </a:r>
+            <a:r>
+              <a:rPr lang="en-US" sz="1600" dirty="0"/>
+              <a:t>; David A. Padua &amp; Mary W. Hall, ed., 'PPOPP' , ACM, , pp. 269-280 </a:t>
+            </a:r>
+            <a:r>
+              <a:rPr lang="en-US" sz="1600" dirty="0" smtClean="0"/>
+              <a:t>.</a:t>
+            </a:r>
+          </a:p>
+          <a:p>
+            <a:r>
+              <a:rPr lang="en-US" sz="1600" dirty="0" smtClean="0"/>
+              <a:t>[10]</a:t>
+            </a:r>
+            <a:r>
+              <a:rPr lang="en-NZ" sz="1600" dirty="0"/>
+              <a:t> http://channel9.msdn.com/Shows/Going+Deep/Cpp-and-Beyond-2012-Herb-Sutter-atomic-Weapons-1-of-2</a:t>
+            </a:r>
+            <a:endParaRPr lang="en-GB" sz="1600" dirty="0"/>
+          </a:p>
+          <a:p>
+            <a:endParaRPr lang="en-US" sz="1600" dirty="0" smtClean="0"/>
+          </a:p>
+          <a:p>
+            <a:endParaRPr lang="en-US" sz="1500" dirty="0" smtClean="0"/>
+          </a:p>
+          <a:p>
+            <a:endParaRPr lang="en-US" sz="1500" dirty="0"/>
+          </a:p>
+          <a:p>
+            <a:endParaRPr lang="en-US" sz="1500" dirty="0"/>
+          </a:p>
+          <a:p>
+            <a:endParaRPr lang="en-US" sz="1500" dirty="0"/>
           </a:p>
         </p:txBody>
       </p:sp>
@@ -13169,7 +13072,7 @@
           <a:p>
             <a:r>
               <a:rPr lang="en-US" dirty="0" smtClean="0"/>
-              <a:t>evaluation</a:t>
+              <a:t>References</a:t>
             </a:r>
             <a:endParaRPr lang="en-US" dirty="0"/>
           </a:p>
@@ -13178,7 +13081,7 @@
     </p:spTree>
     <p:extLst>
       <p:ext uri="{BB962C8B-B14F-4D97-AF65-F5344CB8AC3E}">
-        <p14:creationId xmlns:p14="http://schemas.microsoft.com/office/powerpoint/2010/main" val="1649624774"/>
+        <p14:creationId xmlns:p14="http://schemas.microsoft.com/office/powerpoint/2010/main" val="3408655997"/>
       </p:ext>
     </p:extLst>
   </p:cSld>
@@ -13207,637 +13110,6 @@
       </p:grpSpPr>
       <p:sp>
         <p:nvSpPr>
-          <p:cNvPr id="2" name="Content Placeholder 1"/>
-          <p:cNvSpPr>
-            <a:spLocks noGrp="1"/>
-          </p:cNvSpPr>
-          <p:nvPr>
-            <p:ph sz="quarter" idx="13"/>
-          </p:nvPr>
-        </p:nvSpPr>
-        <p:spPr/>
-        <p:txBody>
-          <a:bodyPr/>
-          <a:lstStyle/>
-          <a:p>
-            <a:pPr marL="342900" indent="-342900">
-              <a:buFont typeface="Arial"/>
-              <a:buChar char="•"/>
-            </a:pPr>
-            <a:r>
-              <a:rPr lang="en-US" dirty="0" smtClean="0"/>
-              <a:t>Usability:		90% rate as the easy to play</a:t>
-            </a:r>
-          </a:p>
-          <a:p>
-            <a:pPr marL="342900" indent="-342900">
-              <a:buFont typeface="Arial"/>
-              <a:buChar char="•"/>
-            </a:pPr>
-            <a:endParaRPr lang="en-US" dirty="0" smtClean="0"/>
-          </a:p>
-          <a:p>
-            <a:pPr marL="342900" indent="-342900">
-              <a:buFont typeface="Arial"/>
-              <a:buChar char="•"/>
-            </a:pPr>
-            <a:r>
-              <a:rPr lang="en-US" dirty="0" smtClean="0"/>
-              <a:t>Interactivity:	90% like the way they interact with the pitfalls</a:t>
-            </a:r>
-          </a:p>
-          <a:p>
-            <a:pPr marL="342900" indent="-342900">
-              <a:buFont typeface="Arial"/>
-              <a:buChar char="•"/>
-            </a:pPr>
-            <a:endParaRPr lang="en-US" dirty="0"/>
-          </a:p>
-          <a:p>
-            <a:pPr marL="342900" indent="-342900">
-              <a:buFont typeface="Arial"/>
-              <a:buChar char="•"/>
-            </a:pPr>
-            <a:r>
-              <a:rPr lang="en-US" dirty="0" smtClean="0"/>
-              <a:t>Student understanding: 	9/10 questions were answered correctly by 90% of student</a:t>
-            </a:r>
-            <a:endParaRPr lang="en-US" dirty="0"/>
-          </a:p>
-        </p:txBody>
-      </p:sp>
-      <p:sp>
-        <p:nvSpPr>
-          <p:cNvPr id="3" name="Title 2"/>
-          <p:cNvSpPr>
-            <a:spLocks noGrp="1"/>
-          </p:cNvSpPr>
-          <p:nvPr>
-            <p:ph type="title"/>
-          </p:nvPr>
-        </p:nvSpPr>
-        <p:spPr/>
-        <p:txBody>
-          <a:bodyPr/>
-          <a:lstStyle/>
-          <a:p>
-            <a:r>
-              <a:rPr lang="en-US" dirty="0" smtClean="0"/>
-              <a:t>Results</a:t>
-            </a:r>
-            <a:endParaRPr lang="en-US" dirty="0"/>
-          </a:p>
-        </p:txBody>
-      </p:sp>
-    </p:spTree>
-    <p:extLst>
-      <p:ext uri="{BB962C8B-B14F-4D97-AF65-F5344CB8AC3E}">
-        <p14:creationId xmlns:p14="http://schemas.microsoft.com/office/powerpoint/2010/main" val="4085540163"/>
-      </p:ext>
-    </p:extLst>
-  </p:cSld>
-  <p:clrMapOvr>
-    <a:masterClrMapping/>
-  </p:clrMapOvr>
-</p:sld>
-</file>
-
-<file path=ppt/slides/slide25.xml><?xml version="1.0" encoding="utf-8"?>
-<p:sld xmlns:a="http://schemas.openxmlformats.org/drawingml/2006/main" xmlns:r="http://schemas.openxmlformats.org/officeDocument/2006/relationships" xmlns:p="http://schemas.openxmlformats.org/presentationml/2006/main">
-  <p:cSld>
-    <p:spTree>
-      <p:nvGrpSpPr>
-        <p:cNvPr id="1" name=""/>
-        <p:cNvGrpSpPr/>
-        <p:nvPr/>
-      </p:nvGrpSpPr>
-      <p:grpSpPr>
-        <a:xfrm>
-          <a:off x="0" y="0"/>
-          <a:ext cx="0" cy="0"/>
-          <a:chOff x="0" y="0"/>
-          <a:chExt cx="0" cy="0"/>
-        </a:xfrm>
-      </p:grpSpPr>
-      <p:sp>
-        <p:nvSpPr>
-          <p:cNvPr id="2" name="Content Placeholder 1"/>
-          <p:cNvSpPr>
-            <a:spLocks noGrp="1"/>
-          </p:cNvSpPr>
-          <p:nvPr>
-            <p:ph sz="quarter" idx="13"/>
-          </p:nvPr>
-        </p:nvSpPr>
-        <p:spPr/>
-        <p:txBody>
-          <a:bodyPr>
-            <a:normAutofit/>
-          </a:bodyPr>
-          <a:lstStyle/>
-          <a:p>
-            <a:pPr marL="342900" indent="-342900" algn="l">
-              <a:buFont typeface="Arial"/>
-              <a:buChar char="•"/>
-            </a:pPr>
-            <a:r>
-              <a:rPr lang="en-US" dirty="0" smtClean="0"/>
-              <a:t>Support multiple browser</a:t>
-            </a:r>
-          </a:p>
-          <a:p>
-            <a:pPr algn="l"/>
-            <a:endParaRPr lang="en-US" dirty="0"/>
-          </a:p>
-          <a:p>
-            <a:pPr algn="l"/>
-            <a:r>
-              <a:rPr lang="en-US" dirty="0" smtClean="0"/>
-              <a:t>Next Few Weeks:</a:t>
-            </a:r>
-          </a:p>
-          <a:p>
-            <a:pPr marL="342900" indent="-342900" algn="l">
-              <a:buFont typeface="Arial"/>
-              <a:buChar char="•"/>
-            </a:pPr>
-            <a:r>
-              <a:rPr lang="en-US" dirty="0"/>
-              <a:t>S</a:t>
-            </a:r>
-            <a:r>
-              <a:rPr lang="en-US" dirty="0" smtClean="0"/>
-              <a:t>olve different browser compatibility</a:t>
-            </a:r>
-          </a:p>
-          <a:p>
-            <a:pPr marL="342900" indent="-342900" algn="l">
-              <a:buFont typeface="Arial"/>
-              <a:buChar char="•"/>
-            </a:pPr>
-            <a:r>
-              <a:rPr lang="en-US" dirty="0" smtClean="0"/>
-              <a:t>Do more survey and usability testing</a:t>
-            </a:r>
-          </a:p>
-          <a:p>
-            <a:pPr marL="342900" indent="-342900" algn="l">
-              <a:buFont typeface="Arial"/>
-              <a:buChar char="•"/>
-            </a:pPr>
-            <a:r>
-              <a:rPr lang="en-US" dirty="0"/>
-              <a:t>W</a:t>
-            </a:r>
-            <a:r>
-              <a:rPr lang="en-US" dirty="0" smtClean="0"/>
-              <a:t>rite report</a:t>
-            </a:r>
-          </a:p>
-          <a:p>
-            <a:pPr algn="l"/>
-            <a:endParaRPr lang="en-US" dirty="0"/>
-          </a:p>
-          <a:p>
-            <a:pPr algn="l"/>
-            <a:r>
-              <a:rPr lang="en-US" dirty="0" smtClean="0"/>
-              <a:t>Extension:</a:t>
-            </a:r>
-          </a:p>
-          <a:p>
-            <a:pPr marL="342900" indent="-342900" algn="l">
-              <a:buFont typeface="Arial"/>
-              <a:buChar char="•"/>
-            </a:pPr>
-            <a:r>
-              <a:rPr lang="en-US" dirty="0" smtClean="0"/>
-              <a:t>Incorporate solution to the pitfalls in our app </a:t>
-            </a:r>
-            <a:endParaRPr lang="en-US" dirty="0"/>
-          </a:p>
-        </p:txBody>
-      </p:sp>
-      <p:sp>
-        <p:nvSpPr>
-          <p:cNvPr id="3" name="Title 2"/>
-          <p:cNvSpPr>
-            <a:spLocks noGrp="1"/>
-          </p:cNvSpPr>
-          <p:nvPr>
-            <p:ph type="title"/>
-          </p:nvPr>
-        </p:nvSpPr>
-        <p:spPr/>
-        <p:txBody>
-          <a:bodyPr/>
-          <a:lstStyle/>
-          <a:p>
-            <a:r>
-              <a:rPr lang="en-US" dirty="0" smtClean="0"/>
-              <a:t>Challenges and future works</a:t>
-            </a:r>
-            <a:endParaRPr lang="en-US" dirty="0"/>
-          </a:p>
-        </p:txBody>
-      </p:sp>
-    </p:spTree>
-    <p:extLst>
-      <p:ext uri="{BB962C8B-B14F-4D97-AF65-F5344CB8AC3E}">
-        <p14:creationId xmlns:p14="http://schemas.microsoft.com/office/powerpoint/2010/main" val="2276343006"/>
-      </p:ext>
-    </p:extLst>
-  </p:cSld>
-  <p:clrMapOvr>
-    <a:masterClrMapping/>
-  </p:clrMapOvr>
-</p:sld>
-</file>
-
-<file path=ppt/slides/slide26.xml><?xml version="1.0" encoding="utf-8"?>
-<p:sld xmlns:a="http://schemas.openxmlformats.org/drawingml/2006/main" xmlns:r="http://schemas.openxmlformats.org/officeDocument/2006/relationships" xmlns:p="http://schemas.openxmlformats.org/presentationml/2006/main">
-  <p:cSld>
-    <p:spTree>
-      <p:nvGrpSpPr>
-        <p:cNvPr id="1" name=""/>
-        <p:cNvGrpSpPr/>
-        <p:nvPr/>
-      </p:nvGrpSpPr>
-      <p:grpSpPr>
-        <a:xfrm>
-          <a:off x="0" y="0"/>
-          <a:ext cx="0" cy="0"/>
-          <a:chOff x="0" y="0"/>
-          <a:chExt cx="0" cy="0"/>
-        </a:xfrm>
-      </p:grpSpPr>
-      <p:sp>
-        <p:nvSpPr>
-          <p:cNvPr id="2" name="Content Placeholder 1"/>
-          <p:cNvSpPr>
-            <a:spLocks noGrp="1"/>
-          </p:cNvSpPr>
-          <p:nvPr>
-            <p:ph sz="quarter" idx="13"/>
-          </p:nvPr>
-        </p:nvSpPr>
-        <p:spPr>
-          <a:xfrm>
-            <a:off x="457200" y="1477207"/>
-            <a:ext cx="8229600" cy="5079890"/>
-          </a:xfrm>
-        </p:spPr>
-        <p:txBody>
-          <a:bodyPr>
-            <a:normAutofit fontScale="85000" lnSpcReduction="10000"/>
-          </a:bodyPr>
-          <a:lstStyle/>
-          <a:p>
-            <a:r>
-              <a:rPr lang="en-US" sz="1600" dirty="0"/>
-              <a:t>[1] John W. McCormick. 2007. MA1: real-time and parallel processing in </a:t>
-            </a:r>
-            <a:r>
-              <a:rPr lang="en-US" sz="1600" dirty="0" err="1"/>
-              <a:t>ada</a:t>
-            </a:r>
-            <a:r>
-              <a:rPr lang="en-US" sz="1600" dirty="0"/>
-              <a:t>. </a:t>
-            </a:r>
-            <a:r>
-              <a:rPr lang="en-US" sz="1600" i="1" dirty="0"/>
-              <a:t>Ada </a:t>
-            </a:r>
-            <a:r>
-              <a:rPr lang="en-US" sz="1600" i="1" dirty="0" err="1"/>
-              <a:t>Lett</a:t>
-            </a:r>
-            <a:r>
-              <a:rPr lang="en-US" sz="1600" i="1" dirty="0"/>
-              <a:t>.</a:t>
-            </a:r>
-            <a:r>
-              <a:rPr lang="en-US" sz="1600" dirty="0"/>
-              <a:t> XXVII, 3 (November 2007), 7-7. DOI=10.1145/1315607.1315587 http://</a:t>
-            </a:r>
-            <a:r>
-              <a:rPr lang="en-US" sz="1600" dirty="0" err="1"/>
-              <a:t>doi.acm.org.ezproxy.auckland.ac.nz</a:t>
-            </a:r>
-            <a:r>
-              <a:rPr lang="en-US" sz="1600" dirty="0"/>
-              <a:t>/10.1145/1315607.1315587</a:t>
-            </a:r>
-          </a:p>
-          <a:p>
-            <a:r>
-              <a:rPr lang="en-US" sz="1600" dirty="0"/>
-              <a:t>[2] John W. McCormick. 2009. Ada for real-time and parallel processing. In </a:t>
-            </a:r>
-            <a:r>
-              <a:rPr lang="en-US" sz="1600" i="1" dirty="0"/>
-              <a:t>Proceedings of the ACM </a:t>
-            </a:r>
-            <a:r>
-              <a:rPr lang="en-US" sz="1600" i="1" dirty="0" err="1"/>
-              <a:t>SIGAda</a:t>
-            </a:r>
-            <a:r>
-              <a:rPr lang="en-US" sz="1600" i="1" dirty="0"/>
-              <a:t> annual international conference on Ada and related technologies</a:t>
-            </a:r>
-            <a:r>
-              <a:rPr lang="en-US" sz="1600" dirty="0"/>
-              <a:t> (</a:t>
-            </a:r>
-            <a:r>
-              <a:rPr lang="en-US" sz="1600" dirty="0" err="1"/>
-              <a:t>SIGAda</a:t>
-            </a:r>
-            <a:r>
-              <a:rPr lang="en-US" sz="1600" dirty="0"/>
-              <a:t> '09). ACM, New York, NY, USA, 13-14. DOI=10.1145/1647420.1647428 http://</a:t>
-            </a:r>
-            <a:r>
-              <a:rPr lang="en-US" sz="1600" dirty="0" err="1"/>
-              <a:t>doi.acm.org.ezproxy.auckland.ac.nz</a:t>
-            </a:r>
-            <a:r>
-              <a:rPr lang="en-US" sz="1600" dirty="0"/>
-              <a:t>/10.1145/1647420.1647428</a:t>
-            </a:r>
-          </a:p>
-          <a:p>
-            <a:r>
-              <a:rPr lang="en-US" sz="1600" dirty="0"/>
-              <a:t>[3] Dick Mays and Richard J. LeBlanc, Jr.. 2002. The </a:t>
-            </a:r>
-            <a:r>
-              <a:rPr lang="en-US" sz="1600" dirty="0" err="1"/>
-              <a:t>cyclefree</a:t>
-            </a:r>
-            <a:r>
-              <a:rPr lang="en-US" sz="1600" dirty="0"/>
-              <a:t> methodology: a simple approach to building reliable, robust, real-time systems. In </a:t>
-            </a:r>
-            <a:r>
-              <a:rPr lang="en-US" sz="1600" i="1" dirty="0"/>
-              <a:t>Proceedings of the 24th International Conference on Software Engineering</a:t>
-            </a:r>
-            <a:r>
-              <a:rPr lang="en-US" sz="1600" dirty="0"/>
-              <a:t> (ICSE '02). ACM, New York, NY, USA, 567-575. DOI=10.1145/581339.581411 http://</a:t>
-            </a:r>
-            <a:r>
-              <a:rPr lang="en-US" sz="1600" dirty="0" err="1"/>
-              <a:t>doi.acm.org.ezproxy.auckland.ac.nz</a:t>
-            </a:r>
-            <a:r>
-              <a:rPr lang="en-US" sz="1600" dirty="0"/>
-              <a:t>/10.1145/581339.581411</a:t>
-            </a:r>
-          </a:p>
-          <a:p>
-            <a:r>
-              <a:rPr lang="en-US" sz="1500" dirty="0" smtClean="0"/>
-              <a:t>[4] </a:t>
-            </a:r>
-            <a:r>
-              <a:rPr lang="en-US" sz="1500" dirty="0"/>
-              <a:t> N. </a:t>
-            </a:r>
-            <a:r>
-              <a:rPr lang="en-US" sz="1500" dirty="0" err="1"/>
-              <a:t>Giacaman</a:t>
-            </a:r>
-            <a:r>
-              <a:rPr lang="en-US" sz="1500" dirty="0"/>
-              <a:t>. Teaching by example: Using analogies and live coding demonstrations to teach parallel computing concepts to undergraduate </a:t>
-            </a:r>
-            <a:r>
-              <a:rPr lang="en-US" sz="1500" dirty="0" err="1"/>
-              <a:t>stu</a:t>
-            </a:r>
-            <a:r>
-              <a:rPr lang="en-US" sz="1500" dirty="0"/>
-              <a:t>- dents. In Parallel and Distributed Processing Symposium Workshops PhD Forum (IPDPSW), 2012 IEEE 26th International, pages 1295 –1298, may 2012. </a:t>
-            </a:r>
-            <a:endParaRPr lang="en-US" sz="1500" dirty="0" smtClean="0"/>
-          </a:p>
-          <a:p>
-            <a:r>
-              <a:rPr lang="en-US" sz="1500" dirty="0" smtClean="0"/>
-              <a:t>[5] </a:t>
-            </a:r>
-            <a:r>
-              <a:rPr lang="en-US" sz="1500" dirty="0" err="1"/>
-              <a:t>Mordechai</a:t>
-            </a:r>
-            <a:r>
-              <a:rPr lang="en-US" sz="1500" dirty="0"/>
-              <a:t> Ben-Ari and </a:t>
-            </a:r>
-            <a:r>
-              <a:rPr lang="en-US" sz="1500" dirty="0" err="1"/>
-              <a:t>Yifat</a:t>
-            </a:r>
-            <a:r>
-              <a:rPr lang="en-US" sz="1500" dirty="0"/>
-              <a:t> Ben-David </a:t>
-            </a:r>
-            <a:r>
-              <a:rPr lang="en-US" sz="1500" dirty="0" err="1"/>
-              <a:t>Kolikant</a:t>
-            </a:r>
-            <a:r>
-              <a:rPr lang="en-US" sz="1500" dirty="0"/>
-              <a:t>. Thinking parallel: the process of learning concurrency. SIGCSE Bull., 31(3):13–16, June 1999. </a:t>
-            </a:r>
-            <a:endParaRPr lang="en-US" sz="1500" dirty="0" smtClean="0"/>
-          </a:p>
-          <a:p>
-            <a:r>
-              <a:rPr lang="en-US" sz="1500" dirty="0" smtClean="0"/>
-              <a:t>[6] </a:t>
-            </a:r>
-            <a:r>
-              <a:rPr lang="en-US" sz="1500" dirty="0"/>
-              <a:t>http://publib.boulder.ibm.com/infocenter/iseries/v5r3/index.jsp?topic=%2Frzahw%</a:t>
-            </a:r>
-            <a:r>
-              <a:rPr lang="en-US" sz="1500" dirty="0" smtClean="0"/>
-              <a:t>2Frzahwmutco.htm</a:t>
-            </a:r>
-          </a:p>
-          <a:p>
-            <a:r>
-              <a:rPr lang="en-US" sz="1500" dirty="0" smtClean="0"/>
-              <a:t>[7] </a:t>
-            </a:r>
-            <a:r>
-              <a:rPr lang="en-US" sz="1500" dirty="0" err="1"/>
-              <a:t>Fancong</a:t>
-            </a:r>
-            <a:r>
-              <a:rPr lang="en-US" sz="1500" dirty="0"/>
-              <a:t> </a:t>
-            </a:r>
-            <a:r>
-              <a:rPr lang="en-US" sz="1500" dirty="0" err="1"/>
-              <a:t>Zeng</a:t>
-            </a:r>
-            <a:r>
-              <a:rPr lang="en-US" sz="1500" dirty="0"/>
-              <a:t>. "An Initial Study of Common Coding Pitfalls in Java Programs", in Proceedings of MASPLAS'03 Mid-Atlantic Student Workshop on Programming Languages and Systems, April, 2003</a:t>
-            </a:r>
-            <a:r>
-              <a:rPr lang="en-US" sz="1500" dirty="0" smtClean="0"/>
-              <a:t>.</a:t>
-            </a:r>
-          </a:p>
-          <a:p>
-            <a:r>
-              <a:rPr lang="en-US" sz="1500" dirty="0" smtClean="0"/>
-              <a:t>[8] </a:t>
-            </a:r>
-            <a:r>
-              <a:rPr lang="en-US" sz="1600" dirty="0"/>
-              <a:t>Sung-</a:t>
-            </a:r>
-            <a:r>
-              <a:rPr lang="en-US" sz="1600" dirty="0" err="1"/>
-              <a:t>Eun</a:t>
-            </a:r>
-            <a:r>
-              <a:rPr lang="en-US" sz="1600" dirty="0"/>
-              <a:t> Choi and E Christopher Lewis. A Study of </a:t>
-            </a:r>
-            <a:r>
-              <a:rPr lang="en-US" sz="1600" dirty="0" smtClean="0"/>
-              <a:t>Common </a:t>
-            </a:r>
-            <a:r>
-              <a:rPr lang="en-US" sz="1600" dirty="0"/>
-              <a:t>Pitfalls in Simple Multi-Threaded Programs. In </a:t>
-            </a:r>
-            <a:r>
-              <a:rPr lang="en-US" sz="1600" i="1" dirty="0" smtClean="0"/>
-              <a:t>Proceedings </a:t>
-            </a:r>
-            <a:r>
-              <a:rPr lang="en-US" sz="1600" i="1" dirty="0"/>
-              <a:t>of the Thirty-first ACM SIGCSE Technical Symposium on Computer Science Education, </a:t>
-            </a:r>
-            <a:r>
-              <a:rPr lang="en-US" sz="1600" dirty="0"/>
-              <a:t>March 2000. </a:t>
-            </a:r>
-            <a:endParaRPr lang="en-US" sz="1600" dirty="0" smtClean="0"/>
-          </a:p>
-          <a:p>
-            <a:r>
-              <a:rPr lang="en-US" sz="1600" dirty="0" smtClean="0"/>
-              <a:t>[9] </a:t>
-            </a:r>
-            <a:r>
-              <a:rPr lang="en-US" sz="1600" dirty="0" err="1"/>
-              <a:t>Tallent</a:t>
-            </a:r>
-            <a:r>
-              <a:rPr lang="en-US" sz="1600" dirty="0"/>
-              <a:t>, N. R.; Mellor-</a:t>
-            </a:r>
-            <a:r>
-              <a:rPr lang="en-US" sz="1600" dirty="0" err="1"/>
-              <a:t>Crummey</a:t>
-            </a:r>
-            <a:r>
-              <a:rPr lang="en-US" sz="1600" dirty="0"/>
-              <a:t>, J. M. &amp; Porterfield, A. (2010), Analyzing lock contention in multithreaded applications., in R. </a:t>
-            </a:r>
-            <a:r>
-              <a:rPr lang="en-US" sz="1600" dirty="0" err="1"/>
-              <a:t>Govindarajan</a:t>
-            </a:r>
-            <a:r>
-              <a:rPr lang="en-US" sz="1600" dirty="0"/>
-              <a:t>; David A. Padua &amp; Mary W. Hall, ed., 'PPOPP' , ACM, , pp. 269-280 </a:t>
-            </a:r>
-            <a:r>
-              <a:rPr lang="en-US" sz="1600" dirty="0" smtClean="0"/>
-              <a:t>.</a:t>
-            </a:r>
-          </a:p>
-          <a:p>
-            <a:endParaRPr lang="en-US" sz="1500" dirty="0" smtClean="0"/>
-          </a:p>
-          <a:p>
-            <a:endParaRPr lang="en-US" sz="1500" dirty="0"/>
-          </a:p>
-          <a:p>
-            <a:endParaRPr lang="en-US" sz="1500" dirty="0"/>
-          </a:p>
-          <a:p>
-            <a:endParaRPr lang="en-US" sz="1500" dirty="0"/>
-          </a:p>
-        </p:txBody>
-      </p:sp>
-      <p:sp>
-        <p:nvSpPr>
-          <p:cNvPr id="3" name="Title 2"/>
-          <p:cNvSpPr>
-            <a:spLocks noGrp="1"/>
-          </p:cNvSpPr>
-          <p:nvPr>
-            <p:ph type="title"/>
-          </p:nvPr>
-        </p:nvSpPr>
-        <p:spPr/>
-        <p:txBody>
-          <a:bodyPr/>
-          <a:lstStyle/>
-          <a:p>
-            <a:r>
-              <a:rPr lang="en-US" dirty="0" smtClean="0"/>
-              <a:t>References</a:t>
-            </a:r>
-            <a:endParaRPr lang="en-US" dirty="0"/>
-          </a:p>
-        </p:txBody>
-      </p:sp>
-    </p:spTree>
-    <p:extLst>
-      <p:ext uri="{BB962C8B-B14F-4D97-AF65-F5344CB8AC3E}">
-        <p14:creationId xmlns:p14="http://schemas.microsoft.com/office/powerpoint/2010/main" val="3408655997"/>
-      </p:ext>
-    </p:extLst>
-  </p:cSld>
-  <p:clrMapOvr>
-    <a:masterClrMapping/>
-  </p:clrMapOvr>
-</p:sld>
-</file>
-
-<file path=ppt/slides/slide27.xml><?xml version="1.0" encoding="utf-8"?>
-<p:sld xmlns:a="http://schemas.openxmlformats.org/drawingml/2006/main" xmlns:r="http://schemas.openxmlformats.org/officeDocument/2006/relationships" xmlns:p="http://schemas.openxmlformats.org/presentationml/2006/main">
-  <p:cSld>
-    <p:spTree>
-      <p:nvGrpSpPr>
-        <p:cNvPr id="1" name=""/>
-        <p:cNvGrpSpPr/>
-        <p:nvPr/>
-      </p:nvGrpSpPr>
-      <p:grpSpPr>
-        <a:xfrm>
-          <a:off x="0" y="0"/>
-          <a:ext cx="0" cy="0"/>
-          <a:chOff x="0" y="0"/>
-          <a:chExt cx="0" cy="0"/>
-        </a:xfrm>
-      </p:grpSpPr>
-      <p:sp>
-        <p:nvSpPr>
           <p:cNvPr id="2" name="Title 1"/>
           <p:cNvSpPr>
             <a:spLocks noGrp="1"/>
@@ -13903,7 +13175,7 @@
 </p:sld>
 </file>
 
-<file path=ppt/slides/slide28.xml><?xml version="1.0" encoding="utf-8"?>
+<file path=ppt/slides/slide25.xml><?xml version="1.0" encoding="utf-8"?>
 <p:sld xmlns:a="http://schemas.openxmlformats.org/drawingml/2006/main" xmlns:r="http://schemas.openxmlformats.org/officeDocument/2006/relationships" xmlns:p="http://schemas.openxmlformats.org/presentationml/2006/main">
   <p:cSld>
     <p:spTree>
@@ -14762,16 +14034,27 @@
           </a:p>
           <a:p>
             <a:pPr marL="342900" indent="-342900">
+              <a:spcBef>
+                <a:spcPts val="1200"/>
+              </a:spcBef>
               <a:buFont typeface="Arial"/>
               <a:buChar char="•"/>
             </a:pPr>
             <a:r>
               <a:rPr lang="en-US" dirty="0" smtClean="0"/>
-              <a:t>The authors of [1][2][3] has specifically mentioned in their papers that Race Condition is the main pitfalls that all programmers always facing.</a:t>
-            </a:r>
+              <a:t>The authors of [1][2][3] has specifically mentioned in their papers that Race Condition is the main pitfalls that all programmers always facing</a:t>
+            </a:r>
+            <a:r>
+              <a:rPr lang="en-US" dirty="0" smtClean="0"/>
+              <a:t>.</a:t>
+            </a:r>
+            <a:endParaRPr lang="en-US" dirty="0" smtClean="0"/>
           </a:p>
           <a:p>
             <a:pPr marL="342900" indent="-342900">
+              <a:spcBef>
+                <a:spcPts val="1200"/>
+              </a:spcBef>
               <a:buFont typeface="Arial"/>
               <a:buChar char="•"/>
             </a:pPr>
@@ -14793,11 +14076,19 @@
             </a:r>
             <a:r>
               <a:rPr lang="en-US" dirty="0" smtClean="0"/>
-              <a:t> in [5] have included Mutual Exclusion into their lecturing materials</a:t>
-            </a:r>
+              <a:t> in [5] have included Mutual Exclusion into their lecturing </a:t>
+            </a:r>
+            <a:r>
+              <a:rPr lang="en-US" dirty="0" smtClean="0"/>
+              <a:t>materials.</a:t>
+            </a:r>
+            <a:endParaRPr lang="en-US" dirty="0" smtClean="0"/>
           </a:p>
           <a:p>
             <a:pPr marL="342900" indent="-342900">
+              <a:spcBef>
+                <a:spcPts val="1200"/>
+              </a:spcBef>
               <a:buFont typeface="Arial"/>
               <a:buChar char="•"/>
             </a:pPr>
@@ -14844,6 +14135,9 @@
           </a:p>
           <a:p>
             <a:pPr marL="342900" indent="-342900">
+              <a:spcBef>
+                <a:spcPts val="1200"/>
+              </a:spcBef>
               <a:buFont typeface="Arial"/>
               <a:buChar char="•"/>
             </a:pPr>
@@ -15400,48 +14694,110 @@
         </p:nvSpPr>
         <p:spPr/>
         <p:txBody>
-          <a:bodyPr/>
+          <a:bodyPr>
+            <a:normAutofit/>
+          </a:bodyPr>
           <a:lstStyle/>
           <a:p>
-            <a:pPr algn="l"/>
-            <a:r>
-              <a:rPr lang="en-US" dirty="0" smtClean="0"/>
-              <a:t>+ what is race condition</a:t>
-            </a:r>
-          </a:p>
-          <a:p>
-            <a:pPr algn="l"/>
-            <a:r>
-              <a:rPr lang="en-US" dirty="0" smtClean="0"/>
-              <a:t>+ how to solve race condition</a:t>
-            </a:r>
-          </a:p>
-          <a:p>
-            <a:pPr algn="l"/>
-            <a:endParaRPr lang="en-US" dirty="0"/>
-          </a:p>
-          <a:p>
-            <a:pPr algn="l"/>
+            <a:pPr marL="342900" indent="-342900">
+              <a:buFont typeface="Arial"/>
+              <a:buChar char="•"/>
+            </a:pPr>
+            <a:r>
+              <a:rPr lang="en-US" dirty="0" smtClean="0"/>
+              <a:t>A race </a:t>
+            </a:r>
+            <a:r>
+              <a:rPr lang="en-US" dirty="0"/>
+              <a:t>condition in parallel programming caused by </a:t>
+            </a:r>
+            <a:r>
+              <a:rPr lang="en-US" sz="3100" b="1" dirty="0">
+                <a:solidFill>
+                  <a:srgbClr val="FFFF00"/>
+                </a:solidFill>
+              </a:rPr>
+              <a:t>the order </a:t>
+            </a:r>
+            <a:r>
+              <a:rPr lang="en-US" dirty="0"/>
+              <a:t>in which </a:t>
+            </a:r>
+            <a:r>
+              <a:rPr lang="en-US" sz="3400" b="1" dirty="0">
+                <a:solidFill>
+                  <a:srgbClr val="FFFF00"/>
+                </a:solidFill>
+              </a:rPr>
+              <a:t>multiple threads </a:t>
+            </a:r>
+            <a:r>
+              <a:rPr lang="en-US" dirty="0"/>
+              <a:t>access a </a:t>
+            </a:r>
+            <a:r>
+              <a:rPr lang="en-US" sz="3400" b="1" dirty="0">
+                <a:solidFill>
+                  <a:srgbClr val="FFFF00"/>
+                </a:solidFill>
+              </a:rPr>
+              <a:t>shared variable </a:t>
+            </a:r>
+            <a:r>
+              <a:rPr lang="en-US" dirty="0"/>
+              <a:t>and at least one thread </a:t>
+            </a:r>
+            <a:r>
+              <a:rPr lang="en-US" sz="3400" b="1" dirty="0">
+                <a:solidFill>
+                  <a:srgbClr val="FFFF00"/>
+                </a:solidFill>
+              </a:rPr>
+              <a:t>writes</a:t>
+            </a:r>
+            <a:r>
+              <a:rPr lang="en-US" dirty="0">
+                <a:solidFill>
+                  <a:srgbClr val="FFFF00"/>
+                </a:solidFill>
+              </a:rPr>
+              <a:t> </a:t>
+            </a:r>
+            <a:r>
+              <a:rPr lang="en-US" dirty="0"/>
+              <a:t>to it.</a:t>
+            </a:r>
+          </a:p>
+          <a:p>
+            <a:pPr marL="342900" indent="-342900" algn="l">
+              <a:buFont typeface="Arial"/>
+              <a:buChar char="•"/>
+            </a:pPr>
             <a:endParaRPr lang="en-US" dirty="0" smtClean="0"/>
           </a:p>
           <a:p>
-            <a:pPr algn="l"/>
-            <a:endParaRPr lang="en-US" dirty="0" smtClean="0"/>
-          </a:p>
-          <a:p>
-            <a:pPr algn="l"/>
-            <a:r>
-              <a:rPr lang="en-US" dirty="0" smtClean="0"/>
-              <a:t>+ Why it is a problem</a:t>
-            </a:r>
-          </a:p>
-          <a:p>
-            <a:pPr algn="l"/>
-            <a:r>
-              <a:rPr lang="en-US" dirty="0" smtClean="0"/>
-              <a:t>+ Demo</a:t>
-            </a:r>
-            <a:endParaRPr lang="en-US" dirty="0"/>
+            <a:pPr marL="342900" indent="-342900" algn="l">
+              <a:buFont typeface="Arial"/>
+              <a:buChar char="•"/>
+            </a:pPr>
+            <a:r>
+              <a:rPr lang="en-US" dirty="0" smtClean="0"/>
+              <a:t>It can be solved:</a:t>
+            </a:r>
+          </a:p>
+          <a:p>
+            <a:pPr marL="628650" lvl="1" indent="-342900"/>
+            <a:r>
+              <a:rPr lang="en-US" dirty="0" smtClean="0"/>
+              <a:t>Mutual Exclusion</a:t>
+            </a:r>
+          </a:p>
+          <a:p>
+            <a:pPr marL="628650" lvl="1" indent="-342900"/>
+            <a:r>
+              <a:rPr lang="en-US" dirty="0" smtClean="0"/>
+              <a:t>Atomic</a:t>
+            </a:r>
           </a:p>
         </p:txBody>
       </p:sp>
@@ -15510,109 +14866,35 @@
         </p:nvSpPr>
         <p:spPr/>
         <p:txBody>
-          <a:bodyPr>
-            <a:normAutofit/>
-          </a:bodyPr>
+          <a:bodyPr/>
           <a:lstStyle/>
           <a:p>
-            <a:pPr algn="l"/>
-            <a:r>
-              <a:rPr lang="en-US" dirty="0" smtClean="0"/>
-              <a:t>what is it ?</a:t>
-            </a:r>
-          </a:p>
-          <a:p>
-            <a:pPr algn="l"/>
-            <a:r>
-              <a:rPr lang="en-US" dirty="0" smtClean="0"/>
-              <a:t>  A condition in parallel programming caused by </a:t>
-            </a:r>
-            <a:r>
-              <a:rPr lang="en-US" sz="3100" b="1" dirty="0" smtClean="0">
-                <a:solidFill>
-                  <a:srgbClr val="FFFF00"/>
-                </a:solidFill>
-              </a:rPr>
-              <a:t>the order </a:t>
-            </a:r>
-            <a:r>
-              <a:rPr lang="en-US" dirty="0" smtClean="0"/>
-              <a:t>in which </a:t>
-            </a:r>
-            <a:r>
-              <a:rPr lang="en-US" sz="3400" b="1" dirty="0" smtClean="0">
-                <a:solidFill>
-                  <a:srgbClr val="FFFF00"/>
-                </a:solidFill>
-              </a:rPr>
-              <a:t>multiple threads </a:t>
-            </a:r>
-            <a:r>
-              <a:rPr lang="en-US" dirty="0" smtClean="0"/>
-              <a:t>access a </a:t>
-            </a:r>
-            <a:r>
-              <a:rPr lang="en-US" sz="3400" b="1" dirty="0" smtClean="0">
-                <a:solidFill>
-                  <a:srgbClr val="FFFF00"/>
-                </a:solidFill>
-              </a:rPr>
-              <a:t>shared variable </a:t>
-            </a:r>
-            <a:r>
-              <a:rPr lang="en-US" dirty="0" smtClean="0"/>
-              <a:t>and at least one thread </a:t>
-            </a:r>
-            <a:r>
-              <a:rPr lang="en-US" sz="3400" b="1" dirty="0" smtClean="0">
-                <a:solidFill>
-                  <a:srgbClr val="FFFF00"/>
-                </a:solidFill>
-              </a:rPr>
-              <a:t>writes</a:t>
-            </a:r>
-            <a:r>
-              <a:rPr lang="en-US" dirty="0" smtClean="0">
-                <a:solidFill>
-                  <a:srgbClr val="FFFF00"/>
-                </a:solidFill>
-              </a:rPr>
-              <a:t> </a:t>
-            </a:r>
-            <a:r>
-              <a:rPr lang="en-US" dirty="0" smtClean="0"/>
-              <a:t>to it.</a:t>
-            </a:r>
-          </a:p>
-          <a:p>
-            <a:pPr algn="l"/>
-            <a:endParaRPr lang="en-US" dirty="0" smtClean="0"/>
-          </a:p>
-          <a:p>
-            <a:pPr marL="0" lvl="1" indent="0">
-              <a:buNone/>
+            <a:pPr marL="342900" indent="-342900">
+              <a:buFont typeface="Arial"/>
+              <a:buChar char="•"/>
             </a:pPr>
-            <a:endParaRPr lang="en-US" dirty="0" smtClean="0"/>
-          </a:p>
-          <a:p>
-            <a:pPr algn="l"/>
-            <a:endParaRPr lang="en-US" dirty="0" smtClean="0"/>
-          </a:p>
-          <a:p>
-            <a:pPr algn="l"/>
-            <a:endParaRPr lang="en-US" dirty="0" smtClean="0"/>
-          </a:p>
-          <a:p>
-            <a:pPr algn="l"/>
+            <a:r>
+              <a:rPr lang="en-US" dirty="0"/>
+              <a:t>It is non deterministic : </a:t>
+            </a:r>
+            <a:r>
+              <a:rPr lang="en-GB" dirty="0"/>
+              <a:t>can exhibit different behaviours on different runs</a:t>
+            </a:r>
             <a:endParaRPr lang="en-US" dirty="0"/>
           </a:p>
           <a:p>
-            <a:pPr algn="l"/>
-            <a:endParaRPr lang="en-US" dirty="0" smtClean="0"/>
-          </a:p>
-          <a:p>
-            <a:pPr algn="l"/>
-            <a:endParaRPr lang="en-US" dirty="0" smtClean="0"/>
+            <a:endParaRPr lang="en-US" dirty="0"/>
+          </a:p>
+          <a:p>
+            <a:pPr marL="342900" indent="-342900">
+              <a:buFont typeface="Arial"/>
+              <a:buChar char="•"/>
+            </a:pPr>
+            <a:r>
+              <a:rPr lang="en-US" dirty="0" smtClean="0"/>
+              <a:t>Why?	[10] explains that:</a:t>
+            </a:r>
           </a:p>
         </p:txBody>
       </p:sp>
@@ -15632,9 +14914,57 @@
           <a:lstStyle/>
           <a:p>
             <a:r>
-              <a:rPr lang="en-US" dirty="0" smtClean="0"/>
-              <a:t>Race Condition</a:t>
-            </a:r>
+              <a:rPr lang="en-NZ" dirty="0"/>
+              <a:t>Why is it a Pitfall?</a:t>
+            </a:r>
+            <a:endParaRPr lang="en-US" dirty="0"/>
+          </a:p>
+        </p:txBody>
+      </p:sp>
+      <p:graphicFrame>
+        <p:nvGraphicFramePr>
+          <p:cNvPr id="4" name="Diagram 3"/>
+          <p:cNvGraphicFramePr/>
+          <p:nvPr>
+            <p:extLst>
+              <p:ext uri="{D42A27DB-BD31-4B8C-83A1-F6EECF244321}">
+                <p14:modId xmlns:p14="http://schemas.microsoft.com/office/powerpoint/2010/main" val="1769372631"/>
+              </p:ext>
+            </p:extLst>
+          </p:nvPr>
+        </p:nvGraphicFramePr>
+        <p:xfrm>
+          <a:off x="2238373" y="3427607"/>
+          <a:ext cx="3752192" cy="2380593"/>
+        </p:xfrm>
+        <a:graphic>
+          <a:graphicData uri="http://schemas.openxmlformats.org/drawingml/2006/diagram">
+            <dgm:relIds xmlns:dgm="http://schemas.openxmlformats.org/drawingml/2006/diagram" xmlns:r="http://schemas.openxmlformats.org/officeDocument/2006/relationships" r:dm="rId2" r:lo="rId3" r:qs="rId4" r:cs="rId5"/>
+          </a:graphicData>
+        </a:graphic>
+      </p:graphicFrame>
+      <p:sp>
+        <p:nvSpPr>
+          <p:cNvPr id="5" name="TextBox 4"/>
+          <p:cNvSpPr txBox="1"/>
+          <p:nvPr/>
+        </p:nvSpPr>
+        <p:spPr>
+          <a:xfrm>
+            <a:off x="6350496" y="5593417"/>
+            <a:ext cx="184666" cy="369332"/>
+          </a:xfrm>
+          <a:prstGeom prst="rect">
+            <a:avLst/>
+          </a:prstGeom>
+          <a:noFill/>
+        </p:spPr>
+        <p:txBody>
+          <a:bodyPr wrap="none" rtlCol="0">
+            <a:spAutoFit/>
+          </a:bodyPr>
+          <a:lstStyle/>
+          <a:p>
             <a:endParaRPr lang="en-US" dirty="0"/>
           </a:p>
         </p:txBody>
@@ -15642,20 +14972,13 @@
     </p:spTree>
     <p:extLst>
       <p:ext uri="{BB962C8B-B14F-4D97-AF65-F5344CB8AC3E}">
-        <p14:creationId xmlns:p14="http://schemas.microsoft.com/office/powerpoint/2010/main" val="3236641872"/>
+        <p14:creationId xmlns:p14="http://schemas.microsoft.com/office/powerpoint/2010/main" val="2598569917"/>
       </p:ext>
     </p:extLst>
   </p:cSld>
   <p:clrMapOvr>
     <a:masterClrMapping/>
   </p:clrMapOvr>
-  <p:timing>
-    <p:tnLst>
-      <p:par>
-        <p:cTn xmlns:p14="http://schemas.microsoft.com/office/powerpoint/2010/main" id="1" dur="indefinite" restart="never" nodeType="tmRoot"/>
-      </p:par>
-    </p:tnLst>
-  </p:timing>
 </p:sld>
 </file>
 

</xml_diff>